<commit_message>
Add PowerPoint preview utility and update Dockerfile dependencies
</commit_message>
<xml_diff>
--- a/test.pptx
+++ b/test.pptx
@@ -6,6 +6,10 @@
   </p:sldMasterIdLst>
   <p:sldIdLst>
     <p:sldId id="256" r:id="rId6"/>
+    <p:sldId id="257" r:id="rId7"/>
+    <p:sldId id="258" r:id="rId8"/>
+    <p:sldId id="259" r:id="rId9"/>
+    <p:sldId id="260" r:id="rId10"/>
   </p:sldIdLst>
   <p:sldSz cx="12192000" cy="6858000"/>
   <p:notesSz cx="6858000" cy="9144000"/>
@@ -3360,6 +3364,210 @@
 </p:sld>
 </file>
 
+<file path=ppt/slides/slide2.xml><?xml version="1.0" encoding="utf-8"?>
+<p:sld xmlns:a="http://schemas.openxmlformats.org/drawingml/2006/main" xmlns:p="http://schemas.openxmlformats.org/presentationml/2006/main" xmlns:r="http://schemas.openxmlformats.org/officeDocument/2006/relationships">
+  <p:cSld>
+    <p:spTree>
+      <p:nvGrpSpPr>
+        <p:cNvPr id="1" name=""/>
+        <p:cNvGrpSpPr/>
+        <p:nvPr/>
+      </p:nvGrpSpPr>
+      <p:grpSpPr/>
+      <p:sp>
+        <p:nvSpPr>
+          <p:cNvPr id="2" name="Title 1"/>
+          <p:cNvSpPr>
+            <a:spLocks noGrp="1"/>
+          </p:cNvSpPr>
+          <p:nvPr>
+            <p:ph type="title"/>
+          </p:nvPr>
+        </p:nvSpPr>
+        <p:spPr/>
+        <p:txBody>
+          <a:bodyPr/>
+          <a:lstStyle/>
+          <a:p>
+            <a:pPr>
+              <a:defRPr sz="2400" b="1" i="0">
+                <a:latin typeface="Arial"/>
+              </a:defRPr>
+            </a:pPr>
+            <a:r>
+              <a:t>Data</a:t>
+            </a:r>
+            <a:r>
+              <a:rPr sz="1800" b="1" i="1">
+                <a:latin typeface="Arial"/>
+              </a:rPr>
+              <a:t>
+Aggregation 1</a:t>
+            </a:r>
+          </a:p>
+        </p:txBody>
+      </p:sp>
+    </p:spTree>
+  </p:cSld>
+  <p:clrMapOvr>
+    <a:masterClrMapping/>
+  </p:clrMapOvr>
+</p:sld>
+</file>
+
+<file path=ppt/slides/slide3.xml><?xml version="1.0" encoding="utf-8"?>
+<p:sld xmlns:a="http://schemas.openxmlformats.org/drawingml/2006/main" xmlns:p="http://schemas.openxmlformats.org/presentationml/2006/main" xmlns:r="http://schemas.openxmlformats.org/officeDocument/2006/relationships">
+  <p:cSld>
+    <p:spTree>
+      <p:nvGrpSpPr>
+        <p:cNvPr id="1" name=""/>
+        <p:cNvGrpSpPr/>
+        <p:nvPr/>
+      </p:nvGrpSpPr>
+      <p:grpSpPr/>
+      <p:sp>
+        <p:nvSpPr>
+          <p:cNvPr id="2" name="Title 1"/>
+          <p:cNvSpPr>
+            <a:spLocks noGrp="1"/>
+          </p:cNvSpPr>
+          <p:nvPr>
+            <p:ph type="title"/>
+          </p:nvPr>
+        </p:nvSpPr>
+        <p:spPr/>
+        <p:txBody>
+          <a:bodyPr/>
+          <a:lstStyle/>
+          <a:p>
+            <a:pPr>
+              <a:defRPr sz="2400" b="1" i="0">
+                <a:latin typeface="Arial"/>
+              </a:defRPr>
+            </a:pPr>
+            <a:r>
+              <a:t>Data</a:t>
+            </a:r>
+            <a:r>
+              <a:rPr sz="1800" b="1" i="1">
+                <a:latin typeface="Arial"/>
+              </a:rPr>
+              <a:t>
+Aggregation 1</a:t>
+            </a:r>
+          </a:p>
+        </p:txBody>
+      </p:sp>
+    </p:spTree>
+  </p:cSld>
+  <p:clrMapOvr>
+    <a:masterClrMapping/>
+  </p:clrMapOvr>
+</p:sld>
+</file>
+
+<file path=ppt/slides/slide4.xml><?xml version="1.0" encoding="utf-8"?>
+<p:sld xmlns:a="http://schemas.openxmlformats.org/drawingml/2006/main" xmlns:p="http://schemas.openxmlformats.org/presentationml/2006/main" xmlns:r="http://schemas.openxmlformats.org/officeDocument/2006/relationships">
+  <p:cSld>
+    <p:spTree>
+      <p:nvGrpSpPr>
+        <p:cNvPr id="1" name=""/>
+        <p:cNvGrpSpPr/>
+        <p:nvPr/>
+      </p:nvGrpSpPr>
+      <p:grpSpPr/>
+      <p:sp>
+        <p:nvSpPr>
+          <p:cNvPr id="2" name="Title 1"/>
+          <p:cNvSpPr>
+            <a:spLocks noGrp="1"/>
+          </p:cNvSpPr>
+          <p:nvPr>
+            <p:ph type="title"/>
+          </p:nvPr>
+        </p:nvSpPr>
+        <p:spPr/>
+        <p:txBody>
+          <a:bodyPr/>
+          <a:lstStyle/>
+          <a:p>
+            <a:pPr>
+              <a:defRPr sz="2400" b="1" i="0">
+                <a:latin typeface="Arial"/>
+              </a:defRPr>
+            </a:pPr>
+            <a:r>
+              <a:t>Data</a:t>
+            </a:r>
+            <a:r>
+              <a:rPr sz="1800" b="1" i="1">
+                <a:latin typeface="Arial"/>
+              </a:rPr>
+              <a:t>
+Aggregation 1</a:t>
+            </a:r>
+          </a:p>
+        </p:txBody>
+      </p:sp>
+    </p:spTree>
+  </p:cSld>
+  <p:clrMapOvr>
+    <a:masterClrMapping/>
+  </p:clrMapOvr>
+</p:sld>
+</file>
+
+<file path=ppt/slides/slide5.xml><?xml version="1.0" encoding="utf-8"?>
+<p:sld xmlns:a="http://schemas.openxmlformats.org/drawingml/2006/main" xmlns:p="http://schemas.openxmlformats.org/presentationml/2006/main" xmlns:r="http://schemas.openxmlformats.org/officeDocument/2006/relationships">
+  <p:cSld>
+    <p:spTree>
+      <p:nvGrpSpPr>
+        <p:cNvPr id="1" name=""/>
+        <p:cNvGrpSpPr/>
+        <p:nvPr/>
+      </p:nvGrpSpPr>
+      <p:grpSpPr/>
+      <p:sp>
+        <p:nvSpPr>
+          <p:cNvPr id="2" name="Title 1"/>
+          <p:cNvSpPr>
+            <a:spLocks noGrp="1"/>
+          </p:cNvSpPr>
+          <p:nvPr>
+            <p:ph type="title"/>
+          </p:nvPr>
+        </p:nvSpPr>
+        <p:spPr/>
+        <p:txBody>
+          <a:bodyPr/>
+          <a:lstStyle/>
+          <a:p>
+            <a:pPr>
+              <a:defRPr sz="2400" b="1" i="0">
+                <a:latin typeface="Arial"/>
+              </a:defRPr>
+            </a:pPr>
+            <a:r>
+              <a:t>Data</a:t>
+            </a:r>
+            <a:r>
+              <a:rPr sz="1800" b="1" i="1">
+                <a:latin typeface="Arial"/>
+              </a:rPr>
+              <a:t>
+Aggregation 1</a:t>
+            </a:r>
+          </a:p>
+        </p:txBody>
+      </p:sp>
+    </p:spTree>
+  </p:cSld>
+  <p:clrMapOvr>
+    <a:masterClrMapping/>
+  </p:clrMapOvr>
+</p:sld>
+</file>
+
 <file path=ppt/theme/theme1.xml><?xml version="1.0" encoding="utf-8"?>
 <a:theme xmlns:a="http://schemas.openxmlformats.org/drawingml/2006/main" name="Office Theme">
   <a:themeElements>

</xml_diff>

<commit_message>
Enhance PowerPoint presentation module with detailed table addition and improve preview utility to convert PPTX to PDF before generating images
</commit_message>
<xml_diff>
--- a/test.pptx
+++ b/test.pptx
@@ -7,9 +7,6 @@
   <p:sldIdLst>
     <p:sldId id="256" r:id="rId6"/>
     <p:sldId id="257" r:id="rId7"/>
-    <p:sldId id="258" r:id="rId8"/>
-    <p:sldId id="259" r:id="rId9"/>
-    <p:sldId id="260" r:id="rId10"/>
   </p:sldIdLst>
   <p:sldSz cx="12192000" cy="6858000"/>
   <p:notesSz cx="6858000" cy="9144000"/>
@@ -3344,18 +3341,659 @@
               </a:defRPr>
             </a:pPr>
             <a:r>
-              <a:t>Title</a:t>
+              <a:t>Data</a:t>
             </a:r>
             <a:r>
               <a:rPr sz="1800" b="1" i="1">
                 <a:latin typeface="Arial"/>
               </a:rPr>
               <a:t>
-Subtitle</a:t>
-            </a:r>
-          </a:p>
-        </p:txBody>
-      </p:sp>
+Aggregation 1</a:t>
+            </a:r>
+          </a:p>
+        </p:txBody>
+      </p:sp>
+      <p:graphicFrame>
+        <p:nvGraphicFramePr>
+          <p:cNvPr id="3" name="Table 2"/>
+          <p:cNvGraphicFramePr>
+            <a:graphicFrameLocks noGrp="1"/>
+          </p:cNvGraphicFramePr>
+          <p:nvPr/>
+        </p:nvGraphicFramePr>
+        <p:xfrm>
+          <a:off x="457200" y="1371600"/>
+          <a:ext cx="7315200" cy="2743200"/>
+        </p:xfrm>
+        <a:graphic>
+          <a:graphicData uri="http://schemas.openxmlformats.org/drawingml/2006/table">
+            <a:tbl>
+              <a:tblPr firstRow="1" bandRow="1">
+                <a:tableStyleId>{5C22544A-7EE6-4342-B048-85BDC9FD1C3A}</a:tableStyleId>
+              </a:tblPr>
+              <a:tblGrid>
+                <a:gridCol w="1463040"/>
+                <a:gridCol w="1463040"/>
+                <a:gridCol w="1463040"/>
+                <a:gridCol w="1463040"/>
+                <a:gridCol w="1463040"/>
+              </a:tblGrid>
+              <a:tr h="457200">
+                <a:tc>
+                  <a:txBody>
+                    <a:bodyPr/>
+                    <a:lstStyle/>
+                    <a:p>
+                      <a:pPr algn="ctr"/>
+                      <a:r>
+                        <a:rPr sz="1100" b="1">
+                          <a:solidFill>
+                            <a:srgbClr val="FFFFFF"/>
+                          </a:solidFill>
+                        </a:rPr>
+                        <a:t>product_category</a:t>
+                      </a:r>
+                    </a:p>
+                  </a:txBody>
+                  <a:tcPr>
+                    <a:solidFill>
+                      <a:srgbClr val="4472C4"/>
+                    </a:solidFill>
+                  </a:tcPr>
+                </a:tc>
+                <a:tc>
+                  <a:txBody>
+                    <a:bodyPr/>
+                    <a:lstStyle/>
+                    <a:p>
+                      <a:pPr algn="ctr"/>
+                      <a:r>
+                        <a:rPr sz="1100" b="1">
+                          <a:solidFill>
+                            <a:srgbClr val="FFFFFF"/>
+                          </a:solidFill>
+                        </a:rPr>
+                        <a:t>Customer Count</a:t>
+                      </a:r>
+                    </a:p>
+                  </a:txBody>
+                  <a:tcPr>
+                    <a:solidFill>
+                      <a:srgbClr val="4472C4"/>
+                    </a:solidFill>
+                  </a:tcPr>
+                </a:tc>
+                <a:tc>
+                  <a:txBody>
+                    <a:bodyPr/>
+                    <a:lstStyle/>
+                    <a:p>
+                      <a:pPr algn="ctr"/>
+                      <a:r>
+                        <a:rPr sz="1100" b="1">
+                          <a:solidFill>
+                            <a:srgbClr val="FFFFFF"/>
+                          </a:solidFill>
+                        </a:rPr>
+                        <a:t>Avg Price</a:t>
+                      </a:r>
+                    </a:p>
+                  </a:txBody>
+                  <a:tcPr>
+                    <a:solidFill>
+                      <a:srgbClr val="4472C4"/>
+                    </a:solidFill>
+                  </a:tcPr>
+                </a:tc>
+                <a:tc>
+                  <a:txBody>
+                    <a:bodyPr/>
+                    <a:lstStyle/>
+                    <a:p>
+                      <a:pPr algn="ctr"/>
+                      <a:r>
+                        <a:rPr sz="1100" b="1">
+                          <a:solidFill>
+                            <a:srgbClr val="FFFFFF"/>
+                          </a:solidFill>
+                        </a:rPr>
+                        <a:t>Total Quantity</a:t>
+                      </a:r>
+                    </a:p>
+                  </a:txBody>
+                  <a:tcPr>
+                    <a:solidFill>
+                      <a:srgbClr val="4472C4"/>
+                    </a:solidFill>
+                  </a:tcPr>
+                </a:tc>
+                <a:tc>
+                  <a:txBody>
+                    <a:bodyPr/>
+                    <a:lstStyle/>
+                    <a:p>
+                      <a:pPr algn="ctr"/>
+                      <a:r>
+                        <a:rPr sz="1100" b="1">
+                          <a:solidFill>
+                            <a:srgbClr val="FFFFFF"/>
+                          </a:solidFill>
+                        </a:rPr>
+                        <a:t>Discount Rate</a:t>
+                      </a:r>
+                    </a:p>
+                  </a:txBody>
+                  <a:tcPr>
+                    <a:solidFill>
+                      <a:srgbClr val="4472C4"/>
+                    </a:solidFill>
+                  </a:tcPr>
+                </a:tc>
+              </a:tr>
+              <a:tr h="457200">
+                <a:tc>
+                  <a:txBody>
+                    <a:bodyPr/>
+                    <a:lstStyle/>
+                    <a:p>
+                      <a:pPr algn="ctr"/>
+                      <a:r>
+                        <a:rPr sz="1100" b="1">
+                          <a:solidFill>
+                            <a:srgbClr val="FFFFFF"/>
+                          </a:solidFill>
+                        </a:rPr>
+                        <a:t>Books</a:t>
+                      </a:r>
+                    </a:p>
+                  </a:txBody>
+                  <a:tcPr>
+                    <a:solidFill>
+                      <a:srgbClr val="5894FE"/>
+                    </a:solidFill>
+                  </a:tcPr>
+                </a:tc>
+                <a:tc>
+                  <a:txBody>
+                    <a:bodyPr/>
+                    <a:lstStyle/>
+                    <a:p>
+                      <a:pPr algn="l"/>
+                      <a:r>
+                        <a:rPr sz="1000" b="0" i="0">
+                          <a:solidFill>
+                            <a:srgbClr val="000000"/>
+                          </a:solidFill>
+                          <a:latin typeface="Arial"/>
+                        </a:rPr>
+                        <a:t>130.0</a:t>
+                      </a:r>
+                    </a:p>
+                  </a:txBody>
+                  <a:tcPr/>
+                </a:tc>
+                <a:tc>
+                  <a:txBody>
+                    <a:bodyPr/>
+                    <a:lstStyle/>
+                    <a:p>
+                      <a:pPr algn="l"/>
+                      <a:r>
+                        <a:rPr sz="1000" b="0" i="0">
+                          <a:solidFill>
+                            <a:srgbClr val="000000"/>
+                          </a:solidFill>
+                          <a:latin typeface="Arial"/>
+                        </a:rPr>
+                        <a:t>31.386236771940364</a:t>
+                      </a:r>
+                    </a:p>
+                  </a:txBody>
+                  <a:tcPr/>
+                </a:tc>
+                <a:tc>
+                  <a:txBody>
+                    <a:bodyPr/>
+                    <a:lstStyle/>
+                    <a:p>
+                      <a:pPr algn="l"/>
+                      <a:r>
+                        <a:rPr sz="1000" b="0" i="0">
+                          <a:solidFill>
+                            <a:srgbClr val="000000"/>
+                          </a:solidFill>
+                          <a:latin typeface="Arial"/>
+                        </a:rPr>
+                        <a:t>385.0</a:t>
+                      </a:r>
+                    </a:p>
+                  </a:txBody>
+                  <a:tcPr/>
+                </a:tc>
+                <a:tc>
+                  <a:txBody>
+                    <a:bodyPr/>
+                    <a:lstStyle/>
+                    <a:p>
+                      <a:pPr algn="l"/>
+                      <a:r>
+                        <a:rPr sz="1000" b="0" i="0">
+                          <a:solidFill>
+                            <a:srgbClr val="000000"/>
+                          </a:solidFill>
+                          <a:latin typeface="Arial"/>
+                        </a:rPr>
+                        <a:t>0.27972027972027974</a:t>
+                      </a:r>
+                    </a:p>
+                  </a:txBody>
+                  <a:tcPr/>
+                </a:tc>
+              </a:tr>
+              <a:tr h="457200">
+                <a:tc>
+                  <a:txBody>
+                    <a:bodyPr/>
+                    <a:lstStyle/>
+                    <a:p>
+                      <a:pPr algn="ctr"/>
+                      <a:r>
+                        <a:rPr sz="1100" b="1">
+                          <a:solidFill>
+                            <a:srgbClr val="FFFFFF"/>
+                          </a:solidFill>
+                        </a:rPr>
+                        <a:t>Clothing</a:t>
+                      </a:r>
+                    </a:p>
+                  </a:txBody>
+                  <a:tcPr>
+                    <a:solidFill>
+                      <a:srgbClr val="5894FE"/>
+                    </a:solidFill>
+                  </a:tcPr>
+                </a:tc>
+                <a:tc>
+                  <a:txBody>
+                    <a:bodyPr/>
+                    <a:lstStyle/>
+                    <a:p>
+                      <a:pPr algn="l"/>
+                      <a:r>
+                        <a:rPr sz="1000" b="0" i="0">
+                          <a:solidFill>
+                            <a:srgbClr val="000000"/>
+                          </a:solidFill>
+                          <a:latin typeface="Arial"/>
+                        </a:rPr>
+                        <a:t>226.0</a:t>
+                      </a:r>
+                    </a:p>
+                  </a:txBody>
+                  <a:tcPr/>
+                </a:tc>
+                <a:tc>
+                  <a:txBody>
+                    <a:bodyPr/>
+                    <a:lstStyle/>
+                    <a:p>
+                      <a:pPr algn="l"/>
+                      <a:r>
+                        <a:rPr sz="1000" b="0" i="0">
+                          <a:solidFill>
+                            <a:srgbClr val="000000"/>
+                          </a:solidFill>
+                          <a:latin typeface="Arial"/>
+                        </a:rPr>
+                        <a:t>34.69882070085275</a:t>
+                      </a:r>
+                    </a:p>
+                  </a:txBody>
+                  <a:tcPr/>
+                </a:tc>
+                <a:tc>
+                  <a:txBody>
+                    <a:bodyPr/>
+                    <a:lstStyle/>
+                    <a:p>
+                      <a:pPr algn="l"/>
+                      <a:r>
+                        <a:rPr sz="1000" b="0" i="0">
+                          <a:solidFill>
+                            <a:srgbClr val="000000"/>
+                          </a:solidFill>
+                          <a:latin typeface="Arial"/>
+                        </a:rPr>
+                        <a:t>702.0</a:t>
+                      </a:r>
+                    </a:p>
+                  </a:txBody>
+                  <a:tcPr/>
+                </a:tc>
+                <a:tc>
+                  <a:txBody>
+                    <a:bodyPr/>
+                    <a:lstStyle/>
+                    <a:p>
+                      <a:pPr algn="l"/>
+                      <a:r>
+                        <a:rPr sz="1000" b="0" i="0">
+                          <a:solidFill>
+                            <a:srgbClr val="000000"/>
+                          </a:solidFill>
+                          <a:latin typeface="Arial"/>
+                        </a:rPr>
+                        <a:t>0.3228346456692913</a:t>
+                      </a:r>
+                    </a:p>
+                  </a:txBody>
+                  <a:tcPr/>
+                </a:tc>
+              </a:tr>
+              <a:tr h="457200">
+                <a:tc>
+                  <a:txBody>
+                    <a:bodyPr/>
+                    <a:lstStyle/>
+                    <a:p>
+                      <a:pPr algn="ctr"/>
+                      <a:r>
+                        <a:rPr sz="1100" b="1">
+                          <a:solidFill>
+                            <a:srgbClr val="FFFFFF"/>
+                          </a:solidFill>
+                        </a:rPr>
+                        <a:t>Electronics</a:t>
+                      </a:r>
+                    </a:p>
+                  </a:txBody>
+                  <a:tcPr>
+                    <a:solidFill>
+                      <a:srgbClr val="5894FE"/>
+                    </a:solidFill>
+                  </a:tcPr>
+                </a:tc>
+                <a:tc>
+                  <a:txBody>
+                    <a:bodyPr/>
+                    <a:lstStyle/>
+                    <a:p>
+                      <a:pPr algn="l"/>
+                      <a:r>
+                        <a:rPr sz="1000" b="0" i="0">
+                          <a:solidFill>
+                            <a:srgbClr val="000000"/>
+                          </a:solidFill>
+                          <a:latin typeface="Arial"/>
+                        </a:rPr>
+                        <a:t>257.0</a:t>
+                      </a:r>
+                    </a:p>
+                  </a:txBody>
+                  <a:tcPr/>
+                </a:tc>
+                <a:tc>
+                  <a:txBody>
+                    <a:bodyPr/>
+                    <a:lstStyle/>
+                    <a:p>
+                      <a:pPr algn="l"/>
+                      <a:r>
+                        <a:rPr sz="1000" b="0" i="0">
+                          <a:solidFill>
+                            <a:srgbClr val="000000"/>
+                          </a:solidFill>
+                          <a:latin typeface="Arial"/>
+                        </a:rPr>
+                        <a:t>31.499103245204687</a:t>
+                      </a:r>
+                    </a:p>
+                  </a:txBody>
+                  <a:tcPr/>
+                </a:tc>
+                <a:tc>
+                  <a:txBody>
+                    <a:bodyPr/>
+                    <a:lstStyle/>
+                    <a:p>
+                      <a:pPr algn="l"/>
+                      <a:r>
+                        <a:rPr sz="1000" b="0" i="0">
+                          <a:solidFill>
+                            <a:srgbClr val="000000"/>
+                          </a:solidFill>
+                          <a:latin typeface="Arial"/>
+                        </a:rPr>
+                        <a:t>787.0</a:t>
+                      </a:r>
+                    </a:p>
+                  </a:txBody>
+                  <a:tcPr/>
+                </a:tc>
+                <a:tc>
+                  <a:txBody>
+                    <a:bodyPr/>
+                    <a:lstStyle/>
+                    <a:p>
+                      <a:pPr algn="l"/>
+                      <a:r>
+                        <a:rPr sz="1000" b="0" i="0">
+                          <a:solidFill>
+                            <a:srgbClr val="000000"/>
+                          </a:solidFill>
+                          <a:latin typeface="Arial"/>
+                        </a:rPr>
+                        <a:t>0.323943661971831</a:t>
+                      </a:r>
+                    </a:p>
+                  </a:txBody>
+                  <a:tcPr/>
+                </a:tc>
+              </a:tr>
+              <a:tr h="457200">
+                <a:tc>
+                  <a:txBody>
+                    <a:bodyPr/>
+                    <a:lstStyle/>
+                    <a:p>
+                      <a:pPr algn="ctr"/>
+                      <a:r>
+                        <a:rPr sz="1100" b="1">
+                          <a:solidFill>
+                            <a:srgbClr val="FFFFFF"/>
+                          </a:solidFill>
+                        </a:rPr>
+                        <a:t>Food</a:t>
+                      </a:r>
+                    </a:p>
+                  </a:txBody>
+                  <a:tcPr>
+                    <a:solidFill>
+                      <a:srgbClr val="5894FE"/>
+                    </a:solidFill>
+                  </a:tcPr>
+                </a:tc>
+                <a:tc>
+                  <a:txBody>
+                    <a:bodyPr/>
+                    <a:lstStyle/>
+                    <a:p>
+                      <a:pPr algn="l"/>
+                      <a:r>
+                        <a:rPr sz="1000" b="0" i="0">
+                          <a:solidFill>
+                            <a:srgbClr val="000000"/>
+                          </a:solidFill>
+                          <a:latin typeface="Arial"/>
+                        </a:rPr>
+                        <a:t>182.0</a:t>
+                      </a:r>
+                    </a:p>
+                  </a:txBody>
+                  <a:tcPr/>
+                </a:tc>
+                <a:tc>
+                  <a:txBody>
+                    <a:bodyPr/>
+                    <a:lstStyle/>
+                    <a:p>
+                      <a:pPr algn="l"/>
+                      <a:r>
+                        <a:rPr sz="1000" b="0" i="0">
+                          <a:solidFill>
+                            <a:srgbClr val="000000"/>
+                          </a:solidFill>
+                          <a:latin typeface="Arial"/>
+                        </a:rPr>
+                        <a:t>34.69747726487187</a:t>
+                      </a:r>
+                    </a:p>
+                  </a:txBody>
+                  <a:tcPr/>
+                </a:tc>
+                <a:tc>
+                  <a:txBody>
+                    <a:bodyPr/>
+                    <a:lstStyle/>
+                    <a:p>
+                      <a:pPr algn="l"/>
+                      <a:r>
+                        <a:rPr sz="1000" b="0" i="0">
+                          <a:solidFill>
+                            <a:srgbClr val="000000"/>
+                          </a:solidFill>
+                          <a:latin typeface="Arial"/>
+                        </a:rPr>
+                        <a:t>496.0</a:t>
+                      </a:r>
+                    </a:p>
+                  </a:txBody>
+                  <a:tcPr/>
+                </a:tc>
+                <a:tc>
+                  <a:txBody>
+                    <a:bodyPr/>
+                    <a:lstStyle/>
+                    <a:p>
+                      <a:pPr algn="l"/>
+                      <a:r>
+                        <a:rPr sz="1000" b="0" i="0">
+                          <a:solidFill>
+                            <a:srgbClr val="000000"/>
+                          </a:solidFill>
+                          <a:latin typeface="Arial"/>
+                        </a:rPr>
+                        <a:t>0.285</a:t>
+                      </a:r>
+                    </a:p>
+                  </a:txBody>
+                  <a:tcPr/>
+                </a:tc>
+              </a:tr>
+              <a:tr h="457200">
+                <a:tc>
+                  <a:txBody>
+                    <a:bodyPr/>
+                    <a:lstStyle/>
+                    <a:p>
+                      <a:pPr algn="ctr"/>
+                      <a:r>
+                        <a:rPr sz="1100" b="1">
+                          <a:solidFill>
+                            <a:srgbClr val="FFFFFF"/>
+                          </a:solidFill>
+                        </a:rPr>
+                        <a:t>Home</a:t>
+                      </a:r>
+                    </a:p>
+                  </a:txBody>
+                  <a:tcPr>
+                    <a:solidFill>
+                      <a:srgbClr val="5894FE"/>
+                    </a:solidFill>
+                  </a:tcPr>
+                </a:tc>
+                <a:tc>
+                  <a:txBody>
+                    <a:bodyPr/>
+                    <a:lstStyle/>
+                    <a:p>
+                      <a:pPr algn="l"/>
+                      <a:r>
+                        <a:rPr sz="1000" b="0" i="0">
+                          <a:solidFill>
+                            <a:srgbClr val="000000"/>
+                          </a:solidFill>
+                          <a:latin typeface="Arial"/>
+                        </a:rPr>
+                        <a:t>112.0</a:t>
+                      </a:r>
+                    </a:p>
+                  </a:txBody>
+                  <a:tcPr/>
+                </a:tc>
+                <a:tc>
+                  <a:txBody>
+                    <a:bodyPr/>
+                    <a:lstStyle/>
+                    <a:p>
+                      <a:pPr algn="l"/>
+                      <a:r>
+                        <a:rPr sz="1000" b="0" i="0">
+                          <a:solidFill>
+                            <a:srgbClr val="000000"/>
+                          </a:solidFill>
+                          <a:latin typeface="Arial"/>
+                        </a:rPr>
+                        <a:t>35.230800726828406</a:t>
+                      </a:r>
+                    </a:p>
+                  </a:txBody>
+                  <a:tcPr/>
+                </a:tc>
+                <a:tc>
+                  <a:txBody>
+                    <a:bodyPr/>
+                    <a:lstStyle/>
+                    <a:p>
+                      <a:pPr algn="l"/>
+                      <a:r>
+                        <a:rPr sz="1000" b="0" i="0">
+                          <a:solidFill>
+                            <a:srgbClr val="000000"/>
+                          </a:solidFill>
+                          <a:latin typeface="Arial"/>
+                        </a:rPr>
+                        <a:t>316.0</a:t>
+                      </a:r>
+                    </a:p>
+                  </a:txBody>
+                  <a:tcPr/>
+                </a:tc>
+                <a:tc>
+                  <a:txBody>
+                    <a:bodyPr/>
+                    <a:lstStyle/>
+                    <a:p>
+                      <a:pPr algn="l"/>
+                      <a:r>
+                        <a:rPr sz="1000" b="0" i="0">
+                          <a:solidFill>
+                            <a:srgbClr val="000000"/>
+                          </a:solidFill>
+                          <a:latin typeface="Arial"/>
+                        </a:rPr>
+                        <a:t>0.2773109243697479</a:t>
+                      </a:r>
+                    </a:p>
+                  </a:txBody>
+                  <a:tcPr/>
+                </a:tc>
+              </a:tr>
+            </a:tbl>
+          </a:graphicData>
+        </a:graphic>
+      </p:graphicFrame>
     </p:spTree>
   </p:cSld>
   <p:clrMapOvr>
@@ -3402,164 +4040,1395 @@
                 <a:latin typeface="Arial"/>
               </a:rPr>
               <a:t>
-Aggregation 1</a:t>
-            </a:r>
-          </a:p>
-        </p:txBody>
-      </p:sp>
-    </p:spTree>
-  </p:cSld>
-  <p:clrMapOvr>
-    <a:masterClrMapping/>
-  </p:clrMapOvr>
-</p:sld>
-</file>
-
-<file path=ppt/slides/slide3.xml><?xml version="1.0" encoding="utf-8"?>
-<p:sld xmlns:a="http://schemas.openxmlformats.org/drawingml/2006/main" xmlns:p="http://schemas.openxmlformats.org/presentationml/2006/main" xmlns:r="http://schemas.openxmlformats.org/officeDocument/2006/relationships">
-  <p:cSld>
-    <p:spTree>
-      <p:nvGrpSpPr>
-        <p:cNvPr id="1" name=""/>
-        <p:cNvGrpSpPr/>
-        <p:nvPr/>
-      </p:nvGrpSpPr>
-      <p:grpSpPr/>
-      <p:sp>
-        <p:nvSpPr>
-          <p:cNvPr id="2" name="Title 1"/>
-          <p:cNvSpPr>
-            <a:spLocks noGrp="1"/>
-          </p:cNvSpPr>
-          <p:nvPr>
-            <p:ph type="title"/>
-          </p:nvPr>
-        </p:nvSpPr>
-        <p:spPr/>
-        <p:txBody>
-          <a:bodyPr/>
-          <a:lstStyle/>
-          <a:p>
-            <a:pPr>
-              <a:defRPr sz="2400" b="1" i="0">
-                <a:latin typeface="Arial"/>
-              </a:defRPr>
-            </a:pPr>
-            <a:r>
-              <a:t>Data</a:t>
-            </a:r>
-            <a:r>
-              <a:rPr sz="1800" b="1" i="1">
-                <a:latin typeface="Arial"/>
-              </a:rPr>
-              <a:t>
-Aggregation 1</a:t>
-            </a:r>
-          </a:p>
-        </p:txBody>
-      </p:sp>
-    </p:spTree>
-  </p:cSld>
-  <p:clrMapOvr>
-    <a:masterClrMapping/>
-  </p:clrMapOvr>
-</p:sld>
-</file>
-
-<file path=ppt/slides/slide4.xml><?xml version="1.0" encoding="utf-8"?>
-<p:sld xmlns:a="http://schemas.openxmlformats.org/drawingml/2006/main" xmlns:p="http://schemas.openxmlformats.org/presentationml/2006/main" xmlns:r="http://schemas.openxmlformats.org/officeDocument/2006/relationships">
-  <p:cSld>
-    <p:spTree>
-      <p:nvGrpSpPr>
-        <p:cNvPr id="1" name=""/>
-        <p:cNvGrpSpPr/>
-        <p:nvPr/>
-      </p:nvGrpSpPr>
-      <p:grpSpPr/>
-      <p:sp>
-        <p:nvSpPr>
-          <p:cNvPr id="2" name="Title 1"/>
-          <p:cNvSpPr>
-            <a:spLocks noGrp="1"/>
-          </p:cNvSpPr>
-          <p:nvPr>
-            <p:ph type="title"/>
-          </p:nvPr>
-        </p:nvSpPr>
-        <p:spPr/>
-        <p:txBody>
-          <a:bodyPr/>
-          <a:lstStyle/>
-          <a:p>
-            <a:pPr>
-              <a:defRPr sz="2400" b="1" i="0">
-                <a:latin typeface="Arial"/>
-              </a:defRPr>
-            </a:pPr>
-            <a:r>
-              <a:t>Data</a:t>
-            </a:r>
-            <a:r>
-              <a:rPr sz="1800" b="1" i="1">
-                <a:latin typeface="Arial"/>
-              </a:rPr>
-              <a:t>
-Aggregation 1</a:t>
-            </a:r>
-          </a:p>
-        </p:txBody>
-      </p:sp>
-    </p:spTree>
-  </p:cSld>
-  <p:clrMapOvr>
-    <a:masterClrMapping/>
-  </p:clrMapOvr>
-</p:sld>
-</file>
-
-<file path=ppt/slides/slide5.xml><?xml version="1.0" encoding="utf-8"?>
-<p:sld xmlns:a="http://schemas.openxmlformats.org/drawingml/2006/main" xmlns:p="http://schemas.openxmlformats.org/presentationml/2006/main" xmlns:r="http://schemas.openxmlformats.org/officeDocument/2006/relationships">
-  <p:cSld>
-    <p:spTree>
-      <p:nvGrpSpPr>
-        <p:cNvPr id="1" name=""/>
-        <p:cNvGrpSpPr/>
-        <p:nvPr/>
-      </p:nvGrpSpPr>
-      <p:grpSpPr/>
-      <p:sp>
-        <p:nvSpPr>
-          <p:cNvPr id="2" name="Title 1"/>
-          <p:cNvSpPr>
-            <a:spLocks noGrp="1"/>
-          </p:cNvSpPr>
-          <p:nvPr>
-            <p:ph type="title"/>
-          </p:nvPr>
-        </p:nvSpPr>
-        <p:spPr/>
-        <p:txBody>
-          <a:bodyPr/>
-          <a:lstStyle/>
-          <a:p>
-            <a:pPr>
-              <a:defRPr sz="2400" b="1" i="0">
-                <a:latin typeface="Arial"/>
-              </a:defRPr>
-            </a:pPr>
-            <a:r>
-              <a:t>Data</a:t>
-            </a:r>
-            <a:r>
-              <a:rPr sz="1800" b="1" i="1">
-                <a:latin typeface="Arial"/>
-              </a:rPr>
-              <a:t>
-Aggregation 1</a:t>
-            </a:r>
-          </a:p>
-        </p:txBody>
-      </p:sp>
+Aggregation 2</a:t>
+            </a:r>
+          </a:p>
+        </p:txBody>
+      </p:sp>
+      <p:graphicFrame>
+        <p:nvGraphicFramePr>
+          <p:cNvPr id="3" name="Table 2"/>
+          <p:cNvGraphicFramePr>
+            <a:graphicFrameLocks noGrp="1"/>
+          </p:cNvGraphicFramePr>
+          <p:nvPr/>
+        </p:nvGraphicFramePr>
+        <p:xfrm>
+          <a:off x="457200" y="1371600"/>
+          <a:ext cx="7315200" cy="2743200"/>
+        </p:xfrm>
+        <a:graphic>
+          <a:graphicData uri="http://schemas.openxmlformats.org/drawingml/2006/table">
+            <a:tbl>
+              <a:tblPr firstRow="1" bandRow="1">
+                <a:tableStyleId>{5C22544A-7EE6-4342-B048-85BDC9FD1C3A}</a:tableStyleId>
+              </a:tblPr>
+              <a:tblGrid>
+                <a:gridCol w="1219200"/>
+                <a:gridCol w="1219200"/>
+                <a:gridCol w="1219200"/>
+                <a:gridCol w="1219200"/>
+                <a:gridCol w="1219200"/>
+                <a:gridCol w="1219200"/>
+              </a:tblGrid>
+              <a:tr h="249381">
+                <a:tc>
+                  <a:txBody>
+                    <a:bodyPr/>
+                    <a:lstStyle/>
+                    <a:p>
+                      <a:pPr algn="ctr"/>
+                      <a:r>
+                        <a:rPr sz="1100" b="1">
+                          <a:solidFill>
+                            <a:srgbClr val="FFFFFF"/>
+                          </a:solidFill>
+                        </a:rPr>
+                        <a:t>product_category</a:t>
+                      </a:r>
+                    </a:p>
+                  </a:txBody>
+                  <a:tcPr>
+                    <a:solidFill>
+                      <a:srgbClr val="4472C4"/>
+                    </a:solidFill>
+                  </a:tcPr>
+                </a:tc>
+                <a:tc>
+                  <a:txBody>
+                    <a:bodyPr/>
+                    <a:lstStyle/>
+                    <a:p>
+                      <a:pPr algn="ctr"/>
+                      <a:r>
+                        <a:rPr sz="1100" b="1">
+                          <a:solidFill>
+                            <a:srgbClr val="FFFFFF"/>
+                          </a:solidFill>
+                        </a:rPr>
+                        <a:t>is_discounted</a:t>
+                      </a:r>
+                    </a:p>
+                  </a:txBody>
+                  <a:tcPr>
+                    <a:solidFill>
+                      <a:srgbClr val="4472C4"/>
+                    </a:solidFill>
+                  </a:tcPr>
+                </a:tc>
+                <a:tc>
+                  <a:txBody>
+                    <a:bodyPr/>
+                    <a:lstStyle/>
+                    <a:p>
+                      <a:pPr algn="ctr"/>
+                      <a:r>
+                        <a:rPr sz="1100" b="1">
+                          <a:solidFill>
+                            <a:srgbClr val="FFFFFF"/>
+                          </a:solidFill>
+                        </a:rPr>
+                        <a:t>Customer Count</a:t>
+                      </a:r>
+                    </a:p>
+                  </a:txBody>
+                  <a:tcPr>
+                    <a:solidFill>
+                      <a:srgbClr val="4472C4"/>
+                    </a:solidFill>
+                  </a:tcPr>
+                </a:tc>
+                <a:tc>
+                  <a:txBody>
+                    <a:bodyPr/>
+                    <a:lstStyle/>
+                    <a:p>
+                      <a:pPr algn="ctr"/>
+                      <a:r>
+                        <a:rPr sz="1100" b="1">
+                          <a:solidFill>
+                            <a:srgbClr val="FFFFFF"/>
+                          </a:solidFill>
+                        </a:rPr>
+                        <a:t>Avg Price</a:t>
+                      </a:r>
+                    </a:p>
+                  </a:txBody>
+                  <a:tcPr>
+                    <a:solidFill>
+                      <a:srgbClr val="4472C4"/>
+                    </a:solidFill>
+                  </a:tcPr>
+                </a:tc>
+                <a:tc>
+                  <a:txBody>
+                    <a:bodyPr/>
+                    <a:lstStyle/>
+                    <a:p>
+                      <a:pPr algn="ctr"/>
+                      <a:r>
+                        <a:rPr sz="1100" b="1">
+                          <a:solidFill>
+                            <a:srgbClr val="FFFFFF"/>
+                          </a:solidFill>
+                        </a:rPr>
+                        <a:t>Total Quantity</a:t>
+                      </a:r>
+                    </a:p>
+                  </a:txBody>
+                  <a:tcPr>
+                    <a:solidFill>
+                      <a:srgbClr val="4472C4"/>
+                    </a:solidFill>
+                  </a:tcPr>
+                </a:tc>
+                <a:tc>
+                  <a:txBody>
+                    <a:bodyPr/>
+                    <a:lstStyle/>
+                    <a:p>
+                      <a:pPr algn="ctr"/>
+                      <a:r>
+                        <a:rPr sz="1100" b="1">
+                          <a:solidFill>
+                            <a:srgbClr val="FFFFFF"/>
+                          </a:solidFill>
+                        </a:rPr>
+                        <a:t>Discount Rate</a:t>
+                      </a:r>
+                    </a:p>
+                  </a:txBody>
+                  <a:tcPr>
+                    <a:solidFill>
+                      <a:srgbClr val="4472C4"/>
+                    </a:solidFill>
+                  </a:tcPr>
+                </a:tc>
+              </a:tr>
+              <a:tr h="249381">
+                <a:tc>
+                  <a:txBody>
+                    <a:bodyPr/>
+                    <a:lstStyle/>
+                    <a:p>
+                      <a:pPr algn="ctr"/>
+                      <a:r>
+                        <a:rPr sz="1100" b="1">
+                          <a:solidFill>
+                            <a:srgbClr val="FFFFFF"/>
+                          </a:solidFill>
+                        </a:rPr>
+                        <a:t>Books</a:t>
+                      </a:r>
+                    </a:p>
+                  </a:txBody>
+                  <a:tcPr>
+                    <a:solidFill>
+                      <a:srgbClr val="5894FE"/>
+                    </a:solidFill>
+                  </a:tcPr>
+                </a:tc>
+                <a:tc>
+                  <a:txBody>
+                    <a:bodyPr/>
+                    <a:lstStyle/>
+                    <a:p>
+                      <a:pPr algn="ctr"/>
+                      <a:r>
+                        <a:rPr sz="1100" b="1">
+                          <a:solidFill>
+                            <a:srgbClr val="FFFFFF"/>
+                          </a:solidFill>
+                        </a:rPr>
+                        <a:t>False</a:t>
+                      </a:r>
+                    </a:p>
+                  </a:txBody>
+                  <a:tcPr>
+                    <a:solidFill>
+                      <a:srgbClr val="5894FE"/>
+                    </a:solidFill>
+                  </a:tcPr>
+                </a:tc>
+                <a:tc>
+                  <a:txBody>
+                    <a:bodyPr/>
+                    <a:lstStyle/>
+                    <a:p>
+                      <a:pPr algn="l"/>
+                      <a:r>
+                        <a:rPr sz="1000" b="0" i="0">
+                          <a:solidFill>
+                            <a:srgbClr val="000000"/>
+                          </a:solidFill>
+                          <a:latin typeface="Arial"/>
+                        </a:rPr>
+                        <a:t>94.0</a:t>
+                      </a:r>
+                    </a:p>
+                  </a:txBody>
+                  <a:tcPr/>
+                </a:tc>
+                <a:tc>
+                  <a:txBody>
+                    <a:bodyPr/>
+                    <a:lstStyle/>
+                    <a:p>
+                      <a:pPr algn="l"/>
+                      <a:r>
+                        <a:rPr sz="1000" b="0" i="0">
+                          <a:solidFill>
+                            <a:srgbClr val="000000"/>
+                          </a:solidFill>
+                          <a:latin typeface="Arial"/>
+                        </a:rPr>
+                        <a:t>30.70765839482025</a:t>
+                      </a:r>
+                    </a:p>
+                  </a:txBody>
+                  <a:tcPr/>
+                </a:tc>
+                <a:tc>
+                  <a:txBody>
+                    <a:bodyPr/>
+                    <a:lstStyle/>
+                    <a:p>
+                      <a:pPr algn="l"/>
+                      <a:r>
+                        <a:rPr sz="1000" b="0" i="0">
+                          <a:solidFill>
+                            <a:srgbClr val="000000"/>
+                          </a:solidFill>
+                          <a:latin typeface="Arial"/>
+                        </a:rPr>
+                        <a:t>278.0</a:t>
+                      </a:r>
+                    </a:p>
+                  </a:txBody>
+                  <a:tcPr/>
+                </a:tc>
+                <a:tc>
+                  <a:txBody>
+                    <a:bodyPr/>
+                    <a:lstStyle/>
+                    <a:p>
+                      <a:pPr algn="l"/>
+                      <a:r>
+                        <a:rPr sz="1000" b="0" i="0">
+                          <a:solidFill>
+                            <a:srgbClr val="000000"/>
+                          </a:solidFill>
+                          <a:latin typeface="Arial"/>
+                        </a:rPr>
+                        <a:t>0.0</a:t>
+                      </a:r>
+                    </a:p>
+                  </a:txBody>
+                  <a:tcPr/>
+                </a:tc>
+              </a:tr>
+              <a:tr h="249381">
+                <a:tc>
+                  <a:txBody>
+                    <a:bodyPr/>
+                    <a:lstStyle/>
+                    <a:p>
+                      <a:pPr algn="ctr"/>
+                      <a:r>
+                        <a:rPr sz="1100" b="1">
+                          <a:solidFill>
+                            <a:srgbClr val="FFFFFF"/>
+                          </a:solidFill>
+                        </a:rPr>
+                        <a:t>Books</a:t>
+                      </a:r>
+                    </a:p>
+                  </a:txBody>
+                  <a:tcPr>
+                    <a:solidFill>
+                      <a:srgbClr val="5894FE"/>
+                    </a:solidFill>
+                  </a:tcPr>
+                </a:tc>
+                <a:tc>
+                  <a:txBody>
+                    <a:bodyPr/>
+                    <a:lstStyle/>
+                    <a:p>
+                      <a:pPr algn="ctr"/>
+                      <a:r>
+                        <a:rPr sz="1100" b="1">
+                          <a:solidFill>
+                            <a:srgbClr val="FFFFFF"/>
+                          </a:solidFill>
+                        </a:rPr>
+                        <a:t>True</a:t>
+                      </a:r>
+                    </a:p>
+                  </a:txBody>
+                  <a:tcPr>
+                    <a:solidFill>
+                      <a:srgbClr val="5894FE"/>
+                    </a:solidFill>
+                  </a:tcPr>
+                </a:tc>
+                <a:tc>
+                  <a:txBody>
+                    <a:bodyPr/>
+                    <a:lstStyle/>
+                    <a:p>
+                      <a:pPr algn="l"/>
+                      <a:r>
+                        <a:rPr sz="1000" b="0" i="0">
+                          <a:solidFill>
+                            <a:srgbClr val="000000"/>
+                          </a:solidFill>
+                          <a:latin typeface="Arial"/>
+                        </a:rPr>
+                        <a:t>40.0</a:t>
+                      </a:r>
+                    </a:p>
+                  </a:txBody>
+                  <a:tcPr/>
+                </a:tc>
+                <a:tc>
+                  <a:txBody>
+                    <a:bodyPr/>
+                    <a:lstStyle/>
+                    <a:p>
+                      <a:pPr algn="l"/>
+                      <a:r>
+                        <a:rPr sz="1000" b="0" i="0">
+                          <a:solidFill>
+                            <a:srgbClr val="000000"/>
+                          </a:solidFill>
+                          <a:latin typeface="Arial"/>
+                        </a:rPr>
+                        <a:t>33.133576093024644</a:t>
+                      </a:r>
+                    </a:p>
+                  </a:txBody>
+                  <a:tcPr/>
+                </a:tc>
+                <a:tc>
+                  <a:txBody>
+                    <a:bodyPr/>
+                    <a:lstStyle/>
+                    <a:p>
+                      <a:pPr algn="l"/>
+                      <a:r>
+                        <a:rPr sz="1000" b="0" i="0">
+                          <a:solidFill>
+                            <a:srgbClr val="000000"/>
+                          </a:solidFill>
+                          <a:latin typeface="Arial"/>
+                        </a:rPr>
+                        <a:t>107.0</a:t>
+                      </a:r>
+                    </a:p>
+                  </a:txBody>
+                  <a:tcPr/>
+                </a:tc>
+                <a:tc>
+                  <a:txBody>
+                    <a:bodyPr/>
+                    <a:lstStyle/>
+                    <a:p>
+                      <a:pPr algn="l"/>
+                      <a:r>
+                        <a:rPr sz="1000" b="0" i="0">
+                          <a:solidFill>
+                            <a:srgbClr val="000000"/>
+                          </a:solidFill>
+                          <a:latin typeface="Arial"/>
+                        </a:rPr>
+                        <a:t>1.0</a:t>
+                      </a:r>
+                    </a:p>
+                  </a:txBody>
+                  <a:tcPr/>
+                </a:tc>
+              </a:tr>
+              <a:tr h="249381">
+                <a:tc>
+                  <a:txBody>
+                    <a:bodyPr/>
+                    <a:lstStyle/>
+                    <a:p>
+                      <a:pPr algn="ctr"/>
+                      <a:r>
+                        <a:rPr sz="1100" b="1">
+                          <a:solidFill>
+                            <a:srgbClr val="FFFFFF"/>
+                          </a:solidFill>
+                        </a:rPr>
+                        <a:t>Clothing</a:t>
+                      </a:r>
+                    </a:p>
+                  </a:txBody>
+                  <a:tcPr>
+                    <a:solidFill>
+                      <a:srgbClr val="5894FE"/>
+                    </a:solidFill>
+                  </a:tcPr>
+                </a:tc>
+                <a:tc>
+                  <a:txBody>
+                    <a:bodyPr/>
+                    <a:lstStyle/>
+                    <a:p>
+                      <a:pPr algn="ctr"/>
+                      <a:r>
+                        <a:rPr sz="1100" b="1">
+                          <a:solidFill>
+                            <a:srgbClr val="FFFFFF"/>
+                          </a:solidFill>
+                        </a:rPr>
+                        <a:t>False</a:t>
+                      </a:r>
+                    </a:p>
+                  </a:txBody>
+                  <a:tcPr>
+                    <a:solidFill>
+                      <a:srgbClr val="5894FE"/>
+                    </a:solidFill>
+                  </a:tcPr>
+                </a:tc>
+                <a:tc>
+                  <a:txBody>
+                    <a:bodyPr/>
+                    <a:lstStyle/>
+                    <a:p>
+                      <a:pPr algn="l"/>
+                      <a:r>
+                        <a:rPr sz="1000" b="0" i="0">
+                          <a:solidFill>
+                            <a:srgbClr val="000000"/>
+                          </a:solidFill>
+                          <a:latin typeface="Arial"/>
+                        </a:rPr>
+                        <a:t>160.0</a:t>
+                      </a:r>
+                    </a:p>
+                  </a:txBody>
+                  <a:tcPr/>
+                </a:tc>
+                <a:tc>
+                  <a:txBody>
+                    <a:bodyPr/>
+                    <a:lstStyle/>
+                    <a:p>
+                      <a:pPr algn="l"/>
+                      <a:r>
+                        <a:rPr sz="1000" b="0" i="0">
+                          <a:solidFill>
+                            <a:srgbClr val="000000"/>
+                          </a:solidFill>
+                          <a:latin typeface="Arial"/>
+                        </a:rPr>
+                        <a:t>35.1385063451718</a:t>
+                      </a:r>
+                    </a:p>
+                  </a:txBody>
+                  <a:tcPr/>
+                </a:tc>
+                <a:tc>
+                  <a:txBody>
+                    <a:bodyPr/>
+                    <a:lstStyle/>
+                    <a:p>
+                      <a:pPr algn="l"/>
+                      <a:r>
+                        <a:rPr sz="1000" b="0" i="0">
+                          <a:solidFill>
+                            <a:srgbClr val="000000"/>
+                          </a:solidFill>
+                          <a:latin typeface="Arial"/>
+                        </a:rPr>
+                        <a:t>489.0</a:t>
+                      </a:r>
+                    </a:p>
+                  </a:txBody>
+                  <a:tcPr/>
+                </a:tc>
+                <a:tc>
+                  <a:txBody>
+                    <a:bodyPr/>
+                    <a:lstStyle/>
+                    <a:p>
+                      <a:pPr algn="l"/>
+                      <a:r>
+                        <a:rPr sz="1000" b="0" i="0">
+                          <a:solidFill>
+                            <a:srgbClr val="000000"/>
+                          </a:solidFill>
+                          <a:latin typeface="Arial"/>
+                        </a:rPr>
+                        <a:t>0.0</a:t>
+                      </a:r>
+                    </a:p>
+                  </a:txBody>
+                  <a:tcPr/>
+                </a:tc>
+              </a:tr>
+              <a:tr h="249381">
+                <a:tc>
+                  <a:txBody>
+                    <a:bodyPr/>
+                    <a:lstStyle/>
+                    <a:p>
+                      <a:pPr algn="ctr"/>
+                      <a:r>
+                        <a:rPr sz="1100" b="1">
+                          <a:solidFill>
+                            <a:srgbClr val="FFFFFF"/>
+                          </a:solidFill>
+                        </a:rPr>
+                        <a:t>Clothing</a:t>
+                      </a:r>
+                    </a:p>
+                  </a:txBody>
+                  <a:tcPr>
+                    <a:solidFill>
+                      <a:srgbClr val="5894FE"/>
+                    </a:solidFill>
+                  </a:tcPr>
+                </a:tc>
+                <a:tc>
+                  <a:txBody>
+                    <a:bodyPr/>
+                    <a:lstStyle/>
+                    <a:p>
+                      <a:pPr algn="ctr"/>
+                      <a:r>
+                        <a:rPr sz="1100" b="1">
+                          <a:solidFill>
+                            <a:srgbClr val="FFFFFF"/>
+                          </a:solidFill>
+                        </a:rPr>
+                        <a:t>True</a:t>
+                      </a:r>
+                    </a:p>
+                  </a:txBody>
+                  <a:tcPr>
+                    <a:solidFill>
+                      <a:srgbClr val="5894FE"/>
+                    </a:solidFill>
+                  </a:tcPr>
+                </a:tc>
+                <a:tc>
+                  <a:txBody>
+                    <a:bodyPr/>
+                    <a:lstStyle/>
+                    <a:p>
+                      <a:pPr algn="l"/>
+                      <a:r>
+                        <a:rPr sz="1000" b="0" i="0">
+                          <a:solidFill>
+                            <a:srgbClr val="000000"/>
+                          </a:solidFill>
+                          <a:latin typeface="Arial"/>
+                        </a:rPr>
+                        <a:t>81.0</a:t>
+                      </a:r>
+                    </a:p>
+                  </a:txBody>
+                  <a:tcPr/>
+                </a:tc>
+                <a:tc>
+                  <a:txBody>
+                    <a:bodyPr/>
+                    <a:lstStyle/>
+                    <a:p>
+                      <a:pPr algn="l"/>
+                      <a:r>
+                        <a:rPr sz="1000" b="0" i="0">
+                          <a:solidFill>
+                            <a:srgbClr val="000000"/>
+                          </a:solidFill>
+                          <a:latin typeface="Arial"/>
+                        </a:rPr>
+                        <a:t>33.77655325179327</a:t>
+                      </a:r>
+                    </a:p>
+                  </a:txBody>
+                  <a:tcPr/>
+                </a:tc>
+                <a:tc>
+                  <a:txBody>
+                    <a:bodyPr/>
+                    <a:lstStyle/>
+                    <a:p>
+                      <a:pPr algn="l"/>
+                      <a:r>
+                        <a:rPr sz="1000" b="0" i="0">
+                          <a:solidFill>
+                            <a:srgbClr val="000000"/>
+                          </a:solidFill>
+                          <a:latin typeface="Arial"/>
+                        </a:rPr>
+                        <a:t>213.0</a:t>
+                      </a:r>
+                    </a:p>
+                  </a:txBody>
+                  <a:tcPr/>
+                </a:tc>
+                <a:tc>
+                  <a:txBody>
+                    <a:bodyPr/>
+                    <a:lstStyle/>
+                    <a:p>
+                      <a:pPr algn="l"/>
+                      <a:r>
+                        <a:rPr sz="1000" b="0" i="0">
+                          <a:solidFill>
+                            <a:srgbClr val="000000"/>
+                          </a:solidFill>
+                          <a:latin typeface="Arial"/>
+                        </a:rPr>
+                        <a:t>1.0</a:t>
+                      </a:r>
+                    </a:p>
+                  </a:txBody>
+                  <a:tcPr/>
+                </a:tc>
+              </a:tr>
+              <a:tr h="249381">
+                <a:tc>
+                  <a:txBody>
+                    <a:bodyPr/>
+                    <a:lstStyle/>
+                    <a:p>
+                      <a:pPr algn="ctr"/>
+                      <a:r>
+                        <a:rPr sz="1100" b="1">
+                          <a:solidFill>
+                            <a:srgbClr val="FFFFFF"/>
+                          </a:solidFill>
+                        </a:rPr>
+                        <a:t>Electronics</a:t>
+                      </a:r>
+                    </a:p>
+                  </a:txBody>
+                  <a:tcPr>
+                    <a:solidFill>
+                      <a:srgbClr val="5894FE"/>
+                    </a:solidFill>
+                  </a:tcPr>
+                </a:tc>
+                <a:tc>
+                  <a:txBody>
+                    <a:bodyPr/>
+                    <a:lstStyle/>
+                    <a:p>
+                      <a:pPr algn="ctr"/>
+                      <a:r>
+                        <a:rPr sz="1100" b="1">
+                          <a:solidFill>
+                            <a:srgbClr val="FFFFFF"/>
+                          </a:solidFill>
+                        </a:rPr>
+                        <a:t>False</a:t>
+                      </a:r>
+                    </a:p>
+                  </a:txBody>
+                  <a:tcPr>
+                    <a:solidFill>
+                      <a:srgbClr val="5894FE"/>
+                    </a:solidFill>
+                  </a:tcPr>
+                </a:tc>
+                <a:tc>
+                  <a:txBody>
+                    <a:bodyPr/>
+                    <a:lstStyle/>
+                    <a:p>
+                      <a:pPr algn="l"/>
+                      <a:r>
+                        <a:rPr sz="1000" b="0" i="0">
+                          <a:solidFill>
+                            <a:srgbClr val="000000"/>
+                          </a:solidFill>
+                          <a:latin typeface="Arial"/>
+                        </a:rPr>
+                        <a:t>176.0</a:t>
+                      </a:r>
+                    </a:p>
+                  </a:txBody>
+                  <a:tcPr/>
+                </a:tc>
+                <a:tc>
+                  <a:txBody>
+                    <a:bodyPr/>
+                    <a:lstStyle/>
+                    <a:p>
+                      <a:pPr algn="l"/>
+                      <a:r>
+                        <a:rPr sz="1000" b="0" i="0">
+                          <a:solidFill>
+                            <a:srgbClr val="000000"/>
+                          </a:solidFill>
+                          <a:latin typeface="Arial"/>
+                        </a:rPr>
+                        <a:t>33.32441001911774</a:t>
+                      </a:r>
+                    </a:p>
+                  </a:txBody>
+                  <a:tcPr/>
+                </a:tc>
+                <a:tc>
+                  <a:txBody>
+                    <a:bodyPr/>
+                    <a:lstStyle/>
+                    <a:p>
+                      <a:pPr algn="l"/>
+                      <a:r>
+                        <a:rPr sz="1000" b="0" i="0">
+                          <a:solidFill>
+                            <a:srgbClr val="000000"/>
+                          </a:solidFill>
+                          <a:latin typeface="Arial"/>
+                        </a:rPr>
+                        <a:t>517.0</a:t>
+                      </a:r>
+                    </a:p>
+                  </a:txBody>
+                  <a:tcPr/>
+                </a:tc>
+                <a:tc>
+                  <a:txBody>
+                    <a:bodyPr/>
+                    <a:lstStyle/>
+                    <a:p>
+                      <a:pPr algn="l"/>
+                      <a:r>
+                        <a:rPr sz="1000" b="0" i="0">
+                          <a:solidFill>
+                            <a:srgbClr val="000000"/>
+                          </a:solidFill>
+                          <a:latin typeface="Arial"/>
+                        </a:rPr>
+                        <a:t>0.0</a:t>
+                      </a:r>
+                    </a:p>
+                  </a:txBody>
+                  <a:tcPr/>
+                </a:tc>
+              </a:tr>
+              <a:tr h="249381">
+                <a:tc>
+                  <a:txBody>
+                    <a:bodyPr/>
+                    <a:lstStyle/>
+                    <a:p>
+                      <a:pPr algn="ctr"/>
+                      <a:r>
+                        <a:rPr sz="1100" b="1">
+                          <a:solidFill>
+                            <a:srgbClr val="FFFFFF"/>
+                          </a:solidFill>
+                        </a:rPr>
+                        <a:t>Electronics</a:t>
+                      </a:r>
+                    </a:p>
+                  </a:txBody>
+                  <a:tcPr>
+                    <a:solidFill>
+                      <a:srgbClr val="5894FE"/>
+                    </a:solidFill>
+                  </a:tcPr>
+                </a:tc>
+                <a:tc>
+                  <a:txBody>
+                    <a:bodyPr/>
+                    <a:lstStyle/>
+                    <a:p>
+                      <a:pPr algn="ctr"/>
+                      <a:r>
+                        <a:rPr sz="1100" b="1">
+                          <a:solidFill>
+                            <a:srgbClr val="FFFFFF"/>
+                          </a:solidFill>
+                        </a:rPr>
+                        <a:t>True</a:t>
+                      </a:r>
+                    </a:p>
+                  </a:txBody>
+                  <a:tcPr>
+                    <a:solidFill>
+                      <a:srgbClr val="5894FE"/>
+                    </a:solidFill>
+                  </a:tcPr>
+                </a:tc>
+                <a:tc>
+                  <a:txBody>
+                    <a:bodyPr/>
+                    <a:lstStyle/>
+                    <a:p>
+                      <a:pPr algn="l"/>
+                      <a:r>
+                        <a:rPr sz="1000" b="0" i="0">
+                          <a:solidFill>
+                            <a:srgbClr val="000000"/>
+                          </a:solidFill>
+                          <a:latin typeface="Arial"/>
+                        </a:rPr>
+                        <a:t>91.0</a:t>
+                      </a:r>
+                    </a:p>
+                  </a:txBody>
+                  <a:tcPr/>
+                </a:tc>
+                <a:tc>
+                  <a:txBody>
+                    <a:bodyPr/>
+                    <a:lstStyle/>
+                    <a:p>
+                      <a:pPr algn="l"/>
+                      <a:r>
+                        <a:rPr sz="1000" b="0" i="0">
+                          <a:solidFill>
+                            <a:srgbClr val="000000"/>
+                          </a:solidFill>
+                          <a:latin typeface="Arial"/>
+                        </a:rPr>
+                        <a:t>27.689767369212237</a:t>
+                      </a:r>
+                    </a:p>
+                  </a:txBody>
+                  <a:tcPr/>
+                </a:tc>
+                <a:tc>
+                  <a:txBody>
+                    <a:bodyPr/>
+                    <a:lstStyle/>
+                    <a:p>
+                      <a:pPr algn="l"/>
+                      <a:r>
+                        <a:rPr sz="1000" b="0" i="0">
+                          <a:solidFill>
+                            <a:srgbClr val="000000"/>
+                          </a:solidFill>
+                          <a:latin typeface="Arial"/>
+                        </a:rPr>
+                        <a:t>270.0</a:t>
+                      </a:r>
+                    </a:p>
+                  </a:txBody>
+                  <a:tcPr/>
+                </a:tc>
+                <a:tc>
+                  <a:txBody>
+                    <a:bodyPr/>
+                    <a:lstStyle/>
+                    <a:p>
+                      <a:pPr algn="l"/>
+                      <a:r>
+                        <a:rPr sz="1000" b="0" i="0">
+                          <a:solidFill>
+                            <a:srgbClr val="000000"/>
+                          </a:solidFill>
+                          <a:latin typeface="Arial"/>
+                        </a:rPr>
+                        <a:t>1.0</a:t>
+                      </a:r>
+                    </a:p>
+                  </a:txBody>
+                  <a:tcPr/>
+                </a:tc>
+              </a:tr>
+              <a:tr h="249381">
+                <a:tc>
+                  <a:txBody>
+                    <a:bodyPr/>
+                    <a:lstStyle/>
+                    <a:p>
+                      <a:pPr algn="ctr"/>
+                      <a:r>
+                        <a:rPr sz="1100" b="1">
+                          <a:solidFill>
+                            <a:srgbClr val="FFFFFF"/>
+                          </a:solidFill>
+                        </a:rPr>
+                        <a:t>Food</a:t>
+                      </a:r>
+                    </a:p>
+                  </a:txBody>
+                  <a:tcPr>
+                    <a:solidFill>
+                      <a:srgbClr val="5894FE"/>
+                    </a:solidFill>
+                  </a:tcPr>
+                </a:tc>
+                <a:tc>
+                  <a:txBody>
+                    <a:bodyPr/>
+                    <a:lstStyle/>
+                    <a:p>
+                      <a:pPr algn="ctr"/>
+                      <a:r>
+                        <a:rPr sz="1100" b="1">
+                          <a:solidFill>
+                            <a:srgbClr val="FFFFFF"/>
+                          </a:solidFill>
+                        </a:rPr>
+                        <a:t>False</a:t>
+                      </a:r>
+                    </a:p>
+                  </a:txBody>
+                  <a:tcPr>
+                    <a:solidFill>
+                      <a:srgbClr val="5894FE"/>
+                    </a:solidFill>
+                  </a:tcPr>
+                </a:tc>
+                <a:tc>
+                  <a:txBody>
+                    <a:bodyPr/>
+                    <a:lstStyle/>
+                    <a:p>
+                      <a:pPr algn="l"/>
+                      <a:r>
+                        <a:rPr sz="1000" b="0" i="0">
+                          <a:solidFill>
+                            <a:srgbClr val="000000"/>
+                          </a:solidFill>
+                          <a:latin typeface="Arial"/>
+                        </a:rPr>
+                        <a:t>129.0</a:t>
+                      </a:r>
+                    </a:p>
+                  </a:txBody>
+                  <a:tcPr/>
+                </a:tc>
+                <a:tc>
+                  <a:txBody>
+                    <a:bodyPr/>
+                    <a:lstStyle/>
+                    <a:p>
+                      <a:pPr algn="l"/>
+                      <a:r>
+                        <a:rPr sz="1000" b="0" i="0">
+                          <a:solidFill>
+                            <a:srgbClr val="000000"/>
+                          </a:solidFill>
+                          <a:latin typeface="Arial"/>
+                        </a:rPr>
+                        <a:t>35.51108001708958</a:t>
+                      </a:r>
+                    </a:p>
+                  </a:txBody>
+                  <a:tcPr/>
+                </a:tc>
+                <a:tc>
+                  <a:txBody>
+                    <a:bodyPr/>
+                    <a:lstStyle/>
+                    <a:p>
+                      <a:pPr algn="l"/>
+                      <a:r>
+                        <a:rPr sz="1000" b="0" i="0">
+                          <a:solidFill>
+                            <a:srgbClr val="000000"/>
+                          </a:solidFill>
+                          <a:latin typeface="Arial"/>
+                        </a:rPr>
+                        <a:t>366.0</a:t>
+                      </a:r>
+                    </a:p>
+                  </a:txBody>
+                  <a:tcPr/>
+                </a:tc>
+                <a:tc>
+                  <a:txBody>
+                    <a:bodyPr/>
+                    <a:lstStyle/>
+                    <a:p>
+                      <a:pPr algn="l"/>
+                      <a:r>
+                        <a:rPr sz="1000" b="0" i="0">
+                          <a:solidFill>
+                            <a:srgbClr val="000000"/>
+                          </a:solidFill>
+                          <a:latin typeface="Arial"/>
+                        </a:rPr>
+                        <a:t>0.0</a:t>
+                      </a:r>
+                    </a:p>
+                  </a:txBody>
+                  <a:tcPr/>
+                </a:tc>
+              </a:tr>
+              <a:tr h="249381">
+                <a:tc>
+                  <a:txBody>
+                    <a:bodyPr/>
+                    <a:lstStyle/>
+                    <a:p>
+                      <a:pPr algn="ctr"/>
+                      <a:r>
+                        <a:rPr sz="1100" b="1">
+                          <a:solidFill>
+                            <a:srgbClr val="FFFFFF"/>
+                          </a:solidFill>
+                        </a:rPr>
+                        <a:t>Food</a:t>
+                      </a:r>
+                    </a:p>
+                  </a:txBody>
+                  <a:tcPr>
+                    <a:solidFill>
+                      <a:srgbClr val="5894FE"/>
+                    </a:solidFill>
+                  </a:tcPr>
+                </a:tc>
+                <a:tc>
+                  <a:txBody>
+                    <a:bodyPr/>
+                    <a:lstStyle/>
+                    <a:p>
+                      <a:pPr algn="ctr"/>
+                      <a:r>
+                        <a:rPr sz="1100" b="1">
+                          <a:solidFill>
+                            <a:srgbClr val="FFFFFF"/>
+                          </a:solidFill>
+                        </a:rPr>
+                        <a:t>True</a:t>
+                      </a:r>
+                    </a:p>
+                  </a:txBody>
+                  <a:tcPr>
+                    <a:solidFill>
+                      <a:srgbClr val="5894FE"/>
+                    </a:solidFill>
+                  </a:tcPr>
+                </a:tc>
+                <a:tc>
+                  <a:txBody>
+                    <a:bodyPr/>
+                    <a:lstStyle/>
+                    <a:p>
+                      <a:pPr algn="l"/>
+                      <a:r>
+                        <a:rPr sz="1000" b="0" i="0">
+                          <a:solidFill>
+                            <a:srgbClr val="000000"/>
+                          </a:solidFill>
+                          <a:latin typeface="Arial"/>
+                        </a:rPr>
+                        <a:t>57.0</a:t>
+                      </a:r>
+                    </a:p>
+                  </a:txBody>
+                  <a:tcPr/>
+                </a:tc>
+                <a:tc>
+                  <a:txBody>
+                    <a:bodyPr/>
+                    <a:lstStyle/>
+                    <a:p>
+                      <a:pPr algn="l"/>
+                      <a:r>
+                        <a:rPr sz="1000" b="0" i="0">
+                          <a:solidFill>
+                            <a:srgbClr val="000000"/>
+                          </a:solidFill>
+                          <a:latin typeface="Arial"/>
+                        </a:rPr>
+                        <a:t>32.656333518080054</a:t>
+                      </a:r>
+                    </a:p>
+                  </a:txBody>
+                  <a:tcPr/>
+                </a:tc>
+                <a:tc>
+                  <a:txBody>
+                    <a:bodyPr/>
+                    <a:lstStyle/>
+                    <a:p>
+                      <a:pPr algn="l"/>
+                      <a:r>
+                        <a:rPr sz="1000" b="0" i="0">
+                          <a:solidFill>
+                            <a:srgbClr val="000000"/>
+                          </a:solidFill>
+                          <a:latin typeface="Arial"/>
+                        </a:rPr>
+                        <a:t>130.0</a:t>
+                      </a:r>
+                    </a:p>
+                  </a:txBody>
+                  <a:tcPr/>
+                </a:tc>
+                <a:tc>
+                  <a:txBody>
+                    <a:bodyPr/>
+                    <a:lstStyle/>
+                    <a:p>
+                      <a:pPr algn="l"/>
+                      <a:r>
+                        <a:rPr sz="1000" b="0" i="0">
+                          <a:solidFill>
+                            <a:srgbClr val="000000"/>
+                          </a:solidFill>
+                          <a:latin typeface="Arial"/>
+                        </a:rPr>
+                        <a:t>1.0</a:t>
+                      </a:r>
+                    </a:p>
+                  </a:txBody>
+                  <a:tcPr/>
+                </a:tc>
+              </a:tr>
+              <a:tr h="249381">
+                <a:tc>
+                  <a:txBody>
+                    <a:bodyPr/>
+                    <a:lstStyle/>
+                    <a:p>
+                      <a:pPr algn="ctr"/>
+                      <a:r>
+                        <a:rPr sz="1100" b="1">
+                          <a:solidFill>
+                            <a:srgbClr val="FFFFFF"/>
+                          </a:solidFill>
+                        </a:rPr>
+                        <a:t>Home</a:t>
+                      </a:r>
+                    </a:p>
+                  </a:txBody>
+                  <a:tcPr>
+                    <a:solidFill>
+                      <a:srgbClr val="5894FE"/>
+                    </a:solidFill>
+                  </a:tcPr>
+                </a:tc>
+                <a:tc>
+                  <a:txBody>
+                    <a:bodyPr/>
+                    <a:lstStyle/>
+                    <a:p>
+                      <a:pPr algn="ctr"/>
+                      <a:r>
+                        <a:rPr sz="1100" b="1">
+                          <a:solidFill>
+                            <a:srgbClr val="FFFFFF"/>
+                          </a:solidFill>
+                        </a:rPr>
+                        <a:t>False</a:t>
+                      </a:r>
+                    </a:p>
+                  </a:txBody>
+                  <a:tcPr>
+                    <a:solidFill>
+                      <a:srgbClr val="5894FE"/>
+                    </a:solidFill>
+                  </a:tcPr>
+                </a:tc>
+                <a:tc>
+                  <a:txBody>
+                    <a:bodyPr/>
+                    <a:lstStyle/>
+                    <a:p>
+                      <a:pPr algn="l"/>
+                      <a:r>
+                        <a:rPr sz="1000" b="0" i="0">
+                          <a:solidFill>
+                            <a:srgbClr val="000000"/>
+                          </a:solidFill>
+                          <a:latin typeface="Arial"/>
+                        </a:rPr>
+                        <a:t>81.0</a:t>
+                      </a:r>
+                    </a:p>
+                  </a:txBody>
+                  <a:tcPr/>
+                </a:tc>
+                <a:tc>
+                  <a:txBody>
+                    <a:bodyPr/>
+                    <a:lstStyle/>
+                    <a:p>
+                      <a:pPr algn="l"/>
+                      <a:r>
+                        <a:rPr sz="1000" b="0" i="0">
+                          <a:solidFill>
+                            <a:srgbClr val="000000"/>
+                          </a:solidFill>
+                          <a:latin typeface="Arial"/>
+                        </a:rPr>
+                        <a:t>32.07742336225645</a:t>
+                      </a:r>
+                    </a:p>
+                  </a:txBody>
+                  <a:tcPr/>
+                </a:tc>
+                <a:tc>
+                  <a:txBody>
+                    <a:bodyPr/>
+                    <a:lstStyle/>
+                    <a:p>
+                      <a:pPr algn="l"/>
+                      <a:r>
+                        <a:rPr sz="1000" b="0" i="0">
+                          <a:solidFill>
+                            <a:srgbClr val="000000"/>
+                          </a:solidFill>
+                          <a:latin typeface="Arial"/>
+                        </a:rPr>
+                        <a:t>232.0</a:t>
+                      </a:r>
+                    </a:p>
+                  </a:txBody>
+                  <a:tcPr/>
+                </a:tc>
+                <a:tc>
+                  <a:txBody>
+                    <a:bodyPr/>
+                    <a:lstStyle/>
+                    <a:p>
+                      <a:pPr algn="l"/>
+                      <a:r>
+                        <a:rPr sz="1000" b="0" i="0">
+                          <a:solidFill>
+                            <a:srgbClr val="000000"/>
+                          </a:solidFill>
+                          <a:latin typeface="Arial"/>
+                        </a:rPr>
+                        <a:t>0.0</a:t>
+                      </a:r>
+                    </a:p>
+                  </a:txBody>
+                  <a:tcPr/>
+                </a:tc>
+              </a:tr>
+              <a:tr h="249390">
+                <a:tc>
+                  <a:txBody>
+                    <a:bodyPr/>
+                    <a:lstStyle/>
+                    <a:p>
+                      <a:pPr algn="ctr"/>
+                      <a:r>
+                        <a:rPr sz="1100" b="1">
+                          <a:solidFill>
+                            <a:srgbClr val="FFFFFF"/>
+                          </a:solidFill>
+                        </a:rPr>
+                        <a:t>Home</a:t>
+                      </a:r>
+                    </a:p>
+                  </a:txBody>
+                  <a:tcPr>
+                    <a:solidFill>
+                      <a:srgbClr val="5894FE"/>
+                    </a:solidFill>
+                  </a:tcPr>
+                </a:tc>
+                <a:tc>
+                  <a:txBody>
+                    <a:bodyPr/>
+                    <a:lstStyle/>
+                    <a:p>
+                      <a:pPr algn="ctr"/>
+                      <a:r>
+                        <a:rPr sz="1100" b="1">
+                          <a:solidFill>
+                            <a:srgbClr val="FFFFFF"/>
+                          </a:solidFill>
+                        </a:rPr>
+                        <a:t>True</a:t>
+                      </a:r>
+                    </a:p>
+                  </a:txBody>
+                  <a:tcPr>
+                    <a:solidFill>
+                      <a:srgbClr val="5894FE"/>
+                    </a:solidFill>
+                  </a:tcPr>
+                </a:tc>
+                <a:tc>
+                  <a:txBody>
+                    <a:bodyPr/>
+                    <a:lstStyle/>
+                    <a:p>
+                      <a:pPr algn="l"/>
+                      <a:r>
+                        <a:rPr sz="1000" b="0" i="0">
+                          <a:solidFill>
+                            <a:srgbClr val="000000"/>
+                          </a:solidFill>
+                          <a:latin typeface="Arial"/>
+                        </a:rPr>
+                        <a:t>31.0</a:t>
+                      </a:r>
+                    </a:p>
+                  </a:txBody>
+                  <a:tcPr/>
+                </a:tc>
+                <a:tc>
+                  <a:txBody>
+                    <a:bodyPr/>
+                    <a:lstStyle/>
+                    <a:p>
+                      <a:pPr algn="l"/>
+                      <a:r>
+                        <a:rPr sz="1000" b="0" i="0">
+                          <a:solidFill>
+                            <a:srgbClr val="000000"/>
+                          </a:solidFill>
+                          <a:latin typeface="Arial"/>
+                        </a:rPr>
+                        <a:t>43.448693252682595</a:t>
+                      </a:r>
+                    </a:p>
+                  </a:txBody>
+                  <a:tcPr/>
+                </a:tc>
+                <a:tc>
+                  <a:txBody>
+                    <a:bodyPr/>
+                    <a:lstStyle/>
+                    <a:p>
+                      <a:pPr algn="l"/>
+                      <a:r>
+                        <a:rPr sz="1000" b="0" i="0">
+                          <a:solidFill>
+                            <a:srgbClr val="000000"/>
+                          </a:solidFill>
+                          <a:latin typeface="Arial"/>
+                        </a:rPr>
+                        <a:t>84.0</a:t>
+                      </a:r>
+                    </a:p>
+                  </a:txBody>
+                  <a:tcPr/>
+                </a:tc>
+                <a:tc>
+                  <a:txBody>
+                    <a:bodyPr/>
+                    <a:lstStyle/>
+                    <a:p>
+                      <a:pPr algn="l"/>
+                      <a:r>
+                        <a:rPr sz="1000" b="0" i="0">
+                          <a:solidFill>
+                            <a:srgbClr val="000000"/>
+                          </a:solidFill>
+                          <a:latin typeface="Arial"/>
+                        </a:rPr>
+                        <a:t>1.0</a:t>
+                      </a:r>
+                    </a:p>
+                  </a:txBody>
+                  <a:tcPr/>
+                </a:tc>
+              </a:tr>
+            </a:tbl>
+          </a:graphicData>
+        </a:graphic>
+      </p:graphicFrame>
     </p:spTree>
   </p:cSld>
   <p:clrMapOvr>

</xml_diff>

<commit_message>
Update alignment and font settings in presentation configuration
</commit_message>
<xml_diff>
--- a/test.pptx
+++ b/test.pptx
@@ -3344,7 +3344,7 @@
               <a:t>Data</a:t>
             </a:r>
             <a:r>
-              <a:rPr sz="1800" b="1" i="1">
+              <a:rPr sz="1600" b="0" i="1">
                 <a:latin typeface="Arial"/>
               </a:rPr>
               <a:t>
@@ -3384,108 +3384,108 @@
                     <a:bodyPr/>
                     <a:lstStyle/>
                     <a:p>
-                      <a:pPr algn="ctr"/>
                       <a:r>
                         <a:rPr sz="1100" b="1">
                           <a:solidFill>
-                            <a:srgbClr val="FFFFFF"/>
-                          </a:solidFill>
+                            <a:srgbClr val="000000"/>
+                          </a:solidFill>
+                          <a:latin typeface="Arial"/>
                         </a:rPr>
                         <a:t>product_category</a:t>
                       </a:r>
                     </a:p>
                   </a:txBody>
-                  <a:tcPr>
-                    <a:solidFill>
-                      <a:srgbClr val="4472C4"/>
-                    </a:solidFill>
-                  </a:tcPr>
-                </a:tc>
-                <a:tc>
-                  <a:txBody>
-                    <a:bodyPr/>
-                    <a:lstStyle/>
-                    <a:p>
-                      <a:pPr algn="ctr"/>
+                  <a:tcPr anchor="ctr">
+                    <a:solidFill>
+                      <a:srgbClr val="FFFFFF"/>
+                    </a:solidFill>
+                  </a:tcPr>
+                </a:tc>
+                <a:tc>
+                  <a:txBody>
+                    <a:bodyPr/>
+                    <a:lstStyle/>
+                    <a:p>
                       <a:r>
                         <a:rPr sz="1100" b="1">
                           <a:solidFill>
-                            <a:srgbClr val="FFFFFF"/>
-                          </a:solidFill>
+                            <a:srgbClr val="000000"/>
+                          </a:solidFill>
+                          <a:latin typeface="Arial"/>
                         </a:rPr>
                         <a:t>Customer Count</a:t>
                       </a:r>
                     </a:p>
                   </a:txBody>
-                  <a:tcPr>
-                    <a:solidFill>
-                      <a:srgbClr val="4472C4"/>
-                    </a:solidFill>
-                  </a:tcPr>
-                </a:tc>
-                <a:tc>
-                  <a:txBody>
-                    <a:bodyPr/>
-                    <a:lstStyle/>
-                    <a:p>
-                      <a:pPr algn="ctr"/>
+                  <a:tcPr anchor="ctr">
+                    <a:solidFill>
+                      <a:srgbClr val="FFFFFF"/>
+                    </a:solidFill>
+                  </a:tcPr>
+                </a:tc>
+                <a:tc>
+                  <a:txBody>
+                    <a:bodyPr/>
+                    <a:lstStyle/>
+                    <a:p>
                       <a:r>
                         <a:rPr sz="1100" b="1">
                           <a:solidFill>
-                            <a:srgbClr val="FFFFFF"/>
-                          </a:solidFill>
+                            <a:srgbClr val="000000"/>
+                          </a:solidFill>
+                          <a:latin typeface="Arial"/>
                         </a:rPr>
                         <a:t>Avg Price</a:t>
                       </a:r>
                     </a:p>
                   </a:txBody>
-                  <a:tcPr>
-                    <a:solidFill>
-                      <a:srgbClr val="4472C4"/>
-                    </a:solidFill>
-                  </a:tcPr>
-                </a:tc>
-                <a:tc>
-                  <a:txBody>
-                    <a:bodyPr/>
-                    <a:lstStyle/>
-                    <a:p>
-                      <a:pPr algn="ctr"/>
+                  <a:tcPr anchor="ctr">
+                    <a:solidFill>
+                      <a:srgbClr val="FFFFFF"/>
+                    </a:solidFill>
+                  </a:tcPr>
+                </a:tc>
+                <a:tc>
+                  <a:txBody>
+                    <a:bodyPr/>
+                    <a:lstStyle/>
+                    <a:p>
                       <a:r>
                         <a:rPr sz="1100" b="1">
                           <a:solidFill>
-                            <a:srgbClr val="FFFFFF"/>
-                          </a:solidFill>
+                            <a:srgbClr val="000000"/>
+                          </a:solidFill>
+                          <a:latin typeface="Arial"/>
                         </a:rPr>
                         <a:t>Total Quantity</a:t>
                       </a:r>
                     </a:p>
                   </a:txBody>
-                  <a:tcPr>
-                    <a:solidFill>
-                      <a:srgbClr val="4472C4"/>
-                    </a:solidFill>
-                  </a:tcPr>
-                </a:tc>
-                <a:tc>
-                  <a:txBody>
-                    <a:bodyPr/>
-                    <a:lstStyle/>
-                    <a:p>
-                      <a:pPr algn="ctr"/>
+                  <a:tcPr anchor="ctr">
+                    <a:solidFill>
+                      <a:srgbClr val="FFFFFF"/>
+                    </a:solidFill>
+                  </a:tcPr>
+                </a:tc>
+                <a:tc>
+                  <a:txBody>
+                    <a:bodyPr/>
+                    <a:lstStyle/>
+                    <a:p>
                       <a:r>
                         <a:rPr sz="1100" b="1">
                           <a:solidFill>
-                            <a:srgbClr val="FFFFFF"/>
-                          </a:solidFill>
+                            <a:srgbClr val="000000"/>
+                          </a:solidFill>
+                          <a:latin typeface="Arial"/>
                         </a:rPr>
                         <a:t>Discount Rate</a:t>
                       </a:r>
                     </a:p>
                   </a:txBody>
-                  <a:tcPr>
-                    <a:solidFill>
-                      <a:srgbClr val="4472C4"/>
+                  <a:tcPr anchor="ctr">
+                    <a:solidFill>
+                      <a:srgbClr val="FFFFFF"/>
                     </a:solidFill>
                   </a:tcPr>
                 </a:tc>
@@ -3496,31 +3496,30 @@
                     <a:bodyPr/>
                     <a:lstStyle/>
                     <a:p>
-                      <a:pPr algn="ctr"/>
                       <a:r>
                         <a:rPr sz="1100" b="1">
                           <a:solidFill>
-                            <a:srgbClr val="FFFFFF"/>
-                          </a:solidFill>
+                            <a:srgbClr val="000000"/>
+                          </a:solidFill>
+                          <a:latin typeface="Arial"/>
                         </a:rPr>
                         <a:t>Books</a:t>
                       </a:r>
                     </a:p>
                   </a:txBody>
-                  <a:tcPr>
-                    <a:solidFill>
-                      <a:srgbClr val="5894FE"/>
-                    </a:solidFill>
-                  </a:tcPr>
-                </a:tc>
-                <a:tc>
-                  <a:txBody>
-                    <a:bodyPr/>
-                    <a:lstStyle/>
-                    <a:p>
-                      <a:pPr algn="l"/>
-                      <a:r>
-                        <a:rPr sz="1000" b="0" i="0">
+                  <a:tcPr anchor="ctr">
+                    <a:solidFill>
+                      <a:srgbClr val="FFFFFF"/>
+                    </a:solidFill>
+                  </a:tcPr>
+                </a:tc>
+                <a:tc>
+                  <a:txBody>
+                    <a:bodyPr/>
+                    <a:lstStyle/>
+                    <a:p>
+                      <a:r>
+                        <a:rPr sz="1100" b="0">
                           <a:solidFill>
                             <a:srgbClr val="000000"/>
                           </a:solidFill>
@@ -3530,16 +3529,19 @@
                       </a:r>
                     </a:p>
                   </a:txBody>
-                  <a:tcPr/>
-                </a:tc>
-                <a:tc>
-                  <a:txBody>
-                    <a:bodyPr/>
-                    <a:lstStyle/>
-                    <a:p>
-                      <a:pPr algn="l"/>
-                      <a:r>
-                        <a:rPr sz="1000" b="0" i="0">
+                  <a:tcPr>
+                    <a:solidFill>
+                      <a:srgbClr val="FFFFFF"/>
+                    </a:solidFill>
+                  </a:tcPr>
+                </a:tc>
+                <a:tc>
+                  <a:txBody>
+                    <a:bodyPr/>
+                    <a:lstStyle/>
+                    <a:p>
+                      <a:r>
+                        <a:rPr sz="1100" b="0">
                           <a:solidFill>
                             <a:srgbClr val="000000"/>
                           </a:solidFill>
@@ -3549,16 +3551,19 @@
                       </a:r>
                     </a:p>
                   </a:txBody>
-                  <a:tcPr/>
-                </a:tc>
-                <a:tc>
-                  <a:txBody>
-                    <a:bodyPr/>
-                    <a:lstStyle/>
-                    <a:p>
-                      <a:pPr algn="l"/>
-                      <a:r>
-                        <a:rPr sz="1000" b="0" i="0">
+                  <a:tcPr>
+                    <a:solidFill>
+                      <a:srgbClr val="FFFFFF"/>
+                    </a:solidFill>
+                  </a:tcPr>
+                </a:tc>
+                <a:tc>
+                  <a:txBody>
+                    <a:bodyPr/>
+                    <a:lstStyle/>
+                    <a:p>
+                      <a:r>
+                        <a:rPr sz="1100" b="0">
                           <a:solidFill>
                             <a:srgbClr val="000000"/>
                           </a:solidFill>
@@ -3568,16 +3573,19 @@
                       </a:r>
                     </a:p>
                   </a:txBody>
-                  <a:tcPr/>
-                </a:tc>
-                <a:tc>
-                  <a:txBody>
-                    <a:bodyPr/>
-                    <a:lstStyle/>
-                    <a:p>
-                      <a:pPr algn="l"/>
-                      <a:r>
-                        <a:rPr sz="1000" b="0" i="0">
+                  <a:tcPr>
+                    <a:solidFill>
+                      <a:srgbClr val="FFFFFF"/>
+                    </a:solidFill>
+                  </a:tcPr>
+                </a:tc>
+                <a:tc>
+                  <a:txBody>
+                    <a:bodyPr/>
+                    <a:lstStyle/>
+                    <a:p>
+                      <a:r>
+                        <a:rPr sz="1100" b="0">
                           <a:solidFill>
                             <a:srgbClr val="000000"/>
                           </a:solidFill>
@@ -3587,7 +3595,11 @@
                       </a:r>
                     </a:p>
                   </a:txBody>
-                  <a:tcPr/>
+                  <a:tcPr>
+                    <a:solidFill>
+                      <a:srgbClr val="FFFFFF"/>
+                    </a:solidFill>
+                  </a:tcPr>
                 </a:tc>
               </a:tr>
               <a:tr h="457200">
@@ -3596,31 +3608,30 @@
                     <a:bodyPr/>
                     <a:lstStyle/>
                     <a:p>
-                      <a:pPr algn="ctr"/>
                       <a:r>
                         <a:rPr sz="1100" b="1">
                           <a:solidFill>
-                            <a:srgbClr val="FFFFFF"/>
-                          </a:solidFill>
+                            <a:srgbClr val="000000"/>
+                          </a:solidFill>
+                          <a:latin typeface="Arial"/>
                         </a:rPr>
                         <a:t>Clothing</a:t>
                       </a:r>
                     </a:p>
                   </a:txBody>
-                  <a:tcPr>
-                    <a:solidFill>
-                      <a:srgbClr val="5894FE"/>
-                    </a:solidFill>
-                  </a:tcPr>
-                </a:tc>
-                <a:tc>
-                  <a:txBody>
-                    <a:bodyPr/>
-                    <a:lstStyle/>
-                    <a:p>
-                      <a:pPr algn="l"/>
-                      <a:r>
-                        <a:rPr sz="1000" b="0" i="0">
+                  <a:tcPr anchor="ctr">
+                    <a:solidFill>
+                      <a:srgbClr val="FFFFFF"/>
+                    </a:solidFill>
+                  </a:tcPr>
+                </a:tc>
+                <a:tc>
+                  <a:txBody>
+                    <a:bodyPr/>
+                    <a:lstStyle/>
+                    <a:p>
+                      <a:r>
+                        <a:rPr sz="1100" b="0">
                           <a:solidFill>
                             <a:srgbClr val="000000"/>
                           </a:solidFill>
@@ -3630,16 +3641,19 @@
                       </a:r>
                     </a:p>
                   </a:txBody>
-                  <a:tcPr/>
-                </a:tc>
-                <a:tc>
-                  <a:txBody>
-                    <a:bodyPr/>
-                    <a:lstStyle/>
-                    <a:p>
-                      <a:pPr algn="l"/>
-                      <a:r>
-                        <a:rPr sz="1000" b="0" i="0">
+                  <a:tcPr>
+                    <a:solidFill>
+                      <a:srgbClr val="FFFFFF"/>
+                    </a:solidFill>
+                  </a:tcPr>
+                </a:tc>
+                <a:tc>
+                  <a:txBody>
+                    <a:bodyPr/>
+                    <a:lstStyle/>
+                    <a:p>
+                      <a:r>
+                        <a:rPr sz="1100" b="0">
                           <a:solidFill>
                             <a:srgbClr val="000000"/>
                           </a:solidFill>
@@ -3649,16 +3663,19 @@
                       </a:r>
                     </a:p>
                   </a:txBody>
-                  <a:tcPr/>
-                </a:tc>
-                <a:tc>
-                  <a:txBody>
-                    <a:bodyPr/>
-                    <a:lstStyle/>
-                    <a:p>
-                      <a:pPr algn="l"/>
-                      <a:r>
-                        <a:rPr sz="1000" b="0" i="0">
+                  <a:tcPr>
+                    <a:solidFill>
+                      <a:srgbClr val="FFFFFF"/>
+                    </a:solidFill>
+                  </a:tcPr>
+                </a:tc>
+                <a:tc>
+                  <a:txBody>
+                    <a:bodyPr/>
+                    <a:lstStyle/>
+                    <a:p>
+                      <a:r>
+                        <a:rPr sz="1100" b="0">
                           <a:solidFill>
                             <a:srgbClr val="000000"/>
                           </a:solidFill>
@@ -3668,16 +3685,19 @@
                       </a:r>
                     </a:p>
                   </a:txBody>
-                  <a:tcPr/>
-                </a:tc>
-                <a:tc>
-                  <a:txBody>
-                    <a:bodyPr/>
-                    <a:lstStyle/>
-                    <a:p>
-                      <a:pPr algn="l"/>
-                      <a:r>
-                        <a:rPr sz="1000" b="0" i="0">
+                  <a:tcPr>
+                    <a:solidFill>
+                      <a:srgbClr val="FFFFFF"/>
+                    </a:solidFill>
+                  </a:tcPr>
+                </a:tc>
+                <a:tc>
+                  <a:txBody>
+                    <a:bodyPr/>
+                    <a:lstStyle/>
+                    <a:p>
+                      <a:r>
+                        <a:rPr sz="1100" b="0">
                           <a:solidFill>
                             <a:srgbClr val="000000"/>
                           </a:solidFill>
@@ -3687,7 +3707,11 @@
                       </a:r>
                     </a:p>
                   </a:txBody>
-                  <a:tcPr/>
+                  <a:tcPr>
+                    <a:solidFill>
+                      <a:srgbClr val="FFFFFF"/>
+                    </a:solidFill>
+                  </a:tcPr>
                 </a:tc>
               </a:tr>
               <a:tr h="457200">
@@ -3696,31 +3720,30 @@
                     <a:bodyPr/>
                     <a:lstStyle/>
                     <a:p>
-                      <a:pPr algn="ctr"/>
                       <a:r>
                         <a:rPr sz="1100" b="1">
                           <a:solidFill>
-                            <a:srgbClr val="FFFFFF"/>
-                          </a:solidFill>
+                            <a:srgbClr val="000000"/>
+                          </a:solidFill>
+                          <a:latin typeface="Arial"/>
                         </a:rPr>
                         <a:t>Electronics</a:t>
                       </a:r>
                     </a:p>
                   </a:txBody>
-                  <a:tcPr>
-                    <a:solidFill>
-                      <a:srgbClr val="5894FE"/>
-                    </a:solidFill>
-                  </a:tcPr>
-                </a:tc>
-                <a:tc>
-                  <a:txBody>
-                    <a:bodyPr/>
-                    <a:lstStyle/>
-                    <a:p>
-                      <a:pPr algn="l"/>
-                      <a:r>
-                        <a:rPr sz="1000" b="0" i="0">
+                  <a:tcPr anchor="ctr">
+                    <a:solidFill>
+                      <a:srgbClr val="FFFFFF"/>
+                    </a:solidFill>
+                  </a:tcPr>
+                </a:tc>
+                <a:tc>
+                  <a:txBody>
+                    <a:bodyPr/>
+                    <a:lstStyle/>
+                    <a:p>
+                      <a:r>
+                        <a:rPr sz="1100" b="0">
                           <a:solidFill>
                             <a:srgbClr val="000000"/>
                           </a:solidFill>
@@ -3730,16 +3753,19 @@
                       </a:r>
                     </a:p>
                   </a:txBody>
-                  <a:tcPr/>
-                </a:tc>
-                <a:tc>
-                  <a:txBody>
-                    <a:bodyPr/>
-                    <a:lstStyle/>
-                    <a:p>
-                      <a:pPr algn="l"/>
-                      <a:r>
-                        <a:rPr sz="1000" b="0" i="0">
+                  <a:tcPr>
+                    <a:solidFill>
+                      <a:srgbClr val="FFFFFF"/>
+                    </a:solidFill>
+                  </a:tcPr>
+                </a:tc>
+                <a:tc>
+                  <a:txBody>
+                    <a:bodyPr/>
+                    <a:lstStyle/>
+                    <a:p>
+                      <a:r>
+                        <a:rPr sz="1100" b="0">
                           <a:solidFill>
                             <a:srgbClr val="000000"/>
                           </a:solidFill>
@@ -3749,16 +3775,19 @@
                       </a:r>
                     </a:p>
                   </a:txBody>
-                  <a:tcPr/>
-                </a:tc>
-                <a:tc>
-                  <a:txBody>
-                    <a:bodyPr/>
-                    <a:lstStyle/>
-                    <a:p>
-                      <a:pPr algn="l"/>
-                      <a:r>
-                        <a:rPr sz="1000" b="0" i="0">
+                  <a:tcPr>
+                    <a:solidFill>
+                      <a:srgbClr val="FFFFFF"/>
+                    </a:solidFill>
+                  </a:tcPr>
+                </a:tc>
+                <a:tc>
+                  <a:txBody>
+                    <a:bodyPr/>
+                    <a:lstStyle/>
+                    <a:p>
+                      <a:r>
+                        <a:rPr sz="1100" b="0">
                           <a:solidFill>
                             <a:srgbClr val="000000"/>
                           </a:solidFill>
@@ -3768,16 +3797,19 @@
                       </a:r>
                     </a:p>
                   </a:txBody>
-                  <a:tcPr/>
-                </a:tc>
-                <a:tc>
-                  <a:txBody>
-                    <a:bodyPr/>
-                    <a:lstStyle/>
-                    <a:p>
-                      <a:pPr algn="l"/>
-                      <a:r>
-                        <a:rPr sz="1000" b="0" i="0">
+                  <a:tcPr>
+                    <a:solidFill>
+                      <a:srgbClr val="FFFFFF"/>
+                    </a:solidFill>
+                  </a:tcPr>
+                </a:tc>
+                <a:tc>
+                  <a:txBody>
+                    <a:bodyPr/>
+                    <a:lstStyle/>
+                    <a:p>
+                      <a:r>
+                        <a:rPr sz="1100" b="0">
                           <a:solidFill>
                             <a:srgbClr val="000000"/>
                           </a:solidFill>
@@ -3787,7 +3819,11 @@
                       </a:r>
                     </a:p>
                   </a:txBody>
-                  <a:tcPr/>
+                  <a:tcPr>
+                    <a:solidFill>
+                      <a:srgbClr val="FFFFFF"/>
+                    </a:solidFill>
+                  </a:tcPr>
                 </a:tc>
               </a:tr>
               <a:tr h="457200">
@@ -3796,31 +3832,30 @@
                     <a:bodyPr/>
                     <a:lstStyle/>
                     <a:p>
-                      <a:pPr algn="ctr"/>
                       <a:r>
                         <a:rPr sz="1100" b="1">
                           <a:solidFill>
-                            <a:srgbClr val="FFFFFF"/>
-                          </a:solidFill>
+                            <a:srgbClr val="000000"/>
+                          </a:solidFill>
+                          <a:latin typeface="Arial"/>
                         </a:rPr>
                         <a:t>Food</a:t>
                       </a:r>
                     </a:p>
                   </a:txBody>
-                  <a:tcPr>
-                    <a:solidFill>
-                      <a:srgbClr val="5894FE"/>
-                    </a:solidFill>
-                  </a:tcPr>
-                </a:tc>
-                <a:tc>
-                  <a:txBody>
-                    <a:bodyPr/>
-                    <a:lstStyle/>
-                    <a:p>
-                      <a:pPr algn="l"/>
-                      <a:r>
-                        <a:rPr sz="1000" b="0" i="0">
+                  <a:tcPr anchor="ctr">
+                    <a:solidFill>
+                      <a:srgbClr val="FFFFFF"/>
+                    </a:solidFill>
+                  </a:tcPr>
+                </a:tc>
+                <a:tc>
+                  <a:txBody>
+                    <a:bodyPr/>
+                    <a:lstStyle/>
+                    <a:p>
+                      <a:r>
+                        <a:rPr sz="1100" b="0">
                           <a:solidFill>
                             <a:srgbClr val="000000"/>
                           </a:solidFill>
@@ -3830,16 +3865,19 @@
                       </a:r>
                     </a:p>
                   </a:txBody>
-                  <a:tcPr/>
-                </a:tc>
-                <a:tc>
-                  <a:txBody>
-                    <a:bodyPr/>
-                    <a:lstStyle/>
-                    <a:p>
-                      <a:pPr algn="l"/>
-                      <a:r>
-                        <a:rPr sz="1000" b="0" i="0">
+                  <a:tcPr>
+                    <a:solidFill>
+                      <a:srgbClr val="FFFFFF"/>
+                    </a:solidFill>
+                  </a:tcPr>
+                </a:tc>
+                <a:tc>
+                  <a:txBody>
+                    <a:bodyPr/>
+                    <a:lstStyle/>
+                    <a:p>
+                      <a:r>
+                        <a:rPr sz="1100" b="0">
                           <a:solidFill>
                             <a:srgbClr val="000000"/>
                           </a:solidFill>
@@ -3849,16 +3887,19 @@
                       </a:r>
                     </a:p>
                   </a:txBody>
-                  <a:tcPr/>
-                </a:tc>
-                <a:tc>
-                  <a:txBody>
-                    <a:bodyPr/>
-                    <a:lstStyle/>
-                    <a:p>
-                      <a:pPr algn="l"/>
-                      <a:r>
-                        <a:rPr sz="1000" b="0" i="0">
+                  <a:tcPr>
+                    <a:solidFill>
+                      <a:srgbClr val="FFFFFF"/>
+                    </a:solidFill>
+                  </a:tcPr>
+                </a:tc>
+                <a:tc>
+                  <a:txBody>
+                    <a:bodyPr/>
+                    <a:lstStyle/>
+                    <a:p>
+                      <a:r>
+                        <a:rPr sz="1100" b="0">
                           <a:solidFill>
                             <a:srgbClr val="000000"/>
                           </a:solidFill>
@@ -3868,16 +3909,19 @@
                       </a:r>
                     </a:p>
                   </a:txBody>
-                  <a:tcPr/>
-                </a:tc>
-                <a:tc>
-                  <a:txBody>
-                    <a:bodyPr/>
-                    <a:lstStyle/>
-                    <a:p>
-                      <a:pPr algn="l"/>
-                      <a:r>
-                        <a:rPr sz="1000" b="0" i="0">
+                  <a:tcPr>
+                    <a:solidFill>
+                      <a:srgbClr val="FFFFFF"/>
+                    </a:solidFill>
+                  </a:tcPr>
+                </a:tc>
+                <a:tc>
+                  <a:txBody>
+                    <a:bodyPr/>
+                    <a:lstStyle/>
+                    <a:p>
+                      <a:r>
+                        <a:rPr sz="1100" b="0">
                           <a:solidFill>
                             <a:srgbClr val="000000"/>
                           </a:solidFill>
@@ -3887,7 +3931,11 @@
                       </a:r>
                     </a:p>
                   </a:txBody>
-                  <a:tcPr/>
+                  <a:tcPr>
+                    <a:solidFill>
+                      <a:srgbClr val="FFFFFF"/>
+                    </a:solidFill>
+                  </a:tcPr>
                 </a:tc>
               </a:tr>
               <a:tr h="457200">
@@ -3896,31 +3944,30 @@
                     <a:bodyPr/>
                     <a:lstStyle/>
                     <a:p>
-                      <a:pPr algn="ctr"/>
                       <a:r>
                         <a:rPr sz="1100" b="1">
                           <a:solidFill>
-                            <a:srgbClr val="FFFFFF"/>
-                          </a:solidFill>
+                            <a:srgbClr val="000000"/>
+                          </a:solidFill>
+                          <a:latin typeface="Arial"/>
                         </a:rPr>
                         <a:t>Home</a:t>
                       </a:r>
                     </a:p>
                   </a:txBody>
-                  <a:tcPr>
-                    <a:solidFill>
-                      <a:srgbClr val="5894FE"/>
-                    </a:solidFill>
-                  </a:tcPr>
-                </a:tc>
-                <a:tc>
-                  <a:txBody>
-                    <a:bodyPr/>
-                    <a:lstStyle/>
-                    <a:p>
-                      <a:pPr algn="l"/>
-                      <a:r>
-                        <a:rPr sz="1000" b="0" i="0">
+                  <a:tcPr anchor="ctr">
+                    <a:solidFill>
+                      <a:srgbClr val="FFFFFF"/>
+                    </a:solidFill>
+                  </a:tcPr>
+                </a:tc>
+                <a:tc>
+                  <a:txBody>
+                    <a:bodyPr/>
+                    <a:lstStyle/>
+                    <a:p>
+                      <a:r>
+                        <a:rPr sz="1100" b="0">
                           <a:solidFill>
                             <a:srgbClr val="000000"/>
                           </a:solidFill>
@@ -3930,16 +3977,19 @@
                       </a:r>
                     </a:p>
                   </a:txBody>
-                  <a:tcPr/>
-                </a:tc>
-                <a:tc>
-                  <a:txBody>
-                    <a:bodyPr/>
-                    <a:lstStyle/>
-                    <a:p>
-                      <a:pPr algn="l"/>
-                      <a:r>
-                        <a:rPr sz="1000" b="0" i="0">
+                  <a:tcPr>
+                    <a:solidFill>
+                      <a:srgbClr val="FFFFFF"/>
+                    </a:solidFill>
+                  </a:tcPr>
+                </a:tc>
+                <a:tc>
+                  <a:txBody>
+                    <a:bodyPr/>
+                    <a:lstStyle/>
+                    <a:p>
+                      <a:r>
+                        <a:rPr sz="1100" b="0">
                           <a:solidFill>
                             <a:srgbClr val="000000"/>
                           </a:solidFill>
@@ -3949,16 +3999,19 @@
                       </a:r>
                     </a:p>
                   </a:txBody>
-                  <a:tcPr/>
-                </a:tc>
-                <a:tc>
-                  <a:txBody>
-                    <a:bodyPr/>
-                    <a:lstStyle/>
-                    <a:p>
-                      <a:pPr algn="l"/>
-                      <a:r>
-                        <a:rPr sz="1000" b="0" i="0">
+                  <a:tcPr>
+                    <a:solidFill>
+                      <a:srgbClr val="FFFFFF"/>
+                    </a:solidFill>
+                  </a:tcPr>
+                </a:tc>
+                <a:tc>
+                  <a:txBody>
+                    <a:bodyPr/>
+                    <a:lstStyle/>
+                    <a:p>
+                      <a:r>
+                        <a:rPr sz="1100" b="0">
                           <a:solidFill>
                             <a:srgbClr val="000000"/>
                           </a:solidFill>
@@ -3968,16 +4021,19 @@
                       </a:r>
                     </a:p>
                   </a:txBody>
-                  <a:tcPr/>
-                </a:tc>
-                <a:tc>
-                  <a:txBody>
-                    <a:bodyPr/>
-                    <a:lstStyle/>
-                    <a:p>
-                      <a:pPr algn="l"/>
-                      <a:r>
-                        <a:rPr sz="1000" b="0" i="0">
+                  <a:tcPr>
+                    <a:solidFill>
+                      <a:srgbClr val="FFFFFF"/>
+                    </a:solidFill>
+                  </a:tcPr>
+                </a:tc>
+                <a:tc>
+                  <a:txBody>
+                    <a:bodyPr/>
+                    <a:lstStyle/>
+                    <a:p>
+                      <a:r>
+                        <a:rPr sz="1100" b="0">
                           <a:solidFill>
                             <a:srgbClr val="000000"/>
                           </a:solidFill>
@@ -3987,7 +4043,11 @@
                       </a:r>
                     </a:p>
                   </a:txBody>
-                  <a:tcPr/>
+                  <a:tcPr>
+                    <a:solidFill>
+                      <a:srgbClr val="FFFFFF"/>
+                    </a:solidFill>
+                  </a:tcPr>
                 </a:tc>
               </a:tr>
             </a:tbl>
@@ -4036,7 +4096,7 @@
               <a:t>Data</a:t>
             </a:r>
             <a:r>
-              <a:rPr sz="1800" b="1" i="1">
+              <a:rPr sz="1600" b="0" i="1">
                 <a:latin typeface="Arial"/>
               </a:rPr>
               <a:t>
@@ -4077,130 +4137,130 @@
                     <a:bodyPr/>
                     <a:lstStyle/>
                     <a:p>
-                      <a:pPr algn="ctr"/>
                       <a:r>
                         <a:rPr sz="1100" b="1">
                           <a:solidFill>
-                            <a:srgbClr val="FFFFFF"/>
-                          </a:solidFill>
+                            <a:srgbClr val="000000"/>
+                          </a:solidFill>
+                          <a:latin typeface="Arial"/>
                         </a:rPr>
                         <a:t>product_category</a:t>
                       </a:r>
                     </a:p>
                   </a:txBody>
-                  <a:tcPr>
-                    <a:solidFill>
-                      <a:srgbClr val="4472C4"/>
-                    </a:solidFill>
-                  </a:tcPr>
-                </a:tc>
-                <a:tc>
-                  <a:txBody>
-                    <a:bodyPr/>
-                    <a:lstStyle/>
-                    <a:p>
-                      <a:pPr algn="ctr"/>
+                  <a:tcPr anchor="ctr">
+                    <a:solidFill>
+                      <a:srgbClr val="FFFFFF"/>
+                    </a:solidFill>
+                  </a:tcPr>
+                </a:tc>
+                <a:tc>
+                  <a:txBody>
+                    <a:bodyPr/>
+                    <a:lstStyle/>
+                    <a:p>
                       <a:r>
                         <a:rPr sz="1100" b="1">
                           <a:solidFill>
-                            <a:srgbClr val="FFFFFF"/>
-                          </a:solidFill>
+                            <a:srgbClr val="000000"/>
+                          </a:solidFill>
+                          <a:latin typeface="Arial"/>
                         </a:rPr>
                         <a:t>is_discounted</a:t>
                       </a:r>
                     </a:p>
                   </a:txBody>
-                  <a:tcPr>
-                    <a:solidFill>
-                      <a:srgbClr val="4472C4"/>
-                    </a:solidFill>
-                  </a:tcPr>
-                </a:tc>
-                <a:tc>
-                  <a:txBody>
-                    <a:bodyPr/>
-                    <a:lstStyle/>
-                    <a:p>
-                      <a:pPr algn="ctr"/>
+                  <a:tcPr anchor="ctr">
+                    <a:solidFill>
+                      <a:srgbClr val="FFFFFF"/>
+                    </a:solidFill>
+                  </a:tcPr>
+                </a:tc>
+                <a:tc>
+                  <a:txBody>
+                    <a:bodyPr/>
+                    <a:lstStyle/>
+                    <a:p>
                       <a:r>
                         <a:rPr sz="1100" b="1">
                           <a:solidFill>
-                            <a:srgbClr val="FFFFFF"/>
-                          </a:solidFill>
+                            <a:srgbClr val="000000"/>
+                          </a:solidFill>
+                          <a:latin typeface="Arial"/>
                         </a:rPr>
                         <a:t>Customer Count</a:t>
                       </a:r>
                     </a:p>
                   </a:txBody>
-                  <a:tcPr>
-                    <a:solidFill>
-                      <a:srgbClr val="4472C4"/>
-                    </a:solidFill>
-                  </a:tcPr>
-                </a:tc>
-                <a:tc>
-                  <a:txBody>
-                    <a:bodyPr/>
-                    <a:lstStyle/>
-                    <a:p>
-                      <a:pPr algn="ctr"/>
+                  <a:tcPr anchor="ctr">
+                    <a:solidFill>
+                      <a:srgbClr val="FFFFFF"/>
+                    </a:solidFill>
+                  </a:tcPr>
+                </a:tc>
+                <a:tc>
+                  <a:txBody>
+                    <a:bodyPr/>
+                    <a:lstStyle/>
+                    <a:p>
                       <a:r>
                         <a:rPr sz="1100" b="1">
                           <a:solidFill>
-                            <a:srgbClr val="FFFFFF"/>
-                          </a:solidFill>
+                            <a:srgbClr val="000000"/>
+                          </a:solidFill>
+                          <a:latin typeface="Arial"/>
                         </a:rPr>
                         <a:t>Avg Price</a:t>
                       </a:r>
                     </a:p>
                   </a:txBody>
-                  <a:tcPr>
-                    <a:solidFill>
-                      <a:srgbClr val="4472C4"/>
-                    </a:solidFill>
-                  </a:tcPr>
-                </a:tc>
-                <a:tc>
-                  <a:txBody>
-                    <a:bodyPr/>
-                    <a:lstStyle/>
-                    <a:p>
-                      <a:pPr algn="ctr"/>
+                  <a:tcPr anchor="ctr">
+                    <a:solidFill>
+                      <a:srgbClr val="FFFFFF"/>
+                    </a:solidFill>
+                  </a:tcPr>
+                </a:tc>
+                <a:tc>
+                  <a:txBody>
+                    <a:bodyPr/>
+                    <a:lstStyle/>
+                    <a:p>
                       <a:r>
                         <a:rPr sz="1100" b="1">
                           <a:solidFill>
-                            <a:srgbClr val="FFFFFF"/>
-                          </a:solidFill>
+                            <a:srgbClr val="000000"/>
+                          </a:solidFill>
+                          <a:latin typeface="Arial"/>
                         </a:rPr>
                         <a:t>Total Quantity</a:t>
                       </a:r>
                     </a:p>
                   </a:txBody>
-                  <a:tcPr>
-                    <a:solidFill>
-                      <a:srgbClr val="4472C4"/>
-                    </a:solidFill>
-                  </a:tcPr>
-                </a:tc>
-                <a:tc>
-                  <a:txBody>
-                    <a:bodyPr/>
-                    <a:lstStyle/>
-                    <a:p>
-                      <a:pPr algn="ctr"/>
+                  <a:tcPr anchor="ctr">
+                    <a:solidFill>
+                      <a:srgbClr val="FFFFFF"/>
+                    </a:solidFill>
+                  </a:tcPr>
+                </a:tc>
+                <a:tc>
+                  <a:txBody>
+                    <a:bodyPr/>
+                    <a:lstStyle/>
+                    <a:p>
                       <a:r>
                         <a:rPr sz="1100" b="1">
                           <a:solidFill>
-                            <a:srgbClr val="FFFFFF"/>
-                          </a:solidFill>
+                            <a:srgbClr val="000000"/>
+                          </a:solidFill>
+                          <a:latin typeface="Arial"/>
                         </a:rPr>
                         <a:t>Discount Rate</a:t>
                       </a:r>
                     </a:p>
                   </a:txBody>
-                  <a:tcPr>
-                    <a:solidFill>
-                      <a:srgbClr val="4472C4"/>
+                  <a:tcPr anchor="ctr">
+                    <a:solidFill>
+                      <a:srgbClr val="FFFFFF"/>
                     </a:solidFill>
                   </a:tcPr>
                 </a:tc>
@@ -4211,53 +4271,52 @@
                     <a:bodyPr/>
                     <a:lstStyle/>
                     <a:p>
-                      <a:pPr algn="ctr"/>
                       <a:r>
                         <a:rPr sz="1100" b="1">
                           <a:solidFill>
-                            <a:srgbClr val="FFFFFF"/>
-                          </a:solidFill>
+                            <a:srgbClr val="000000"/>
+                          </a:solidFill>
+                          <a:latin typeface="Arial"/>
                         </a:rPr>
                         <a:t>Books</a:t>
                       </a:r>
                     </a:p>
                   </a:txBody>
-                  <a:tcPr>
-                    <a:solidFill>
-                      <a:srgbClr val="5894FE"/>
-                    </a:solidFill>
-                  </a:tcPr>
-                </a:tc>
-                <a:tc>
-                  <a:txBody>
-                    <a:bodyPr/>
-                    <a:lstStyle/>
-                    <a:p>
-                      <a:pPr algn="ctr"/>
+                  <a:tcPr anchor="ctr">
+                    <a:solidFill>
+                      <a:srgbClr val="FFFFFF"/>
+                    </a:solidFill>
+                  </a:tcPr>
+                </a:tc>
+                <a:tc>
+                  <a:txBody>
+                    <a:bodyPr/>
+                    <a:lstStyle/>
+                    <a:p>
                       <a:r>
                         <a:rPr sz="1100" b="1">
                           <a:solidFill>
-                            <a:srgbClr val="FFFFFF"/>
-                          </a:solidFill>
+                            <a:srgbClr val="000000"/>
+                          </a:solidFill>
+                          <a:latin typeface="Arial"/>
                         </a:rPr>
                         <a:t>False</a:t>
                       </a:r>
                     </a:p>
                   </a:txBody>
-                  <a:tcPr>
-                    <a:solidFill>
-                      <a:srgbClr val="5894FE"/>
-                    </a:solidFill>
-                  </a:tcPr>
-                </a:tc>
-                <a:tc>
-                  <a:txBody>
-                    <a:bodyPr/>
-                    <a:lstStyle/>
-                    <a:p>
-                      <a:pPr algn="l"/>
-                      <a:r>
-                        <a:rPr sz="1000" b="0" i="0">
+                  <a:tcPr anchor="ctr">
+                    <a:solidFill>
+                      <a:srgbClr val="FFFFFF"/>
+                    </a:solidFill>
+                  </a:tcPr>
+                </a:tc>
+                <a:tc>
+                  <a:txBody>
+                    <a:bodyPr/>
+                    <a:lstStyle/>
+                    <a:p>
+                      <a:r>
+                        <a:rPr sz="1100" b="0">
                           <a:solidFill>
                             <a:srgbClr val="000000"/>
                           </a:solidFill>
@@ -4267,16 +4326,19 @@
                       </a:r>
                     </a:p>
                   </a:txBody>
-                  <a:tcPr/>
-                </a:tc>
-                <a:tc>
-                  <a:txBody>
-                    <a:bodyPr/>
-                    <a:lstStyle/>
-                    <a:p>
-                      <a:pPr algn="l"/>
-                      <a:r>
-                        <a:rPr sz="1000" b="0" i="0">
+                  <a:tcPr>
+                    <a:solidFill>
+                      <a:srgbClr val="FFFFFF"/>
+                    </a:solidFill>
+                  </a:tcPr>
+                </a:tc>
+                <a:tc>
+                  <a:txBody>
+                    <a:bodyPr/>
+                    <a:lstStyle/>
+                    <a:p>
+                      <a:r>
+                        <a:rPr sz="1100" b="0">
                           <a:solidFill>
                             <a:srgbClr val="000000"/>
                           </a:solidFill>
@@ -4286,16 +4348,19 @@
                       </a:r>
                     </a:p>
                   </a:txBody>
-                  <a:tcPr/>
-                </a:tc>
-                <a:tc>
-                  <a:txBody>
-                    <a:bodyPr/>
-                    <a:lstStyle/>
-                    <a:p>
-                      <a:pPr algn="l"/>
-                      <a:r>
-                        <a:rPr sz="1000" b="0" i="0">
+                  <a:tcPr>
+                    <a:solidFill>
+                      <a:srgbClr val="FFFFFF"/>
+                    </a:solidFill>
+                  </a:tcPr>
+                </a:tc>
+                <a:tc>
+                  <a:txBody>
+                    <a:bodyPr/>
+                    <a:lstStyle/>
+                    <a:p>
+                      <a:r>
+                        <a:rPr sz="1100" b="0">
                           <a:solidFill>
                             <a:srgbClr val="000000"/>
                           </a:solidFill>
@@ -4305,16 +4370,19 @@
                       </a:r>
                     </a:p>
                   </a:txBody>
-                  <a:tcPr/>
-                </a:tc>
-                <a:tc>
-                  <a:txBody>
-                    <a:bodyPr/>
-                    <a:lstStyle/>
-                    <a:p>
-                      <a:pPr algn="l"/>
-                      <a:r>
-                        <a:rPr sz="1000" b="0" i="0">
+                  <a:tcPr>
+                    <a:solidFill>
+                      <a:srgbClr val="FFFFFF"/>
+                    </a:solidFill>
+                  </a:tcPr>
+                </a:tc>
+                <a:tc>
+                  <a:txBody>
+                    <a:bodyPr/>
+                    <a:lstStyle/>
+                    <a:p>
+                      <a:r>
+                        <a:rPr sz="1100" b="0">
                           <a:solidFill>
                             <a:srgbClr val="000000"/>
                           </a:solidFill>
@@ -4324,7 +4392,11 @@
                       </a:r>
                     </a:p>
                   </a:txBody>
-                  <a:tcPr/>
+                  <a:tcPr>
+                    <a:solidFill>
+                      <a:srgbClr val="FFFFFF"/>
+                    </a:solidFill>
+                  </a:tcPr>
                 </a:tc>
               </a:tr>
               <a:tr h="249381">
@@ -4333,53 +4405,52 @@
                     <a:bodyPr/>
                     <a:lstStyle/>
                     <a:p>
-                      <a:pPr algn="ctr"/>
                       <a:r>
                         <a:rPr sz="1100" b="1">
                           <a:solidFill>
-                            <a:srgbClr val="FFFFFF"/>
-                          </a:solidFill>
+                            <a:srgbClr val="000000"/>
+                          </a:solidFill>
+                          <a:latin typeface="Arial"/>
                         </a:rPr>
                         <a:t>Books</a:t>
                       </a:r>
                     </a:p>
                   </a:txBody>
-                  <a:tcPr>
-                    <a:solidFill>
-                      <a:srgbClr val="5894FE"/>
-                    </a:solidFill>
-                  </a:tcPr>
-                </a:tc>
-                <a:tc>
-                  <a:txBody>
-                    <a:bodyPr/>
-                    <a:lstStyle/>
-                    <a:p>
-                      <a:pPr algn="ctr"/>
+                  <a:tcPr anchor="ctr">
+                    <a:solidFill>
+                      <a:srgbClr val="FFFFFF"/>
+                    </a:solidFill>
+                  </a:tcPr>
+                </a:tc>
+                <a:tc>
+                  <a:txBody>
+                    <a:bodyPr/>
+                    <a:lstStyle/>
+                    <a:p>
                       <a:r>
                         <a:rPr sz="1100" b="1">
                           <a:solidFill>
-                            <a:srgbClr val="FFFFFF"/>
-                          </a:solidFill>
+                            <a:srgbClr val="000000"/>
+                          </a:solidFill>
+                          <a:latin typeface="Arial"/>
                         </a:rPr>
                         <a:t>True</a:t>
                       </a:r>
                     </a:p>
                   </a:txBody>
-                  <a:tcPr>
-                    <a:solidFill>
-                      <a:srgbClr val="5894FE"/>
-                    </a:solidFill>
-                  </a:tcPr>
-                </a:tc>
-                <a:tc>
-                  <a:txBody>
-                    <a:bodyPr/>
-                    <a:lstStyle/>
-                    <a:p>
-                      <a:pPr algn="l"/>
-                      <a:r>
-                        <a:rPr sz="1000" b="0" i="0">
+                  <a:tcPr anchor="ctr">
+                    <a:solidFill>
+                      <a:srgbClr val="FFFFFF"/>
+                    </a:solidFill>
+                  </a:tcPr>
+                </a:tc>
+                <a:tc>
+                  <a:txBody>
+                    <a:bodyPr/>
+                    <a:lstStyle/>
+                    <a:p>
+                      <a:r>
+                        <a:rPr sz="1100" b="0">
                           <a:solidFill>
                             <a:srgbClr val="000000"/>
                           </a:solidFill>
@@ -4389,16 +4460,19 @@
                       </a:r>
                     </a:p>
                   </a:txBody>
-                  <a:tcPr/>
-                </a:tc>
-                <a:tc>
-                  <a:txBody>
-                    <a:bodyPr/>
-                    <a:lstStyle/>
-                    <a:p>
-                      <a:pPr algn="l"/>
-                      <a:r>
-                        <a:rPr sz="1000" b="0" i="0">
+                  <a:tcPr>
+                    <a:solidFill>
+                      <a:srgbClr val="FFFFFF"/>
+                    </a:solidFill>
+                  </a:tcPr>
+                </a:tc>
+                <a:tc>
+                  <a:txBody>
+                    <a:bodyPr/>
+                    <a:lstStyle/>
+                    <a:p>
+                      <a:r>
+                        <a:rPr sz="1100" b="0">
                           <a:solidFill>
                             <a:srgbClr val="000000"/>
                           </a:solidFill>
@@ -4408,16 +4482,19 @@
                       </a:r>
                     </a:p>
                   </a:txBody>
-                  <a:tcPr/>
-                </a:tc>
-                <a:tc>
-                  <a:txBody>
-                    <a:bodyPr/>
-                    <a:lstStyle/>
-                    <a:p>
-                      <a:pPr algn="l"/>
-                      <a:r>
-                        <a:rPr sz="1000" b="0" i="0">
+                  <a:tcPr>
+                    <a:solidFill>
+                      <a:srgbClr val="FFFFFF"/>
+                    </a:solidFill>
+                  </a:tcPr>
+                </a:tc>
+                <a:tc>
+                  <a:txBody>
+                    <a:bodyPr/>
+                    <a:lstStyle/>
+                    <a:p>
+                      <a:r>
+                        <a:rPr sz="1100" b="0">
                           <a:solidFill>
                             <a:srgbClr val="000000"/>
                           </a:solidFill>
@@ -4427,16 +4504,19 @@
                       </a:r>
                     </a:p>
                   </a:txBody>
-                  <a:tcPr/>
-                </a:tc>
-                <a:tc>
-                  <a:txBody>
-                    <a:bodyPr/>
-                    <a:lstStyle/>
-                    <a:p>
-                      <a:pPr algn="l"/>
-                      <a:r>
-                        <a:rPr sz="1000" b="0" i="0">
+                  <a:tcPr>
+                    <a:solidFill>
+                      <a:srgbClr val="FFFFFF"/>
+                    </a:solidFill>
+                  </a:tcPr>
+                </a:tc>
+                <a:tc>
+                  <a:txBody>
+                    <a:bodyPr/>
+                    <a:lstStyle/>
+                    <a:p>
+                      <a:r>
+                        <a:rPr sz="1100" b="0">
                           <a:solidFill>
                             <a:srgbClr val="000000"/>
                           </a:solidFill>
@@ -4446,7 +4526,11 @@
                       </a:r>
                     </a:p>
                   </a:txBody>
-                  <a:tcPr/>
+                  <a:tcPr>
+                    <a:solidFill>
+                      <a:srgbClr val="FFFFFF"/>
+                    </a:solidFill>
+                  </a:tcPr>
                 </a:tc>
               </a:tr>
               <a:tr h="249381">
@@ -4455,53 +4539,52 @@
                     <a:bodyPr/>
                     <a:lstStyle/>
                     <a:p>
-                      <a:pPr algn="ctr"/>
                       <a:r>
                         <a:rPr sz="1100" b="1">
                           <a:solidFill>
-                            <a:srgbClr val="FFFFFF"/>
-                          </a:solidFill>
+                            <a:srgbClr val="000000"/>
+                          </a:solidFill>
+                          <a:latin typeface="Arial"/>
                         </a:rPr>
                         <a:t>Clothing</a:t>
                       </a:r>
                     </a:p>
                   </a:txBody>
-                  <a:tcPr>
-                    <a:solidFill>
-                      <a:srgbClr val="5894FE"/>
-                    </a:solidFill>
-                  </a:tcPr>
-                </a:tc>
-                <a:tc>
-                  <a:txBody>
-                    <a:bodyPr/>
-                    <a:lstStyle/>
-                    <a:p>
-                      <a:pPr algn="ctr"/>
+                  <a:tcPr anchor="ctr">
+                    <a:solidFill>
+                      <a:srgbClr val="FFFFFF"/>
+                    </a:solidFill>
+                  </a:tcPr>
+                </a:tc>
+                <a:tc>
+                  <a:txBody>
+                    <a:bodyPr/>
+                    <a:lstStyle/>
+                    <a:p>
                       <a:r>
                         <a:rPr sz="1100" b="1">
                           <a:solidFill>
-                            <a:srgbClr val="FFFFFF"/>
-                          </a:solidFill>
+                            <a:srgbClr val="000000"/>
+                          </a:solidFill>
+                          <a:latin typeface="Arial"/>
                         </a:rPr>
                         <a:t>False</a:t>
                       </a:r>
                     </a:p>
                   </a:txBody>
-                  <a:tcPr>
-                    <a:solidFill>
-                      <a:srgbClr val="5894FE"/>
-                    </a:solidFill>
-                  </a:tcPr>
-                </a:tc>
-                <a:tc>
-                  <a:txBody>
-                    <a:bodyPr/>
-                    <a:lstStyle/>
-                    <a:p>
-                      <a:pPr algn="l"/>
-                      <a:r>
-                        <a:rPr sz="1000" b="0" i="0">
+                  <a:tcPr anchor="ctr">
+                    <a:solidFill>
+                      <a:srgbClr val="FFFFFF"/>
+                    </a:solidFill>
+                  </a:tcPr>
+                </a:tc>
+                <a:tc>
+                  <a:txBody>
+                    <a:bodyPr/>
+                    <a:lstStyle/>
+                    <a:p>
+                      <a:r>
+                        <a:rPr sz="1100" b="0">
                           <a:solidFill>
                             <a:srgbClr val="000000"/>
                           </a:solidFill>
@@ -4511,16 +4594,19 @@
                       </a:r>
                     </a:p>
                   </a:txBody>
-                  <a:tcPr/>
-                </a:tc>
-                <a:tc>
-                  <a:txBody>
-                    <a:bodyPr/>
-                    <a:lstStyle/>
-                    <a:p>
-                      <a:pPr algn="l"/>
-                      <a:r>
-                        <a:rPr sz="1000" b="0" i="0">
+                  <a:tcPr>
+                    <a:solidFill>
+                      <a:srgbClr val="FFFFFF"/>
+                    </a:solidFill>
+                  </a:tcPr>
+                </a:tc>
+                <a:tc>
+                  <a:txBody>
+                    <a:bodyPr/>
+                    <a:lstStyle/>
+                    <a:p>
+                      <a:r>
+                        <a:rPr sz="1100" b="0">
                           <a:solidFill>
                             <a:srgbClr val="000000"/>
                           </a:solidFill>
@@ -4530,16 +4616,19 @@
                       </a:r>
                     </a:p>
                   </a:txBody>
-                  <a:tcPr/>
-                </a:tc>
-                <a:tc>
-                  <a:txBody>
-                    <a:bodyPr/>
-                    <a:lstStyle/>
-                    <a:p>
-                      <a:pPr algn="l"/>
-                      <a:r>
-                        <a:rPr sz="1000" b="0" i="0">
+                  <a:tcPr>
+                    <a:solidFill>
+                      <a:srgbClr val="FFFFFF"/>
+                    </a:solidFill>
+                  </a:tcPr>
+                </a:tc>
+                <a:tc>
+                  <a:txBody>
+                    <a:bodyPr/>
+                    <a:lstStyle/>
+                    <a:p>
+                      <a:r>
+                        <a:rPr sz="1100" b="0">
                           <a:solidFill>
                             <a:srgbClr val="000000"/>
                           </a:solidFill>
@@ -4549,16 +4638,19 @@
                       </a:r>
                     </a:p>
                   </a:txBody>
-                  <a:tcPr/>
-                </a:tc>
-                <a:tc>
-                  <a:txBody>
-                    <a:bodyPr/>
-                    <a:lstStyle/>
-                    <a:p>
-                      <a:pPr algn="l"/>
-                      <a:r>
-                        <a:rPr sz="1000" b="0" i="0">
+                  <a:tcPr>
+                    <a:solidFill>
+                      <a:srgbClr val="FFFFFF"/>
+                    </a:solidFill>
+                  </a:tcPr>
+                </a:tc>
+                <a:tc>
+                  <a:txBody>
+                    <a:bodyPr/>
+                    <a:lstStyle/>
+                    <a:p>
+                      <a:r>
+                        <a:rPr sz="1100" b="0">
                           <a:solidFill>
                             <a:srgbClr val="000000"/>
                           </a:solidFill>
@@ -4568,7 +4660,11 @@
                       </a:r>
                     </a:p>
                   </a:txBody>
-                  <a:tcPr/>
+                  <a:tcPr>
+                    <a:solidFill>
+                      <a:srgbClr val="FFFFFF"/>
+                    </a:solidFill>
+                  </a:tcPr>
                 </a:tc>
               </a:tr>
               <a:tr h="249381">
@@ -4577,53 +4673,52 @@
                     <a:bodyPr/>
                     <a:lstStyle/>
                     <a:p>
-                      <a:pPr algn="ctr"/>
                       <a:r>
                         <a:rPr sz="1100" b="1">
                           <a:solidFill>
-                            <a:srgbClr val="FFFFFF"/>
-                          </a:solidFill>
+                            <a:srgbClr val="000000"/>
+                          </a:solidFill>
+                          <a:latin typeface="Arial"/>
                         </a:rPr>
                         <a:t>Clothing</a:t>
                       </a:r>
                     </a:p>
                   </a:txBody>
-                  <a:tcPr>
-                    <a:solidFill>
-                      <a:srgbClr val="5894FE"/>
-                    </a:solidFill>
-                  </a:tcPr>
-                </a:tc>
-                <a:tc>
-                  <a:txBody>
-                    <a:bodyPr/>
-                    <a:lstStyle/>
-                    <a:p>
-                      <a:pPr algn="ctr"/>
+                  <a:tcPr anchor="ctr">
+                    <a:solidFill>
+                      <a:srgbClr val="FFFFFF"/>
+                    </a:solidFill>
+                  </a:tcPr>
+                </a:tc>
+                <a:tc>
+                  <a:txBody>
+                    <a:bodyPr/>
+                    <a:lstStyle/>
+                    <a:p>
                       <a:r>
                         <a:rPr sz="1100" b="1">
                           <a:solidFill>
-                            <a:srgbClr val="FFFFFF"/>
-                          </a:solidFill>
+                            <a:srgbClr val="000000"/>
+                          </a:solidFill>
+                          <a:latin typeface="Arial"/>
                         </a:rPr>
                         <a:t>True</a:t>
                       </a:r>
                     </a:p>
                   </a:txBody>
-                  <a:tcPr>
-                    <a:solidFill>
-                      <a:srgbClr val="5894FE"/>
-                    </a:solidFill>
-                  </a:tcPr>
-                </a:tc>
-                <a:tc>
-                  <a:txBody>
-                    <a:bodyPr/>
-                    <a:lstStyle/>
-                    <a:p>
-                      <a:pPr algn="l"/>
-                      <a:r>
-                        <a:rPr sz="1000" b="0" i="0">
+                  <a:tcPr anchor="ctr">
+                    <a:solidFill>
+                      <a:srgbClr val="FFFFFF"/>
+                    </a:solidFill>
+                  </a:tcPr>
+                </a:tc>
+                <a:tc>
+                  <a:txBody>
+                    <a:bodyPr/>
+                    <a:lstStyle/>
+                    <a:p>
+                      <a:r>
+                        <a:rPr sz="1100" b="0">
                           <a:solidFill>
                             <a:srgbClr val="000000"/>
                           </a:solidFill>
@@ -4633,16 +4728,19 @@
                       </a:r>
                     </a:p>
                   </a:txBody>
-                  <a:tcPr/>
-                </a:tc>
-                <a:tc>
-                  <a:txBody>
-                    <a:bodyPr/>
-                    <a:lstStyle/>
-                    <a:p>
-                      <a:pPr algn="l"/>
-                      <a:r>
-                        <a:rPr sz="1000" b="0" i="0">
+                  <a:tcPr>
+                    <a:solidFill>
+                      <a:srgbClr val="FFFFFF"/>
+                    </a:solidFill>
+                  </a:tcPr>
+                </a:tc>
+                <a:tc>
+                  <a:txBody>
+                    <a:bodyPr/>
+                    <a:lstStyle/>
+                    <a:p>
+                      <a:r>
+                        <a:rPr sz="1100" b="0">
                           <a:solidFill>
                             <a:srgbClr val="000000"/>
                           </a:solidFill>
@@ -4652,16 +4750,19 @@
                       </a:r>
                     </a:p>
                   </a:txBody>
-                  <a:tcPr/>
-                </a:tc>
-                <a:tc>
-                  <a:txBody>
-                    <a:bodyPr/>
-                    <a:lstStyle/>
-                    <a:p>
-                      <a:pPr algn="l"/>
-                      <a:r>
-                        <a:rPr sz="1000" b="0" i="0">
+                  <a:tcPr>
+                    <a:solidFill>
+                      <a:srgbClr val="FFFFFF"/>
+                    </a:solidFill>
+                  </a:tcPr>
+                </a:tc>
+                <a:tc>
+                  <a:txBody>
+                    <a:bodyPr/>
+                    <a:lstStyle/>
+                    <a:p>
+                      <a:r>
+                        <a:rPr sz="1100" b="0">
                           <a:solidFill>
                             <a:srgbClr val="000000"/>
                           </a:solidFill>
@@ -4671,16 +4772,19 @@
                       </a:r>
                     </a:p>
                   </a:txBody>
-                  <a:tcPr/>
-                </a:tc>
-                <a:tc>
-                  <a:txBody>
-                    <a:bodyPr/>
-                    <a:lstStyle/>
-                    <a:p>
-                      <a:pPr algn="l"/>
-                      <a:r>
-                        <a:rPr sz="1000" b="0" i="0">
+                  <a:tcPr>
+                    <a:solidFill>
+                      <a:srgbClr val="FFFFFF"/>
+                    </a:solidFill>
+                  </a:tcPr>
+                </a:tc>
+                <a:tc>
+                  <a:txBody>
+                    <a:bodyPr/>
+                    <a:lstStyle/>
+                    <a:p>
+                      <a:r>
+                        <a:rPr sz="1100" b="0">
                           <a:solidFill>
                             <a:srgbClr val="000000"/>
                           </a:solidFill>
@@ -4690,7 +4794,11 @@
                       </a:r>
                     </a:p>
                   </a:txBody>
-                  <a:tcPr/>
+                  <a:tcPr>
+                    <a:solidFill>
+                      <a:srgbClr val="FFFFFF"/>
+                    </a:solidFill>
+                  </a:tcPr>
                 </a:tc>
               </a:tr>
               <a:tr h="249381">
@@ -4699,53 +4807,52 @@
                     <a:bodyPr/>
                     <a:lstStyle/>
                     <a:p>
-                      <a:pPr algn="ctr"/>
                       <a:r>
                         <a:rPr sz="1100" b="1">
                           <a:solidFill>
-                            <a:srgbClr val="FFFFFF"/>
-                          </a:solidFill>
+                            <a:srgbClr val="000000"/>
+                          </a:solidFill>
+                          <a:latin typeface="Arial"/>
                         </a:rPr>
                         <a:t>Electronics</a:t>
                       </a:r>
                     </a:p>
                   </a:txBody>
-                  <a:tcPr>
-                    <a:solidFill>
-                      <a:srgbClr val="5894FE"/>
-                    </a:solidFill>
-                  </a:tcPr>
-                </a:tc>
-                <a:tc>
-                  <a:txBody>
-                    <a:bodyPr/>
-                    <a:lstStyle/>
-                    <a:p>
-                      <a:pPr algn="ctr"/>
+                  <a:tcPr anchor="ctr">
+                    <a:solidFill>
+                      <a:srgbClr val="FFFFFF"/>
+                    </a:solidFill>
+                  </a:tcPr>
+                </a:tc>
+                <a:tc>
+                  <a:txBody>
+                    <a:bodyPr/>
+                    <a:lstStyle/>
+                    <a:p>
                       <a:r>
                         <a:rPr sz="1100" b="1">
                           <a:solidFill>
-                            <a:srgbClr val="FFFFFF"/>
-                          </a:solidFill>
+                            <a:srgbClr val="000000"/>
+                          </a:solidFill>
+                          <a:latin typeface="Arial"/>
                         </a:rPr>
                         <a:t>False</a:t>
                       </a:r>
                     </a:p>
                   </a:txBody>
-                  <a:tcPr>
-                    <a:solidFill>
-                      <a:srgbClr val="5894FE"/>
-                    </a:solidFill>
-                  </a:tcPr>
-                </a:tc>
-                <a:tc>
-                  <a:txBody>
-                    <a:bodyPr/>
-                    <a:lstStyle/>
-                    <a:p>
-                      <a:pPr algn="l"/>
-                      <a:r>
-                        <a:rPr sz="1000" b="0" i="0">
+                  <a:tcPr anchor="ctr">
+                    <a:solidFill>
+                      <a:srgbClr val="FFFFFF"/>
+                    </a:solidFill>
+                  </a:tcPr>
+                </a:tc>
+                <a:tc>
+                  <a:txBody>
+                    <a:bodyPr/>
+                    <a:lstStyle/>
+                    <a:p>
+                      <a:r>
+                        <a:rPr sz="1100" b="0">
                           <a:solidFill>
                             <a:srgbClr val="000000"/>
                           </a:solidFill>
@@ -4755,16 +4862,19 @@
                       </a:r>
                     </a:p>
                   </a:txBody>
-                  <a:tcPr/>
-                </a:tc>
-                <a:tc>
-                  <a:txBody>
-                    <a:bodyPr/>
-                    <a:lstStyle/>
-                    <a:p>
-                      <a:pPr algn="l"/>
-                      <a:r>
-                        <a:rPr sz="1000" b="0" i="0">
+                  <a:tcPr>
+                    <a:solidFill>
+                      <a:srgbClr val="FFFFFF"/>
+                    </a:solidFill>
+                  </a:tcPr>
+                </a:tc>
+                <a:tc>
+                  <a:txBody>
+                    <a:bodyPr/>
+                    <a:lstStyle/>
+                    <a:p>
+                      <a:r>
+                        <a:rPr sz="1100" b="0">
                           <a:solidFill>
                             <a:srgbClr val="000000"/>
                           </a:solidFill>
@@ -4774,16 +4884,19 @@
                       </a:r>
                     </a:p>
                   </a:txBody>
-                  <a:tcPr/>
-                </a:tc>
-                <a:tc>
-                  <a:txBody>
-                    <a:bodyPr/>
-                    <a:lstStyle/>
-                    <a:p>
-                      <a:pPr algn="l"/>
-                      <a:r>
-                        <a:rPr sz="1000" b="0" i="0">
+                  <a:tcPr>
+                    <a:solidFill>
+                      <a:srgbClr val="FFFFFF"/>
+                    </a:solidFill>
+                  </a:tcPr>
+                </a:tc>
+                <a:tc>
+                  <a:txBody>
+                    <a:bodyPr/>
+                    <a:lstStyle/>
+                    <a:p>
+                      <a:r>
+                        <a:rPr sz="1100" b="0">
                           <a:solidFill>
                             <a:srgbClr val="000000"/>
                           </a:solidFill>
@@ -4793,16 +4906,19 @@
                       </a:r>
                     </a:p>
                   </a:txBody>
-                  <a:tcPr/>
-                </a:tc>
-                <a:tc>
-                  <a:txBody>
-                    <a:bodyPr/>
-                    <a:lstStyle/>
-                    <a:p>
-                      <a:pPr algn="l"/>
-                      <a:r>
-                        <a:rPr sz="1000" b="0" i="0">
+                  <a:tcPr>
+                    <a:solidFill>
+                      <a:srgbClr val="FFFFFF"/>
+                    </a:solidFill>
+                  </a:tcPr>
+                </a:tc>
+                <a:tc>
+                  <a:txBody>
+                    <a:bodyPr/>
+                    <a:lstStyle/>
+                    <a:p>
+                      <a:r>
+                        <a:rPr sz="1100" b="0">
                           <a:solidFill>
                             <a:srgbClr val="000000"/>
                           </a:solidFill>
@@ -4812,7 +4928,11 @@
                       </a:r>
                     </a:p>
                   </a:txBody>
-                  <a:tcPr/>
+                  <a:tcPr>
+                    <a:solidFill>
+                      <a:srgbClr val="FFFFFF"/>
+                    </a:solidFill>
+                  </a:tcPr>
                 </a:tc>
               </a:tr>
               <a:tr h="249381">
@@ -4821,53 +4941,52 @@
                     <a:bodyPr/>
                     <a:lstStyle/>
                     <a:p>
-                      <a:pPr algn="ctr"/>
                       <a:r>
                         <a:rPr sz="1100" b="1">
                           <a:solidFill>
-                            <a:srgbClr val="FFFFFF"/>
-                          </a:solidFill>
+                            <a:srgbClr val="000000"/>
+                          </a:solidFill>
+                          <a:latin typeface="Arial"/>
                         </a:rPr>
                         <a:t>Electronics</a:t>
                       </a:r>
                     </a:p>
                   </a:txBody>
-                  <a:tcPr>
-                    <a:solidFill>
-                      <a:srgbClr val="5894FE"/>
-                    </a:solidFill>
-                  </a:tcPr>
-                </a:tc>
-                <a:tc>
-                  <a:txBody>
-                    <a:bodyPr/>
-                    <a:lstStyle/>
-                    <a:p>
-                      <a:pPr algn="ctr"/>
+                  <a:tcPr anchor="ctr">
+                    <a:solidFill>
+                      <a:srgbClr val="FFFFFF"/>
+                    </a:solidFill>
+                  </a:tcPr>
+                </a:tc>
+                <a:tc>
+                  <a:txBody>
+                    <a:bodyPr/>
+                    <a:lstStyle/>
+                    <a:p>
                       <a:r>
                         <a:rPr sz="1100" b="1">
                           <a:solidFill>
-                            <a:srgbClr val="FFFFFF"/>
-                          </a:solidFill>
+                            <a:srgbClr val="000000"/>
+                          </a:solidFill>
+                          <a:latin typeface="Arial"/>
                         </a:rPr>
                         <a:t>True</a:t>
                       </a:r>
                     </a:p>
                   </a:txBody>
-                  <a:tcPr>
-                    <a:solidFill>
-                      <a:srgbClr val="5894FE"/>
-                    </a:solidFill>
-                  </a:tcPr>
-                </a:tc>
-                <a:tc>
-                  <a:txBody>
-                    <a:bodyPr/>
-                    <a:lstStyle/>
-                    <a:p>
-                      <a:pPr algn="l"/>
-                      <a:r>
-                        <a:rPr sz="1000" b="0" i="0">
+                  <a:tcPr anchor="ctr">
+                    <a:solidFill>
+                      <a:srgbClr val="FFFFFF"/>
+                    </a:solidFill>
+                  </a:tcPr>
+                </a:tc>
+                <a:tc>
+                  <a:txBody>
+                    <a:bodyPr/>
+                    <a:lstStyle/>
+                    <a:p>
+                      <a:r>
+                        <a:rPr sz="1100" b="0">
                           <a:solidFill>
                             <a:srgbClr val="000000"/>
                           </a:solidFill>
@@ -4877,16 +4996,19 @@
                       </a:r>
                     </a:p>
                   </a:txBody>
-                  <a:tcPr/>
-                </a:tc>
-                <a:tc>
-                  <a:txBody>
-                    <a:bodyPr/>
-                    <a:lstStyle/>
-                    <a:p>
-                      <a:pPr algn="l"/>
-                      <a:r>
-                        <a:rPr sz="1000" b="0" i="0">
+                  <a:tcPr>
+                    <a:solidFill>
+                      <a:srgbClr val="FFFFFF"/>
+                    </a:solidFill>
+                  </a:tcPr>
+                </a:tc>
+                <a:tc>
+                  <a:txBody>
+                    <a:bodyPr/>
+                    <a:lstStyle/>
+                    <a:p>
+                      <a:r>
+                        <a:rPr sz="1100" b="0">
                           <a:solidFill>
                             <a:srgbClr val="000000"/>
                           </a:solidFill>
@@ -4896,16 +5018,19 @@
                       </a:r>
                     </a:p>
                   </a:txBody>
-                  <a:tcPr/>
-                </a:tc>
-                <a:tc>
-                  <a:txBody>
-                    <a:bodyPr/>
-                    <a:lstStyle/>
-                    <a:p>
-                      <a:pPr algn="l"/>
-                      <a:r>
-                        <a:rPr sz="1000" b="0" i="0">
+                  <a:tcPr>
+                    <a:solidFill>
+                      <a:srgbClr val="FFFFFF"/>
+                    </a:solidFill>
+                  </a:tcPr>
+                </a:tc>
+                <a:tc>
+                  <a:txBody>
+                    <a:bodyPr/>
+                    <a:lstStyle/>
+                    <a:p>
+                      <a:r>
+                        <a:rPr sz="1100" b="0">
                           <a:solidFill>
                             <a:srgbClr val="000000"/>
                           </a:solidFill>
@@ -4915,16 +5040,19 @@
                       </a:r>
                     </a:p>
                   </a:txBody>
-                  <a:tcPr/>
-                </a:tc>
-                <a:tc>
-                  <a:txBody>
-                    <a:bodyPr/>
-                    <a:lstStyle/>
-                    <a:p>
-                      <a:pPr algn="l"/>
-                      <a:r>
-                        <a:rPr sz="1000" b="0" i="0">
+                  <a:tcPr>
+                    <a:solidFill>
+                      <a:srgbClr val="FFFFFF"/>
+                    </a:solidFill>
+                  </a:tcPr>
+                </a:tc>
+                <a:tc>
+                  <a:txBody>
+                    <a:bodyPr/>
+                    <a:lstStyle/>
+                    <a:p>
+                      <a:r>
+                        <a:rPr sz="1100" b="0">
                           <a:solidFill>
                             <a:srgbClr val="000000"/>
                           </a:solidFill>
@@ -4934,7 +5062,11 @@
                       </a:r>
                     </a:p>
                   </a:txBody>
-                  <a:tcPr/>
+                  <a:tcPr>
+                    <a:solidFill>
+                      <a:srgbClr val="FFFFFF"/>
+                    </a:solidFill>
+                  </a:tcPr>
                 </a:tc>
               </a:tr>
               <a:tr h="249381">
@@ -4943,53 +5075,52 @@
                     <a:bodyPr/>
                     <a:lstStyle/>
                     <a:p>
-                      <a:pPr algn="ctr"/>
                       <a:r>
                         <a:rPr sz="1100" b="1">
                           <a:solidFill>
-                            <a:srgbClr val="FFFFFF"/>
-                          </a:solidFill>
+                            <a:srgbClr val="000000"/>
+                          </a:solidFill>
+                          <a:latin typeface="Arial"/>
                         </a:rPr>
                         <a:t>Food</a:t>
                       </a:r>
                     </a:p>
                   </a:txBody>
-                  <a:tcPr>
-                    <a:solidFill>
-                      <a:srgbClr val="5894FE"/>
-                    </a:solidFill>
-                  </a:tcPr>
-                </a:tc>
-                <a:tc>
-                  <a:txBody>
-                    <a:bodyPr/>
-                    <a:lstStyle/>
-                    <a:p>
-                      <a:pPr algn="ctr"/>
+                  <a:tcPr anchor="ctr">
+                    <a:solidFill>
+                      <a:srgbClr val="FFFFFF"/>
+                    </a:solidFill>
+                  </a:tcPr>
+                </a:tc>
+                <a:tc>
+                  <a:txBody>
+                    <a:bodyPr/>
+                    <a:lstStyle/>
+                    <a:p>
                       <a:r>
                         <a:rPr sz="1100" b="1">
                           <a:solidFill>
-                            <a:srgbClr val="FFFFFF"/>
-                          </a:solidFill>
+                            <a:srgbClr val="000000"/>
+                          </a:solidFill>
+                          <a:latin typeface="Arial"/>
                         </a:rPr>
                         <a:t>False</a:t>
                       </a:r>
                     </a:p>
                   </a:txBody>
-                  <a:tcPr>
-                    <a:solidFill>
-                      <a:srgbClr val="5894FE"/>
-                    </a:solidFill>
-                  </a:tcPr>
-                </a:tc>
-                <a:tc>
-                  <a:txBody>
-                    <a:bodyPr/>
-                    <a:lstStyle/>
-                    <a:p>
-                      <a:pPr algn="l"/>
-                      <a:r>
-                        <a:rPr sz="1000" b="0" i="0">
+                  <a:tcPr anchor="ctr">
+                    <a:solidFill>
+                      <a:srgbClr val="FFFFFF"/>
+                    </a:solidFill>
+                  </a:tcPr>
+                </a:tc>
+                <a:tc>
+                  <a:txBody>
+                    <a:bodyPr/>
+                    <a:lstStyle/>
+                    <a:p>
+                      <a:r>
+                        <a:rPr sz="1100" b="0">
                           <a:solidFill>
                             <a:srgbClr val="000000"/>
                           </a:solidFill>
@@ -4999,16 +5130,19 @@
                       </a:r>
                     </a:p>
                   </a:txBody>
-                  <a:tcPr/>
-                </a:tc>
-                <a:tc>
-                  <a:txBody>
-                    <a:bodyPr/>
-                    <a:lstStyle/>
-                    <a:p>
-                      <a:pPr algn="l"/>
-                      <a:r>
-                        <a:rPr sz="1000" b="0" i="0">
+                  <a:tcPr>
+                    <a:solidFill>
+                      <a:srgbClr val="FFFFFF"/>
+                    </a:solidFill>
+                  </a:tcPr>
+                </a:tc>
+                <a:tc>
+                  <a:txBody>
+                    <a:bodyPr/>
+                    <a:lstStyle/>
+                    <a:p>
+                      <a:r>
+                        <a:rPr sz="1100" b="0">
                           <a:solidFill>
                             <a:srgbClr val="000000"/>
                           </a:solidFill>
@@ -5018,16 +5152,19 @@
                       </a:r>
                     </a:p>
                   </a:txBody>
-                  <a:tcPr/>
-                </a:tc>
-                <a:tc>
-                  <a:txBody>
-                    <a:bodyPr/>
-                    <a:lstStyle/>
-                    <a:p>
-                      <a:pPr algn="l"/>
-                      <a:r>
-                        <a:rPr sz="1000" b="0" i="0">
+                  <a:tcPr>
+                    <a:solidFill>
+                      <a:srgbClr val="FFFFFF"/>
+                    </a:solidFill>
+                  </a:tcPr>
+                </a:tc>
+                <a:tc>
+                  <a:txBody>
+                    <a:bodyPr/>
+                    <a:lstStyle/>
+                    <a:p>
+                      <a:r>
+                        <a:rPr sz="1100" b="0">
                           <a:solidFill>
                             <a:srgbClr val="000000"/>
                           </a:solidFill>
@@ -5037,16 +5174,19 @@
                       </a:r>
                     </a:p>
                   </a:txBody>
-                  <a:tcPr/>
-                </a:tc>
-                <a:tc>
-                  <a:txBody>
-                    <a:bodyPr/>
-                    <a:lstStyle/>
-                    <a:p>
-                      <a:pPr algn="l"/>
-                      <a:r>
-                        <a:rPr sz="1000" b="0" i="0">
+                  <a:tcPr>
+                    <a:solidFill>
+                      <a:srgbClr val="FFFFFF"/>
+                    </a:solidFill>
+                  </a:tcPr>
+                </a:tc>
+                <a:tc>
+                  <a:txBody>
+                    <a:bodyPr/>
+                    <a:lstStyle/>
+                    <a:p>
+                      <a:r>
+                        <a:rPr sz="1100" b="0">
                           <a:solidFill>
                             <a:srgbClr val="000000"/>
                           </a:solidFill>
@@ -5056,7 +5196,11 @@
                       </a:r>
                     </a:p>
                   </a:txBody>
-                  <a:tcPr/>
+                  <a:tcPr>
+                    <a:solidFill>
+                      <a:srgbClr val="FFFFFF"/>
+                    </a:solidFill>
+                  </a:tcPr>
                 </a:tc>
               </a:tr>
               <a:tr h="249381">
@@ -5065,53 +5209,52 @@
                     <a:bodyPr/>
                     <a:lstStyle/>
                     <a:p>
-                      <a:pPr algn="ctr"/>
                       <a:r>
                         <a:rPr sz="1100" b="1">
                           <a:solidFill>
-                            <a:srgbClr val="FFFFFF"/>
-                          </a:solidFill>
+                            <a:srgbClr val="000000"/>
+                          </a:solidFill>
+                          <a:latin typeface="Arial"/>
                         </a:rPr>
                         <a:t>Food</a:t>
                       </a:r>
                     </a:p>
                   </a:txBody>
-                  <a:tcPr>
-                    <a:solidFill>
-                      <a:srgbClr val="5894FE"/>
-                    </a:solidFill>
-                  </a:tcPr>
-                </a:tc>
-                <a:tc>
-                  <a:txBody>
-                    <a:bodyPr/>
-                    <a:lstStyle/>
-                    <a:p>
-                      <a:pPr algn="ctr"/>
+                  <a:tcPr anchor="ctr">
+                    <a:solidFill>
+                      <a:srgbClr val="FFFFFF"/>
+                    </a:solidFill>
+                  </a:tcPr>
+                </a:tc>
+                <a:tc>
+                  <a:txBody>
+                    <a:bodyPr/>
+                    <a:lstStyle/>
+                    <a:p>
                       <a:r>
                         <a:rPr sz="1100" b="1">
                           <a:solidFill>
-                            <a:srgbClr val="FFFFFF"/>
-                          </a:solidFill>
+                            <a:srgbClr val="000000"/>
+                          </a:solidFill>
+                          <a:latin typeface="Arial"/>
                         </a:rPr>
                         <a:t>True</a:t>
                       </a:r>
                     </a:p>
                   </a:txBody>
-                  <a:tcPr>
-                    <a:solidFill>
-                      <a:srgbClr val="5894FE"/>
-                    </a:solidFill>
-                  </a:tcPr>
-                </a:tc>
-                <a:tc>
-                  <a:txBody>
-                    <a:bodyPr/>
-                    <a:lstStyle/>
-                    <a:p>
-                      <a:pPr algn="l"/>
-                      <a:r>
-                        <a:rPr sz="1000" b="0" i="0">
+                  <a:tcPr anchor="ctr">
+                    <a:solidFill>
+                      <a:srgbClr val="FFFFFF"/>
+                    </a:solidFill>
+                  </a:tcPr>
+                </a:tc>
+                <a:tc>
+                  <a:txBody>
+                    <a:bodyPr/>
+                    <a:lstStyle/>
+                    <a:p>
+                      <a:r>
+                        <a:rPr sz="1100" b="0">
                           <a:solidFill>
                             <a:srgbClr val="000000"/>
                           </a:solidFill>
@@ -5121,16 +5264,19 @@
                       </a:r>
                     </a:p>
                   </a:txBody>
-                  <a:tcPr/>
-                </a:tc>
-                <a:tc>
-                  <a:txBody>
-                    <a:bodyPr/>
-                    <a:lstStyle/>
-                    <a:p>
-                      <a:pPr algn="l"/>
-                      <a:r>
-                        <a:rPr sz="1000" b="0" i="0">
+                  <a:tcPr>
+                    <a:solidFill>
+                      <a:srgbClr val="FFFFFF"/>
+                    </a:solidFill>
+                  </a:tcPr>
+                </a:tc>
+                <a:tc>
+                  <a:txBody>
+                    <a:bodyPr/>
+                    <a:lstStyle/>
+                    <a:p>
+                      <a:r>
+                        <a:rPr sz="1100" b="0">
                           <a:solidFill>
                             <a:srgbClr val="000000"/>
                           </a:solidFill>
@@ -5140,16 +5286,19 @@
                       </a:r>
                     </a:p>
                   </a:txBody>
-                  <a:tcPr/>
-                </a:tc>
-                <a:tc>
-                  <a:txBody>
-                    <a:bodyPr/>
-                    <a:lstStyle/>
-                    <a:p>
-                      <a:pPr algn="l"/>
-                      <a:r>
-                        <a:rPr sz="1000" b="0" i="0">
+                  <a:tcPr>
+                    <a:solidFill>
+                      <a:srgbClr val="FFFFFF"/>
+                    </a:solidFill>
+                  </a:tcPr>
+                </a:tc>
+                <a:tc>
+                  <a:txBody>
+                    <a:bodyPr/>
+                    <a:lstStyle/>
+                    <a:p>
+                      <a:r>
+                        <a:rPr sz="1100" b="0">
                           <a:solidFill>
                             <a:srgbClr val="000000"/>
                           </a:solidFill>
@@ -5159,16 +5308,19 @@
                       </a:r>
                     </a:p>
                   </a:txBody>
-                  <a:tcPr/>
-                </a:tc>
-                <a:tc>
-                  <a:txBody>
-                    <a:bodyPr/>
-                    <a:lstStyle/>
-                    <a:p>
-                      <a:pPr algn="l"/>
-                      <a:r>
-                        <a:rPr sz="1000" b="0" i="0">
+                  <a:tcPr>
+                    <a:solidFill>
+                      <a:srgbClr val="FFFFFF"/>
+                    </a:solidFill>
+                  </a:tcPr>
+                </a:tc>
+                <a:tc>
+                  <a:txBody>
+                    <a:bodyPr/>
+                    <a:lstStyle/>
+                    <a:p>
+                      <a:r>
+                        <a:rPr sz="1100" b="0">
                           <a:solidFill>
                             <a:srgbClr val="000000"/>
                           </a:solidFill>
@@ -5178,7 +5330,11 @@
                       </a:r>
                     </a:p>
                   </a:txBody>
-                  <a:tcPr/>
+                  <a:tcPr>
+                    <a:solidFill>
+                      <a:srgbClr val="FFFFFF"/>
+                    </a:solidFill>
+                  </a:tcPr>
                 </a:tc>
               </a:tr>
               <a:tr h="249381">
@@ -5187,53 +5343,52 @@
                     <a:bodyPr/>
                     <a:lstStyle/>
                     <a:p>
-                      <a:pPr algn="ctr"/>
                       <a:r>
                         <a:rPr sz="1100" b="1">
                           <a:solidFill>
-                            <a:srgbClr val="FFFFFF"/>
-                          </a:solidFill>
+                            <a:srgbClr val="000000"/>
+                          </a:solidFill>
+                          <a:latin typeface="Arial"/>
                         </a:rPr>
                         <a:t>Home</a:t>
                       </a:r>
                     </a:p>
                   </a:txBody>
-                  <a:tcPr>
-                    <a:solidFill>
-                      <a:srgbClr val="5894FE"/>
-                    </a:solidFill>
-                  </a:tcPr>
-                </a:tc>
-                <a:tc>
-                  <a:txBody>
-                    <a:bodyPr/>
-                    <a:lstStyle/>
-                    <a:p>
-                      <a:pPr algn="ctr"/>
+                  <a:tcPr anchor="ctr">
+                    <a:solidFill>
+                      <a:srgbClr val="FFFFFF"/>
+                    </a:solidFill>
+                  </a:tcPr>
+                </a:tc>
+                <a:tc>
+                  <a:txBody>
+                    <a:bodyPr/>
+                    <a:lstStyle/>
+                    <a:p>
                       <a:r>
                         <a:rPr sz="1100" b="1">
                           <a:solidFill>
-                            <a:srgbClr val="FFFFFF"/>
-                          </a:solidFill>
+                            <a:srgbClr val="000000"/>
+                          </a:solidFill>
+                          <a:latin typeface="Arial"/>
                         </a:rPr>
                         <a:t>False</a:t>
                       </a:r>
                     </a:p>
                   </a:txBody>
-                  <a:tcPr>
-                    <a:solidFill>
-                      <a:srgbClr val="5894FE"/>
-                    </a:solidFill>
-                  </a:tcPr>
-                </a:tc>
-                <a:tc>
-                  <a:txBody>
-                    <a:bodyPr/>
-                    <a:lstStyle/>
-                    <a:p>
-                      <a:pPr algn="l"/>
-                      <a:r>
-                        <a:rPr sz="1000" b="0" i="0">
+                  <a:tcPr anchor="ctr">
+                    <a:solidFill>
+                      <a:srgbClr val="FFFFFF"/>
+                    </a:solidFill>
+                  </a:tcPr>
+                </a:tc>
+                <a:tc>
+                  <a:txBody>
+                    <a:bodyPr/>
+                    <a:lstStyle/>
+                    <a:p>
+                      <a:r>
+                        <a:rPr sz="1100" b="0">
                           <a:solidFill>
                             <a:srgbClr val="000000"/>
                           </a:solidFill>
@@ -5243,16 +5398,19 @@
                       </a:r>
                     </a:p>
                   </a:txBody>
-                  <a:tcPr/>
-                </a:tc>
-                <a:tc>
-                  <a:txBody>
-                    <a:bodyPr/>
-                    <a:lstStyle/>
-                    <a:p>
-                      <a:pPr algn="l"/>
-                      <a:r>
-                        <a:rPr sz="1000" b="0" i="0">
+                  <a:tcPr>
+                    <a:solidFill>
+                      <a:srgbClr val="FFFFFF"/>
+                    </a:solidFill>
+                  </a:tcPr>
+                </a:tc>
+                <a:tc>
+                  <a:txBody>
+                    <a:bodyPr/>
+                    <a:lstStyle/>
+                    <a:p>
+                      <a:r>
+                        <a:rPr sz="1100" b="0">
                           <a:solidFill>
                             <a:srgbClr val="000000"/>
                           </a:solidFill>
@@ -5262,16 +5420,19 @@
                       </a:r>
                     </a:p>
                   </a:txBody>
-                  <a:tcPr/>
-                </a:tc>
-                <a:tc>
-                  <a:txBody>
-                    <a:bodyPr/>
-                    <a:lstStyle/>
-                    <a:p>
-                      <a:pPr algn="l"/>
-                      <a:r>
-                        <a:rPr sz="1000" b="0" i="0">
+                  <a:tcPr>
+                    <a:solidFill>
+                      <a:srgbClr val="FFFFFF"/>
+                    </a:solidFill>
+                  </a:tcPr>
+                </a:tc>
+                <a:tc>
+                  <a:txBody>
+                    <a:bodyPr/>
+                    <a:lstStyle/>
+                    <a:p>
+                      <a:r>
+                        <a:rPr sz="1100" b="0">
                           <a:solidFill>
                             <a:srgbClr val="000000"/>
                           </a:solidFill>
@@ -5281,16 +5442,19 @@
                       </a:r>
                     </a:p>
                   </a:txBody>
-                  <a:tcPr/>
-                </a:tc>
-                <a:tc>
-                  <a:txBody>
-                    <a:bodyPr/>
-                    <a:lstStyle/>
-                    <a:p>
-                      <a:pPr algn="l"/>
-                      <a:r>
-                        <a:rPr sz="1000" b="0" i="0">
+                  <a:tcPr>
+                    <a:solidFill>
+                      <a:srgbClr val="FFFFFF"/>
+                    </a:solidFill>
+                  </a:tcPr>
+                </a:tc>
+                <a:tc>
+                  <a:txBody>
+                    <a:bodyPr/>
+                    <a:lstStyle/>
+                    <a:p>
+                      <a:r>
+                        <a:rPr sz="1100" b="0">
                           <a:solidFill>
                             <a:srgbClr val="000000"/>
                           </a:solidFill>
@@ -5300,7 +5464,11 @@
                       </a:r>
                     </a:p>
                   </a:txBody>
-                  <a:tcPr/>
+                  <a:tcPr>
+                    <a:solidFill>
+                      <a:srgbClr val="FFFFFF"/>
+                    </a:solidFill>
+                  </a:tcPr>
                 </a:tc>
               </a:tr>
               <a:tr h="249390">
@@ -5309,53 +5477,52 @@
                     <a:bodyPr/>
                     <a:lstStyle/>
                     <a:p>
-                      <a:pPr algn="ctr"/>
                       <a:r>
                         <a:rPr sz="1100" b="1">
                           <a:solidFill>
-                            <a:srgbClr val="FFFFFF"/>
-                          </a:solidFill>
+                            <a:srgbClr val="000000"/>
+                          </a:solidFill>
+                          <a:latin typeface="Arial"/>
                         </a:rPr>
                         <a:t>Home</a:t>
                       </a:r>
                     </a:p>
                   </a:txBody>
-                  <a:tcPr>
-                    <a:solidFill>
-                      <a:srgbClr val="5894FE"/>
-                    </a:solidFill>
-                  </a:tcPr>
-                </a:tc>
-                <a:tc>
-                  <a:txBody>
-                    <a:bodyPr/>
-                    <a:lstStyle/>
-                    <a:p>
-                      <a:pPr algn="ctr"/>
+                  <a:tcPr anchor="ctr">
+                    <a:solidFill>
+                      <a:srgbClr val="FFFFFF"/>
+                    </a:solidFill>
+                  </a:tcPr>
+                </a:tc>
+                <a:tc>
+                  <a:txBody>
+                    <a:bodyPr/>
+                    <a:lstStyle/>
+                    <a:p>
                       <a:r>
                         <a:rPr sz="1100" b="1">
                           <a:solidFill>
-                            <a:srgbClr val="FFFFFF"/>
-                          </a:solidFill>
+                            <a:srgbClr val="000000"/>
+                          </a:solidFill>
+                          <a:latin typeface="Arial"/>
                         </a:rPr>
                         <a:t>True</a:t>
                       </a:r>
                     </a:p>
                   </a:txBody>
-                  <a:tcPr>
-                    <a:solidFill>
-                      <a:srgbClr val="5894FE"/>
-                    </a:solidFill>
-                  </a:tcPr>
-                </a:tc>
-                <a:tc>
-                  <a:txBody>
-                    <a:bodyPr/>
-                    <a:lstStyle/>
-                    <a:p>
-                      <a:pPr algn="l"/>
-                      <a:r>
-                        <a:rPr sz="1000" b="0" i="0">
+                  <a:tcPr anchor="ctr">
+                    <a:solidFill>
+                      <a:srgbClr val="FFFFFF"/>
+                    </a:solidFill>
+                  </a:tcPr>
+                </a:tc>
+                <a:tc>
+                  <a:txBody>
+                    <a:bodyPr/>
+                    <a:lstStyle/>
+                    <a:p>
+                      <a:r>
+                        <a:rPr sz="1100" b="0">
                           <a:solidFill>
                             <a:srgbClr val="000000"/>
                           </a:solidFill>
@@ -5365,16 +5532,19 @@
                       </a:r>
                     </a:p>
                   </a:txBody>
-                  <a:tcPr/>
-                </a:tc>
-                <a:tc>
-                  <a:txBody>
-                    <a:bodyPr/>
-                    <a:lstStyle/>
-                    <a:p>
-                      <a:pPr algn="l"/>
-                      <a:r>
-                        <a:rPr sz="1000" b="0" i="0">
+                  <a:tcPr>
+                    <a:solidFill>
+                      <a:srgbClr val="FFFFFF"/>
+                    </a:solidFill>
+                  </a:tcPr>
+                </a:tc>
+                <a:tc>
+                  <a:txBody>
+                    <a:bodyPr/>
+                    <a:lstStyle/>
+                    <a:p>
+                      <a:r>
+                        <a:rPr sz="1100" b="0">
                           <a:solidFill>
                             <a:srgbClr val="000000"/>
                           </a:solidFill>
@@ -5384,16 +5554,19 @@
                       </a:r>
                     </a:p>
                   </a:txBody>
-                  <a:tcPr/>
-                </a:tc>
-                <a:tc>
-                  <a:txBody>
-                    <a:bodyPr/>
-                    <a:lstStyle/>
-                    <a:p>
-                      <a:pPr algn="l"/>
-                      <a:r>
-                        <a:rPr sz="1000" b="0" i="0">
+                  <a:tcPr>
+                    <a:solidFill>
+                      <a:srgbClr val="FFFFFF"/>
+                    </a:solidFill>
+                  </a:tcPr>
+                </a:tc>
+                <a:tc>
+                  <a:txBody>
+                    <a:bodyPr/>
+                    <a:lstStyle/>
+                    <a:p>
+                      <a:r>
+                        <a:rPr sz="1100" b="0">
                           <a:solidFill>
                             <a:srgbClr val="000000"/>
                           </a:solidFill>
@@ -5403,16 +5576,19 @@
                       </a:r>
                     </a:p>
                   </a:txBody>
-                  <a:tcPr/>
-                </a:tc>
-                <a:tc>
-                  <a:txBody>
-                    <a:bodyPr/>
-                    <a:lstStyle/>
-                    <a:p>
-                      <a:pPr algn="l"/>
-                      <a:r>
-                        <a:rPr sz="1000" b="0" i="0">
+                  <a:tcPr>
+                    <a:solidFill>
+                      <a:srgbClr val="FFFFFF"/>
+                    </a:solidFill>
+                  </a:tcPr>
+                </a:tc>
+                <a:tc>
+                  <a:txBody>
+                    <a:bodyPr/>
+                    <a:lstStyle/>
+                    <a:p>
+                      <a:r>
+                        <a:rPr sz="1100" b="0">
                           <a:solidFill>
                             <a:srgbClr val="000000"/>
                           </a:solidFill>
@@ -5422,7 +5598,11 @@
                       </a:r>
                     </a:p>
                   </a:txBody>
-                  <a:tcPr/>
+                  <a:tcPr>
+                    <a:solidFill>
+                      <a:srgbClr val="FFFFFF"/>
+                    </a:solidFill>
+                  </a:tcPr>
                 </a:tc>
               </a:tr>
             </a:tbl>

</xml_diff>

<commit_message>
Update test.pptx with new content and formatting adjustments
</commit_message>
<xml_diff>
--- a/test.pptx
+++ b/test.pptx
@@ -3391,7 +3391,7 @@
                           </a:solidFill>
                           <a:latin typeface="Arial"/>
                         </a:rPr>
-                        <a:t>product_category</a:t>
+                        <a:t>Product Category</a:t>
                       </a:r>
                     </a:p>
                   </a:txBody>
@@ -3525,29 +3525,29 @@
                           </a:solidFill>
                           <a:latin typeface="Arial"/>
                         </a:rPr>
-                        <a:t>130.0</a:t>
-                      </a:r>
-                    </a:p>
-                  </a:txBody>
-                  <a:tcPr>
-                    <a:solidFill>
-                      <a:srgbClr val="FFFFFF"/>
-                    </a:solidFill>
-                  </a:tcPr>
-                </a:tc>
-                <a:tc>
-                  <a:txBody>
-                    <a:bodyPr/>
-                    <a:lstStyle/>
-                    <a:p>
-                      <a:r>
-                        <a:rPr sz="1100" b="0">
-                          <a:solidFill>
-                            <a:srgbClr val="000000"/>
-                          </a:solidFill>
-                          <a:latin typeface="Arial"/>
-                        </a:rPr>
-                        <a:t>31.386236771940364</a:t>
+                        <a:t>130</a:t>
+                      </a:r>
+                    </a:p>
+                  </a:txBody>
+                  <a:tcPr>
+                    <a:solidFill>
+                      <a:srgbClr val="FFFFFF"/>
+                    </a:solidFill>
+                  </a:tcPr>
+                </a:tc>
+                <a:tc>
+                  <a:txBody>
+                    <a:bodyPr/>
+                    <a:lstStyle/>
+                    <a:p>
+                      <a:r>
+                        <a:rPr sz="1100" b="0">
+                          <a:solidFill>
+                            <a:srgbClr val="000000"/>
+                          </a:solidFill>
+                          <a:latin typeface="Arial"/>
+                        </a:rPr>
+                        <a:t>$31.39</a:t>
                       </a:r>
                     </a:p>
                   </a:txBody>
@@ -3591,7 +3591,7 @@
                           </a:solidFill>
                           <a:latin typeface="Arial"/>
                         </a:rPr>
-                        <a:t>0.27972027972027974</a:t>
+                        <a:t>28.0%</a:t>
                       </a:r>
                     </a:p>
                   </a:txBody>
@@ -3637,29 +3637,29 @@
                           </a:solidFill>
                           <a:latin typeface="Arial"/>
                         </a:rPr>
-                        <a:t>226.0</a:t>
-                      </a:r>
-                    </a:p>
-                  </a:txBody>
-                  <a:tcPr>
-                    <a:solidFill>
-                      <a:srgbClr val="FFFFFF"/>
-                    </a:solidFill>
-                  </a:tcPr>
-                </a:tc>
-                <a:tc>
-                  <a:txBody>
-                    <a:bodyPr/>
-                    <a:lstStyle/>
-                    <a:p>
-                      <a:r>
-                        <a:rPr sz="1100" b="0">
-                          <a:solidFill>
-                            <a:srgbClr val="000000"/>
-                          </a:solidFill>
-                          <a:latin typeface="Arial"/>
-                        </a:rPr>
-                        <a:t>34.69882070085275</a:t>
+                        <a:t>226</a:t>
+                      </a:r>
+                    </a:p>
+                  </a:txBody>
+                  <a:tcPr>
+                    <a:solidFill>
+                      <a:srgbClr val="FFFFFF"/>
+                    </a:solidFill>
+                  </a:tcPr>
+                </a:tc>
+                <a:tc>
+                  <a:txBody>
+                    <a:bodyPr/>
+                    <a:lstStyle/>
+                    <a:p>
+                      <a:r>
+                        <a:rPr sz="1100" b="0">
+                          <a:solidFill>
+                            <a:srgbClr val="000000"/>
+                          </a:solidFill>
+                          <a:latin typeface="Arial"/>
+                        </a:rPr>
+                        <a:t>$34.70</a:t>
                       </a:r>
                     </a:p>
                   </a:txBody>
@@ -3703,7 +3703,7 @@
                           </a:solidFill>
                           <a:latin typeface="Arial"/>
                         </a:rPr>
-                        <a:t>0.3228346456692913</a:t>
+                        <a:t>32.3%</a:t>
                       </a:r>
                     </a:p>
                   </a:txBody>
@@ -3749,29 +3749,29 @@
                           </a:solidFill>
                           <a:latin typeface="Arial"/>
                         </a:rPr>
-                        <a:t>257.0</a:t>
-                      </a:r>
-                    </a:p>
-                  </a:txBody>
-                  <a:tcPr>
-                    <a:solidFill>
-                      <a:srgbClr val="FFFFFF"/>
-                    </a:solidFill>
-                  </a:tcPr>
-                </a:tc>
-                <a:tc>
-                  <a:txBody>
-                    <a:bodyPr/>
-                    <a:lstStyle/>
-                    <a:p>
-                      <a:r>
-                        <a:rPr sz="1100" b="0">
-                          <a:solidFill>
-                            <a:srgbClr val="000000"/>
-                          </a:solidFill>
-                          <a:latin typeface="Arial"/>
-                        </a:rPr>
-                        <a:t>31.499103245204687</a:t>
+                        <a:t>257</a:t>
+                      </a:r>
+                    </a:p>
+                  </a:txBody>
+                  <a:tcPr>
+                    <a:solidFill>
+                      <a:srgbClr val="FFFFFF"/>
+                    </a:solidFill>
+                  </a:tcPr>
+                </a:tc>
+                <a:tc>
+                  <a:txBody>
+                    <a:bodyPr/>
+                    <a:lstStyle/>
+                    <a:p>
+                      <a:r>
+                        <a:rPr sz="1100" b="0">
+                          <a:solidFill>
+                            <a:srgbClr val="000000"/>
+                          </a:solidFill>
+                          <a:latin typeface="Arial"/>
+                        </a:rPr>
+                        <a:t>$31.50</a:t>
                       </a:r>
                     </a:p>
                   </a:txBody>
@@ -3815,7 +3815,7 @@
                           </a:solidFill>
                           <a:latin typeface="Arial"/>
                         </a:rPr>
-                        <a:t>0.323943661971831</a:t>
+                        <a:t>32.4%</a:t>
                       </a:r>
                     </a:p>
                   </a:txBody>
@@ -3861,29 +3861,29 @@
                           </a:solidFill>
                           <a:latin typeface="Arial"/>
                         </a:rPr>
-                        <a:t>182.0</a:t>
-                      </a:r>
-                    </a:p>
-                  </a:txBody>
-                  <a:tcPr>
-                    <a:solidFill>
-                      <a:srgbClr val="FFFFFF"/>
-                    </a:solidFill>
-                  </a:tcPr>
-                </a:tc>
-                <a:tc>
-                  <a:txBody>
-                    <a:bodyPr/>
-                    <a:lstStyle/>
-                    <a:p>
-                      <a:r>
-                        <a:rPr sz="1100" b="0">
-                          <a:solidFill>
-                            <a:srgbClr val="000000"/>
-                          </a:solidFill>
-                          <a:latin typeface="Arial"/>
-                        </a:rPr>
-                        <a:t>34.69747726487187</a:t>
+                        <a:t>182</a:t>
+                      </a:r>
+                    </a:p>
+                  </a:txBody>
+                  <a:tcPr>
+                    <a:solidFill>
+                      <a:srgbClr val="FFFFFF"/>
+                    </a:solidFill>
+                  </a:tcPr>
+                </a:tc>
+                <a:tc>
+                  <a:txBody>
+                    <a:bodyPr/>
+                    <a:lstStyle/>
+                    <a:p>
+                      <a:r>
+                        <a:rPr sz="1100" b="0">
+                          <a:solidFill>
+                            <a:srgbClr val="000000"/>
+                          </a:solidFill>
+                          <a:latin typeface="Arial"/>
+                        </a:rPr>
+                        <a:t>$34.70</a:t>
                       </a:r>
                     </a:p>
                   </a:txBody>
@@ -3927,7 +3927,7 @@
                           </a:solidFill>
                           <a:latin typeface="Arial"/>
                         </a:rPr>
-                        <a:t>0.285</a:t>
+                        <a:t>28.5%</a:t>
                       </a:r>
                     </a:p>
                   </a:txBody>
@@ -3973,29 +3973,29 @@
                           </a:solidFill>
                           <a:latin typeface="Arial"/>
                         </a:rPr>
-                        <a:t>112.0</a:t>
-                      </a:r>
-                    </a:p>
-                  </a:txBody>
-                  <a:tcPr>
-                    <a:solidFill>
-                      <a:srgbClr val="FFFFFF"/>
-                    </a:solidFill>
-                  </a:tcPr>
-                </a:tc>
-                <a:tc>
-                  <a:txBody>
-                    <a:bodyPr/>
-                    <a:lstStyle/>
-                    <a:p>
-                      <a:r>
-                        <a:rPr sz="1100" b="0">
-                          <a:solidFill>
-                            <a:srgbClr val="000000"/>
-                          </a:solidFill>
-                          <a:latin typeface="Arial"/>
-                        </a:rPr>
-                        <a:t>35.230800726828406</a:t>
+                        <a:t>112</a:t>
+                      </a:r>
+                    </a:p>
+                  </a:txBody>
+                  <a:tcPr>
+                    <a:solidFill>
+                      <a:srgbClr val="FFFFFF"/>
+                    </a:solidFill>
+                  </a:tcPr>
+                </a:tc>
+                <a:tc>
+                  <a:txBody>
+                    <a:bodyPr/>
+                    <a:lstStyle/>
+                    <a:p>
+                      <a:r>
+                        <a:rPr sz="1100" b="0">
+                          <a:solidFill>
+                            <a:srgbClr val="000000"/>
+                          </a:solidFill>
+                          <a:latin typeface="Arial"/>
+                        </a:rPr>
+                        <a:t>$35.23</a:t>
                       </a:r>
                     </a:p>
                   </a:txBody>
@@ -4039,7 +4039,7 @@
                           </a:solidFill>
                           <a:latin typeface="Arial"/>
                         </a:rPr>
-                        <a:t>0.2773109243697479</a:t>
+                        <a:t>27.7%</a:t>
                       </a:r>
                     </a:p>
                   </a:txBody>
@@ -4144,7 +4144,7 @@
                           </a:solidFill>
                           <a:latin typeface="Arial"/>
                         </a:rPr>
-                        <a:t>product_category</a:t>
+                        <a:t>Product Category</a:t>
                       </a:r>
                     </a:p>
                   </a:txBody>
@@ -4166,7 +4166,7 @@
                           </a:solidFill>
                           <a:latin typeface="Arial"/>
                         </a:rPr>
-                        <a:t>is_discounted</a:t>
+                        <a:t>Discounted</a:t>
                       </a:r>
                     </a:p>
                   </a:txBody>
@@ -4322,29 +4322,29 @@
                           </a:solidFill>
                           <a:latin typeface="Arial"/>
                         </a:rPr>
-                        <a:t>94.0</a:t>
-                      </a:r>
-                    </a:p>
-                  </a:txBody>
-                  <a:tcPr>
-                    <a:solidFill>
-                      <a:srgbClr val="FFFFFF"/>
-                    </a:solidFill>
-                  </a:tcPr>
-                </a:tc>
-                <a:tc>
-                  <a:txBody>
-                    <a:bodyPr/>
-                    <a:lstStyle/>
-                    <a:p>
-                      <a:r>
-                        <a:rPr sz="1100" b="0">
-                          <a:solidFill>
-                            <a:srgbClr val="000000"/>
-                          </a:solidFill>
-                          <a:latin typeface="Arial"/>
-                        </a:rPr>
-                        <a:t>30.70765839482025</a:t>
+                        <a:t>94</a:t>
+                      </a:r>
+                    </a:p>
+                  </a:txBody>
+                  <a:tcPr>
+                    <a:solidFill>
+                      <a:srgbClr val="FFFFFF"/>
+                    </a:solidFill>
+                  </a:tcPr>
+                </a:tc>
+                <a:tc>
+                  <a:txBody>
+                    <a:bodyPr/>
+                    <a:lstStyle/>
+                    <a:p>
+                      <a:r>
+                        <a:rPr sz="1100" b="0">
+                          <a:solidFill>
+                            <a:srgbClr val="000000"/>
+                          </a:solidFill>
+                          <a:latin typeface="Arial"/>
+                        </a:rPr>
+                        <a:t>$30.71</a:t>
                       </a:r>
                     </a:p>
                   </a:txBody>
@@ -4388,7 +4388,7 @@
                           </a:solidFill>
                           <a:latin typeface="Arial"/>
                         </a:rPr>
-                        <a:t>0.0</a:t>
+                        <a:t>0.0%</a:t>
                       </a:r>
                     </a:p>
                   </a:txBody>
@@ -4456,29 +4456,29 @@
                           </a:solidFill>
                           <a:latin typeface="Arial"/>
                         </a:rPr>
-                        <a:t>40.0</a:t>
-                      </a:r>
-                    </a:p>
-                  </a:txBody>
-                  <a:tcPr>
-                    <a:solidFill>
-                      <a:srgbClr val="FFFFFF"/>
-                    </a:solidFill>
-                  </a:tcPr>
-                </a:tc>
-                <a:tc>
-                  <a:txBody>
-                    <a:bodyPr/>
-                    <a:lstStyle/>
-                    <a:p>
-                      <a:r>
-                        <a:rPr sz="1100" b="0">
-                          <a:solidFill>
-                            <a:srgbClr val="000000"/>
-                          </a:solidFill>
-                          <a:latin typeface="Arial"/>
-                        </a:rPr>
-                        <a:t>33.133576093024644</a:t>
+                        <a:t>40</a:t>
+                      </a:r>
+                    </a:p>
+                  </a:txBody>
+                  <a:tcPr>
+                    <a:solidFill>
+                      <a:srgbClr val="FFFFFF"/>
+                    </a:solidFill>
+                  </a:tcPr>
+                </a:tc>
+                <a:tc>
+                  <a:txBody>
+                    <a:bodyPr/>
+                    <a:lstStyle/>
+                    <a:p>
+                      <a:r>
+                        <a:rPr sz="1100" b="0">
+                          <a:solidFill>
+                            <a:srgbClr val="000000"/>
+                          </a:solidFill>
+                          <a:latin typeface="Arial"/>
+                        </a:rPr>
+                        <a:t>$33.13</a:t>
                       </a:r>
                     </a:p>
                   </a:txBody>
@@ -4522,7 +4522,7 @@
                           </a:solidFill>
                           <a:latin typeface="Arial"/>
                         </a:rPr>
-                        <a:t>1.0</a:t>
+                        <a:t>100.0%</a:t>
                       </a:r>
                     </a:p>
                   </a:txBody>
@@ -4590,29 +4590,29 @@
                           </a:solidFill>
                           <a:latin typeface="Arial"/>
                         </a:rPr>
-                        <a:t>160.0</a:t>
-                      </a:r>
-                    </a:p>
-                  </a:txBody>
-                  <a:tcPr>
-                    <a:solidFill>
-                      <a:srgbClr val="FFFFFF"/>
-                    </a:solidFill>
-                  </a:tcPr>
-                </a:tc>
-                <a:tc>
-                  <a:txBody>
-                    <a:bodyPr/>
-                    <a:lstStyle/>
-                    <a:p>
-                      <a:r>
-                        <a:rPr sz="1100" b="0">
-                          <a:solidFill>
-                            <a:srgbClr val="000000"/>
-                          </a:solidFill>
-                          <a:latin typeface="Arial"/>
-                        </a:rPr>
-                        <a:t>35.1385063451718</a:t>
+                        <a:t>160</a:t>
+                      </a:r>
+                    </a:p>
+                  </a:txBody>
+                  <a:tcPr>
+                    <a:solidFill>
+                      <a:srgbClr val="FFFFFF"/>
+                    </a:solidFill>
+                  </a:tcPr>
+                </a:tc>
+                <a:tc>
+                  <a:txBody>
+                    <a:bodyPr/>
+                    <a:lstStyle/>
+                    <a:p>
+                      <a:r>
+                        <a:rPr sz="1100" b="0">
+                          <a:solidFill>
+                            <a:srgbClr val="000000"/>
+                          </a:solidFill>
+                          <a:latin typeface="Arial"/>
+                        </a:rPr>
+                        <a:t>$35.14</a:t>
                       </a:r>
                     </a:p>
                   </a:txBody>
@@ -4656,7 +4656,7 @@
                           </a:solidFill>
                           <a:latin typeface="Arial"/>
                         </a:rPr>
-                        <a:t>0.0</a:t>
+                        <a:t>0.0%</a:t>
                       </a:r>
                     </a:p>
                   </a:txBody>
@@ -4724,29 +4724,29 @@
                           </a:solidFill>
                           <a:latin typeface="Arial"/>
                         </a:rPr>
-                        <a:t>81.0</a:t>
-                      </a:r>
-                    </a:p>
-                  </a:txBody>
-                  <a:tcPr>
-                    <a:solidFill>
-                      <a:srgbClr val="FFFFFF"/>
-                    </a:solidFill>
-                  </a:tcPr>
-                </a:tc>
-                <a:tc>
-                  <a:txBody>
-                    <a:bodyPr/>
-                    <a:lstStyle/>
-                    <a:p>
-                      <a:r>
-                        <a:rPr sz="1100" b="0">
-                          <a:solidFill>
-                            <a:srgbClr val="000000"/>
-                          </a:solidFill>
-                          <a:latin typeface="Arial"/>
-                        </a:rPr>
-                        <a:t>33.77655325179327</a:t>
+                        <a:t>81</a:t>
+                      </a:r>
+                    </a:p>
+                  </a:txBody>
+                  <a:tcPr>
+                    <a:solidFill>
+                      <a:srgbClr val="FFFFFF"/>
+                    </a:solidFill>
+                  </a:tcPr>
+                </a:tc>
+                <a:tc>
+                  <a:txBody>
+                    <a:bodyPr/>
+                    <a:lstStyle/>
+                    <a:p>
+                      <a:r>
+                        <a:rPr sz="1100" b="0">
+                          <a:solidFill>
+                            <a:srgbClr val="000000"/>
+                          </a:solidFill>
+                          <a:latin typeface="Arial"/>
+                        </a:rPr>
+                        <a:t>$33.78</a:t>
                       </a:r>
                     </a:p>
                   </a:txBody>
@@ -4790,7 +4790,7 @@
                           </a:solidFill>
                           <a:latin typeface="Arial"/>
                         </a:rPr>
-                        <a:t>1.0</a:t>
+                        <a:t>100.0%</a:t>
                       </a:r>
                     </a:p>
                   </a:txBody>
@@ -4858,29 +4858,29 @@
                           </a:solidFill>
                           <a:latin typeface="Arial"/>
                         </a:rPr>
-                        <a:t>176.0</a:t>
-                      </a:r>
-                    </a:p>
-                  </a:txBody>
-                  <a:tcPr>
-                    <a:solidFill>
-                      <a:srgbClr val="FFFFFF"/>
-                    </a:solidFill>
-                  </a:tcPr>
-                </a:tc>
-                <a:tc>
-                  <a:txBody>
-                    <a:bodyPr/>
-                    <a:lstStyle/>
-                    <a:p>
-                      <a:r>
-                        <a:rPr sz="1100" b="0">
-                          <a:solidFill>
-                            <a:srgbClr val="000000"/>
-                          </a:solidFill>
-                          <a:latin typeface="Arial"/>
-                        </a:rPr>
-                        <a:t>33.32441001911774</a:t>
+                        <a:t>176</a:t>
+                      </a:r>
+                    </a:p>
+                  </a:txBody>
+                  <a:tcPr>
+                    <a:solidFill>
+                      <a:srgbClr val="FFFFFF"/>
+                    </a:solidFill>
+                  </a:tcPr>
+                </a:tc>
+                <a:tc>
+                  <a:txBody>
+                    <a:bodyPr/>
+                    <a:lstStyle/>
+                    <a:p>
+                      <a:r>
+                        <a:rPr sz="1100" b="0">
+                          <a:solidFill>
+                            <a:srgbClr val="000000"/>
+                          </a:solidFill>
+                          <a:latin typeface="Arial"/>
+                        </a:rPr>
+                        <a:t>$33.32</a:t>
                       </a:r>
                     </a:p>
                   </a:txBody>
@@ -4924,7 +4924,7 @@
                           </a:solidFill>
                           <a:latin typeface="Arial"/>
                         </a:rPr>
-                        <a:t>0.0</a:t>
+                        <a:t>0.0%</a:t>
                       </a:r>
                     </a:p>
                   </a:txBody>
@@ -4992,29 +4992,29 @@
                           </a:solidFill>
                           <a:latin typeface="Arial"/>
                         </a:rPr>
-                        <a:t>91.0</a:t>
-                      </a:r>
-                    </a:p>
-                  </a:txBody>
-                  <a:tcPr>
-                    <a:solidFill>
-                      <a:srgbClr val="FFFFFF"/>
-                    </a:solidFill>
-                  </a:tcPr>
-                </a:tc>
-                <a:tc>
-                  <a:txBody>
-                    <a:bodyPr/>
-                    <a:lstStyle/>
-                    <a:p>
-                      <a:r>
-                        <a:rPr sz="1100" b="0">
-                          <a:solidFill>
-                            <a:srgbClr val="000000"/>
-                          </a:solidFill>
-                          <a:latin typeface="Arial"/>
-                        </a:rPr>
-                        <a:t>27.689767369212237</a:t>
+                        <a:t>91</a:t>
+                      </a:r>
+                    </a:p>
+                  </a:txBody>
+                  <a:tcPr>
+                    <a:solidFill>
+                      <a:srgbClr val="FFFFFF"/>
+                    </a:solidFill>
+                  </a:tcPr>
+                </a:tc>
+                <a:tc>
+                  <a:txBody>
+                    <a:bodyPr/>
+                    <a:lstStyle/>
+                    <a:p>
+                      <a:r>
+                        <a:rPr sz="1100" b="0">
+                          <a:solidFill>
+                            <a:srgbClr val="000000"/>
+                          </a:solidFill>
+                          <a:latin typeface="Arial"/>
+                        </a:rPr>
+                        <a:t>$27.69</a:t>
                       </a:r>
                     </a:p>
                   </a:txBody>
@@ -5058,7 +5058,7 @@
                           </a:solidFill>
                           <a:latin typeface="Arial"/>
                         </a:rPr>
-                        <a:t>1.0</a:t>
+                        <a:t>100.0%</a:t>
                       </a:r>
                     </a:p>
                   </a:txBody>
@@ -5126,29 +5126,29 @@
                           </a:solidFill>
                           <a:latin typeface="Arial"/>
                         </a:rPr>
-                        <a:t>129.0</a:t>
-                      </a:r>
-                    </a:p>
-                  </a:txBody>
-                  <a:tcPr>
-                    <a:solidFill>
-                      <a:srgbClr val="FFFFFF"/>
-                    </a:solidFill>
-                  </a:tcPr>
-                </a:tc>
-                <a:tc>
-                  <a:txBody>
-                    <a:bodyPr/>
-                    <a:lstStyle/>
-                    <a:p>
-                      <a:r>
-                        <a:rPr sz="1100" b="0">
-                          <a:solidFill>
-                            <a:srgbClr val="000000"/>
-                          </a:solidFill>
-                          <a:latin typeface="Arial"/>
-                        </a:rPr>
-                        <a:t>35.51108001708958</a:t>
+                        <a:t>129</a:t>
+                      </a:r>
+                    </a:p>
+                  </a:txBody>
+                  <a:tcPr>
+                    <a:solidFill>
+                      <a:srgbClr val="FFFFFF"/>
+                    </a:solidFill>
+                  </a:tcPr>
+                </a:tc>
+                <a:tc>
+                  <a:txBody>
+                    <a:bodyPr/>
+                    <a:lstStyle/>
+                    <a:p>
+                      <a:r>
+                        <a:rPr sz="1100" b="0">
+                          <a:solidFill>
+                            <a:srgbClr val="000000"/>
+                          </a:solidFill>
+                          <a:latin typeface="Arial"/>
+                        </a:rPr>
+                        <a:t>$35.51</a:t>
                       </a:r>
                     </a:p>
                   </a:txBody>
@@ -5192,7 +5192,7 @@
                           </a:solidFill>
                           <a:latin typeface="Arial"/>
                         </a:rPr>
-                        <a:t>0.0</a:t>
+                        <a:t>0.0%</a:t>
                       </a:r>
                     </a:p>
                   </a:txBody>
@@ -5260,29 +5260,29 @@
                           </a:solidFill>
                           <a:latin typeface="Arial"/>
                         </a:rPr>
-                        <a:t>57.0</a:t>
-                      </a:r>
-                    </a:p>
-                  </a:txBody>
-                  <a:tcPr>
-                    <a:solidFill>
-                      <a:srgbClr val="FFFFFF"/>
-                    </a:solidFill>
-                  </a:tcPr>
-                </a:tc>
-                <a:tc>
-                  <a:txBody>
-                    <a:bodyPr/>
-                    <a:lstStyle/>
-                    <a:p>
-                      <a:r>
-                        <a:rPr sz="1100" b="0">
-                          <a:solidFill>
-                            <a:srgbClr val="000000"/>
-                          </a:solidFill>
-                          <a:latin typeface="Arial"/>
-                        </a:rPr>
-                        <a:t>32.656333518080054</a:t>
+                        <a:t>57</a:t>
+                      </a:r>
+                    </a:p>
+                  </a:txBody>
+                  <a:tcPr>
+                    <a:solidFill>
+                      <a:srgbClr val="FFFFFF"/>
+                    </a:solidFill>
+                  </a:tcPr>
+                </a:tc>
+                <a:tc>
+                  <a:txBody>
+                    <a:bodyPr/>
+                    <a:lstStyle/>
+                    <a:p>
+                      <a:r>
+                        <a:rPr sz="1100" b="0">
+                          <a:solidFill>
+                            <a:srgbClr val="000000"/>
+                          </a:solidFill>
+                          <a:latin typeface="Arial"/>
+                        </a:rPr>
+                        <a:t>$32.66</a:t>
                       </a:r>
                     </a:p>
                   </a:txBody>
@@ -5326,7 +5326,7 @@
                           </a:solidFill>
                           <a:latin typeface="Arial"/>
                         </a:rPr>
-                        <a:t>1.0</a:t>
+                        <a:t>100.0%</a:t>
                       </a:r>
                     </a:p>
                   </a:txBody>
@@ -5394,29 +5394,29 @@
                           </a:solidFill>
                           <a:latin typeface="Arial"/>
                         </a:rPr>
-                        <a:t>81.0</a:t>
-                      </a:r>
-                    </a:p>
-                  </a:txBody>
-                  <a:tcPr>
-                    <a:solidFill>
-                      <a:srgbClr val="FFFFFF"/>
-                    </a:solidFill>
-                  </a:tcPr>
-                </a:tc>
-                <a:tc>
-                  <a:txBody>
-                    <a:bodyPr/>
-                    <a:lstStyle/>
-                    <a:p>
-                      <a:r>
-                        <a:rPr sz="1100" b="0">
-                          <a:solidFill>
-                            <a:srgbClr val="000000"/>
-                          </a:solidFill>
-                          <a:latin typeface="Arial"/>
-                        </a:rPr>
-                        <a:t>32.07742336225645</a:t>
+                        <a:t>81</a:t>
+                      </a:r>
+                    </a:p>
+                  </a:txBody>
+                  <a:tcPr>
+                    <a:solidFill>
+                      <a:srgbClr val="FFFFFF"/>
+                    </a:solidFill>
+                  </a:tcPr>
+                </a:tc>
+                <a:tc>
+                  <a:txBody>
+                    <a:bodyPr/>
+                    <a:lstStyle/>
+                    <a:p>
+                      <a:r>
+                        <a:rPr sz="1100" b="0">
+                          <a:solidFill>
+                            <a:srgbClr val="000000"/>
+                          </a:solidFill>
+                          <a:latin typeface="Arial"/>
+                        </a:rPr>
+                        <a:t>$32.08</a:t>
                       </a:r>
                     </a:p>
                   </a:txBody>
@@ -5460,7 +5460,7 @@
                           </a:solidFill>
                           <a:latin typeface="Arial"/>
                         </a:rPr>
-                        <a:t>0.0</a:t>
+                        <a:t>0.0%</a:t>
                       </a:r>
                     </a:p>
                   </a:txBody>
@@ -5528,29 +5528,29 @@
                           </a:solidFill>
                           <a:latin typeface="Arial"/>
                         </a:rPr>
-                        <a:t>31.0</a:t>
-                      </a:r>
-                    </a:p>
-                  </a:txBody>
-                  <a:tcPr>
-                    <a:solidFill>
-                      <a:srgbClr val="FFFFFF"/>
-                    </a:solidFill>
-                  </a:tcPr>
-                </a:tc>
-                <a:tc>
-                  <a:txBody>
-                    <a:bodyPr/>
-                    <a:lstStyle/>
-                    <a:p>
-                      <a:r>
-                        <a:rPr sz="1100" b="0">
-                          <a:solidFill>
-                            <a:srgbClr val="000000"/>
-                          </a:solidFill>
-                          <a:latin typeface="Arial"/>
-                        </a:rPr>
-                        <a:t>43.448693252682595</a:t>
+                        <a:t>31</a:t>
+                      </a:r>
+                    </a:p>
+                  </a:txBody>
+                  <a:tcPr>
+                    <a:solidFill>
+                      <a:srgbClr val="FFFFFF"/>
+                    </a:solidFill>
+                  </a:tcPr>
+                </a:tc>
+                <a:tc>
+                  <a:txBody>
+                    <a:bodyPr/>
+                    <a:lstStyle/>
+                    <a:p>
+                      <a:r>
+                        <a:rPr sz="1100" b="0">
+                          <a:solidFill>
+                            <a:srgbClr val="000000"/>
+                          </a:solidFill>
+                          <a:latin typeface="Arial"/>
+                        </a:rPr>
+                        <a:t>$43.45</a:t>
                       </a:r>
                     </a:p>
                   </a:txBody>
@@ -5594,7 +5594,7 @@
                           </a:solidFill>
                           <a:latin typeface="Arial"/>
                         </a:rPr>
-                        <a:t>1.0</a:t>
+                        <a:t>100.0%</a:t>
                       </a:r>
                     </a:p>
                   </a:txBody>

</xml_diff>

<commit_message>
Update test.pptx with new content and formatting changes
</commit_message>
<xml_diff>
--- a/test.pptx
+++ b/test.pptx
@@ -3363,7 +3363,7 @@
         </p:nvGraphicFramePr>
         <p:xfrm>
           <a:off x="457200" y="1371600"/>
-          <a:ext cx="7315200" cy="2743200"/>
+          <a:ext cx="4572000" cy="2743200"/>
         </p:xfrm>
         <a:graphic>
           <a:graphicData uri="http://schemas.openxmlformats.org/drawingml/2006/table">
@@ -3372,11 +3372,11 @@
                 <a:tableStyleId>{5C22544A-7EE6-4342-B048-85BDC9FD1C3A}</a:tableStyleId>
               </a:tblPr>
               <a:tblGrid>
-                <a:gridCol w="1463040"/>
-                <a:gridCol w="1463040"/>
-                <a:gridCol w="1463040"/>
-                <a:gridCol w="1463040"/>
-                <a:gridCol w="1463040"/>
+                <a:gridCol w="914400"/>
+                <a:gridCol w="914400"/>
+                <a:gridCol w="914400"/>
+                <a:gridCol w="914400"/>
+                <a:gridCol w="914400"/>
               </a:tblGrid>
               <a:tr h="457200">
                 <a:tc>
@@ -4115,7 +4115,7 @@
         </p:nvGraphicFramePr>
         <p:xfrm>
           <a:off x="457200" y="1371600"/>
-          <a:ext cx="7315200" cy="2743200"/>
+          <a:ext cx="5486400" cy="2743200"/>
         </p:xfrm>
         <a:graphic>
           <a:graphicData uri="http://schemas.openxmlformats.org/drawingml/2006/table">
@@ -4124,12 +4124,12 @@
                 <a:tableStyleId>{5C22544A-7EE6-4342-B048-85BDC9FD1C3A}</a:tableStyleId>
               </a:tblPr>
               <a:tblGrid>
-                <a:gridCol w="1219200"/>
-                <a:gridCol w="1219200"/>
-                <a:gridCol w="1219200"/>
-                <a:gridCol w="1219200"/>
-                <a:gridCol w="1219200"/>
-                <a:gridCol w="1219200"/>
+                <a:gridCol w="914400"/>
+                <a:gridCol w="914400"/>
+                <a:gridCol w="914400"/>
+                <a:gridCol w="914400"/>
+                <a:gridCol w="914400"/>
+                <a:gridCol w="914400"/>
               </a:tblGrid>
               <a:tr h="249381">
                 <a:tc>

</xml_diff>

<commit_message>
Refactor presentation module and add chart functionality; update configuration settings
</commit_message>
<xml_diff>
--- a/test.pptx
+++ b/test.pptx
@@ -111,6 +111,204 @@
     </p:ext>
   </p:extLst>
 </p:presentation>
+</file>
+
+<file path=ppt/charts/chart1.xml><?xml version="1.0" encoding="utf-8"?>
+<c:chartSpace xmlns:c="http://schemas.openxmlformats.org/drawingml/2006/chart" xmlns:a="http://schemas.openxmlformats.org/drawingml/2006/main" xmlns:r="http://schemas.openxmlformats.org/officeDocument/2006/relationships">
+  <c:date1904 val="0"/>
+  <c:chart>
+    <c:title>
+      <c:layout/>
+      <c:overlay val="0"/>
+    </c:title>
+    <c:autoTitleDeleted val="0"/>
+    <c:plotArea>
+      <c:barChart>
+        <c:barDir val="bar"/>
+        <c:grouping val="stacked"/>
+        <c:ser>
+          <c:idx val="0"/>
+          <c:order val="0"/>
+          <c:tx>
+            <c:strRef>
+              <c:f>Sheet1!$B$1</c:f>
+              <c:strCache>
+                <c:ptCount val="1"/>
+                <c:pt idx="0">
+                  <c:v>True</c:v>
+                </c:pt>
+              </c:strCache>
+            </c:strRef>
+          </c:tx>
+          <c:spPr>
+            <a:solidFill>
+              <a:srgbClr val="3C2F80"/>
+            </a:solidFill>
+          </c:spPr>
+          <c:cat>
+            <c:strRef>
+              <c:f>Sheet1!$A$2:$A$6</c:f>
+              <c:strCache>
+                <c:ptCount val="5"/>
+                <c:pt idx="0">
+                  <c:v>94</c:v>
+                </c:pt>
+                <c:pt idx="1">
+                  <c:v>160</c:v>
+                </c:pt>
+                <c:pt idx="2">
+                  <c:v>176</c:v>
+                </c:pt>
+                <c:pt idx="3">
+                  <c:v>129</c:v>
+                </c:pt>
+                <c:pt idx="4">
+                  <c:v>81</c:v>
+                </c:pt>
+              </c:strCache>
+            </c:strRef>
+          </c:cat>
+          <c:val>
+            <c:numRef>
+              <c:f>Sheet1!$B$2:$B$6</c:f>
+              <c:numCache>
+                <c:formatCode>General</c:formatCode>
+                <c:ptCount val="5"/>
+                <c:pt idx="0">
+                  <c:v>40</c:v>
+                </c:pt>
+                <c:pt idx="1">
+                  <c:v>81</c:v>
+                </c:pt>
+                <c:pt idx="2">
+                  <c:v>91</c:v>
+                </c:pt>
+                <c:pt idx="3">
+                  <c:v>57</c:v>
+                </c:pt>
+                <c:pt idx="4">
+                  <c:v>31</c:v>
+                </c:pt>
+              </c:numCache>
+            </c:numRef>
+          </c:val>
+        </c:ser>
+        <c:dLbls>
+          <c:numFmt formatCode="0" sourceLinked="0"/>
+          <c:txPr>
+            <a:bodyPr/>
+            <a:lstStyle/>
+            <a:p>
+              <a:pPr>
+                <a:defRPr sz="900" b="0">
+                  <a:solidFill>
+                    <a:srgbClr val="FFFFFF"/>
+                  </a:solidFill>
+                  <a:latin typeface="Calibri"/>
+                </a:defRPr>
+              </a:pPr>
+            </a:p>
+          </c:txPr>
+          <c:dLblPos val="ctr"/>
+          <c:showLegendKey val="0"/>
+          <c:showVal val="1"/>
+          <c:showCatName val="0"/>
+          <c:showSerName val="0"/>
+          <c:showPercent val="0"/>
+          <c:showBubbleSize val="0"/>
+          <c:showLeaderLines val="1"/>
+        </c:dLbls>
+        <c:gapWidth/>
+        <c:overlap val="100"/>
+        <c:axId val="-2068027336"/>
+        <c:axId val="-2113994440"/>
+      </c:barChart>
+      <c:catAx>
+        <c:axId val="-2068027336"/>
+        <c:scaling>
+          <c:orientation val="minMax"/>
+        </c:scaling>
+        <c:delete val="0"/>
+        <c:axPos val="l"/>
+        <c:majorTickMark val="out"/>
+        <c:minorTickMark val="none"/>
+        <c:tickLblPos val="nextTo"/>
+        <c:spPr/>
+        <c:txPr>
+          <a:bodyPr/>
+          <a:lstStyle/>
+          <a:p>
+            <a:pPr>
+              <a:defRPr sz="1000">
+                <a:latin typeface="Calibri"/>
+              </a:defRPr>
+            </a:pPr>
+          </a:p>
+        </c:txPr>
+        <c:crossAx val="-2113994440"/>
+        <c:crosses val="autoZero"/>
+        <c:auto val="1"/>
+        <c:lblAlgn val="ctr"/>
+        <c:lblOffset val="100"/>
+        <c:noMultiLvlLbl val="0"/>
+      </c:catAx>
+      <c:valAx>
+        <c:axId val="-2113994440"/>
+        <c:scaling/>
+        <c:delete val="0"/>
+        <c:axPos val="b"/>
+        <c:majorGridlines/>
+        <c:numFmt formatCode="General" sourceLinked="1"/>
+        <c:majorTickMark val="out"/>
+        <c:minorTickMark val="none"/>
+        <c:tickLblPos val="nextTo"/>
+        <c:spPr/>
+        <c:txPr>
+          <a:bodyPr/>
+          <a:lstStyle/>
+          <a:p>
+            <a:pPr>
+              <a:defRPr sz="1000">
+                <a:latin typeface="Calibri"/>
+              </a:defRPr>
+            </a:pPr>
+          </a:p>
+        </c:txPr>
+        <c:crossAx val="-2068027336"/>
+        <c:crosses val="autoZero"/>
+      </c:valAx>
+    </c:plotArea>
+    <c:legend>
+      <c:legendPos val="b"/>
+      <c:overlay val="1"/>
+      <c:txPr>
+        <a:bodyPr/>
+        <a:lstStyle/>
+        <a:p>
+          <a:pPr>
+            <a:defRPr sz="1000">
+              <a:latin typeface="Calibri"/>
+            </a:defRPr>
+          </a:pPr>
+        </a:p>
+      </c:txPr>
+    </c:legend>
+    <c:dispBlanksAs val="gap"/>
+  </c:chart>
+  <c:txPr>
+    <a:bodyPr/>
+    <a:lstStyle/>
+    <a:p>
+      <a:pPr>
+        <a:defRPr sz="1800"/>
+      </a:pPr>
+      <a:endParaRPr lang="en-US"/>
+    </a:p>
+  </c:txPr>
+  <c:externalData r:id="rId1">
+    <c:autoUpdate val="0"/>
+  </c:externalData>
+</c:chartSpace>
 </file>
 
 <file path=ppt/slideLayouts/slideLayout1.xml><?xml version="1.0" encoding="utf-8"?>
@@ -3362,8 +3560,8 @@
           <p:nvPr/>
         </p:nvGraphicFramePr>
         <p:xfrm>
-          <a:off x="457200" y="1371600"/>
-          <a:ext cx="4572000" cy="2743200"/>
+          <a:off x="914400" y="914400"/>
+          <a:ext cx="4389120" cy="2194560"/>
         </p:xfrm>
         <a:graphic>
           <a:graphicData uri="http://schemas.openxmlformats.org/drawingml/2006/table">
@@ -3372,44 +3570,22 @@
                 <a:tableStyleId>{5C22544A-7EE6-4342-B048-85BDC9FD1C3A}</a:tableStyleId>
               </a:tblPr>
               <a:tblGrid>
-                <a:gridCol w="914400"/>
-                <a:gridCol w="914400"/>
-                <a:gridCol w="914400"/>
-                <a:gridCol w="914400"/>
-                <a:gridCol w="914400"/>
+                <a:gridCol w="1097280"/>
+                <a:gridCol w="1097280"/>
+                <a:gridCol w="1097280"/>
+                <a:gridCol w="1097280"/>
               </a:tblGrid>
-              <a:tr h="457200">
-                <a:tc>
-                  <a:txBody>
-                    <a:bodyPr/>
-                    <a:lstStyle/>
-                    <a:p>
-                      <a:r>
-                        <a:rPr sz="1100" b="1">
-                          <a:solidFill>
-                            <a:srgbClr val="000000"/>
-                          </a:solidFill>
-                          <a:latin typeface="Arial"/>
-                        </a:rPr>
-                        <a:t>Product Category</a:t>
-                      </a:r>
-                    </a:p>
-                  </a:txBody>
-                  <a:tcPr anchor="ctr">
-                    <a:solidFill>
-                      <a:srgbClr val="FFFFFF"/>
-                    </a:solidFill>
-                  </a:tcPr>
-                </a:tc>
-                <a:tc>
-                  <a:txBody>
-                    <a:bodyPr/>
-                    <a:lstStyle/>
-                    <a:p>
-                      <a:r>
-                        <a:rPr sz="1100" b="1">
-                          <a:solidFill>
-                            <a:srgbClr val="000000"/>
+              <a:tr h="365760">
+                <a:tc>
+                  <a:txBody>
+                    <a:bodyPr wrap="square"/>
+                    <a:lstStyle/>
+                    <a:p>
+                      <a:pPr algn="ctr"/>
+                      <a:r>
+                        <a:rPr sz="1200" b="1" i="0">
+                          <a:solidFill>
+                            <a:srgbClr val="FFFFFF"/>
                           </a:solidFill>
                           <a:latin typeface="Arial"/>
                         </a:rPr>
@@ -3419,19 +3595,25 @@
                   </a:txBody>
                   <a:tcPr anchor="ctr">
                     <a:solidFill>
-                      <a:srgbClr val="FFFFFF"/>
-                    </a:solidFill>
-                  </a:tcPr>
-                </a:tc>
-                <a:tc>
-                  <a:txBody>
-                    <a:bodyPr/>
-                    <a:lstStyle/>
-                    <a:p>
-                      <a:r>
-                        <a:rPr sz="1100" b="1">
-                          <a:solidFill>
-                            <a:srgbClr val="000000"/>
+                      <a:srgbClr val="0070C0"/>
+                    </a:solidFill>
+                    <a:lnB w="12700" cap="sq">
+                      <a:solidFill>
+                        <a:srgbClr val="000000"/>
+                      </a:solidFill>
+                    </a:lnB>
+                  </a:tcPr>
+                </a:tc>
+                <a:tc>
+                  <a:txBody>
+                    <a:bodyPr wrap="square"/>
+                    <a:lstStyle/>
+                    <a:p>
+                      <a:pPr algn="ctr"/>
+                      <a:r>
+                        <a:rPr sz="1200" b="1" i="0">
+                          <a:solidFill>
+                            <a:srgbClr val="FFFFFF"/>
                           </a:solidFill>
                           <a:latin typeface="Arial"/>
                         </a:rPr>
@@ -3441,19 +3623,25 @@
                   </a:txBody>
                   <a:tcPr anchor="ctr">
                     <a:solidFill>
-                      <a:srgbClr val="FFFFFF"/>
-                    </a:solidFill>
-                  </a:tcPr>
-                </a:tc>
-                <a:tc>
-                  <a:txBody>
-                    <a:bodyPr/>
-                    <a:lstStyle/>
-                    <a:p>
-                      <a:r>
-                        <a:rPr sz="1100" b="1">
-                          <a:solidFill>
-                            <a:srgbClr val="000000"/>
+                      <a:srgbClr val="0070C0"/>
+                    </a:solidFill>
+                    <a:lnB w="12700" cap="sq">
+                      <a:solidFill>
+                        <a:srgbClr val="000000"/>
+                      </a:solidFill>
+                    </a:lnB>
+                  </a:tcPr>
+                </a:tc>
+                <a:tc>
+                  <a:txBody>
+                    <a:bodyPr wrap="square"/>
+                    <a:lstStyle/>
+                    <a:p>
+                      <a:pPr algn="ctr"/>
+                      <a:r>
+                        <a:rPr sz="1200" b="1" i="0">
+                          <a:solidFill>
+                            <a:srgbClr val="FFFFFF"/>
                           </a:solidFill>
                           <a:latin typeface="Arial"/>
                         </a:rPr>
@@ -3463,19 +3651,25 @@
                   </a:txBody>
                   <a:tcPr anchor="ctr">
                     <a:solidFill>
-                      <a:srgbClr val="FFFFFF"/>
-                    </a:solidFill>
-                  </a:tcPr>
-                </a:tc>
-                <a:tc>
-                  <a:txBody>
-                    <a:bodyPr/>
-                    <a:lstStyle/>
-                    <a:p>
-                      <a:r>
-                        <a:rPr sz="1100" b="1">
-                          <a:solidFill>
-                            <a:srgbClr val="000000"/>
+                      <a:srgbClr val="0070C0"/>
+                    </a:solidFill>
+                    <a:lnB w="12700" cap="sq">
+                      <a:solidFill>
+                        <a:srgbClr val="000000"/>
+                      </a:solidFill>
+                    </a:lnB>
+                  </a:tcPr>
+                </a:tc>
+                <a:tc>
+                  <a:txBody>
+                    <a:bodyPr wrap="square"/>
+                    <a:lstStyle/>
+                    <a:p>
+                      <a:pPr algn="ctr"/>
+                      <a:r>
+                        <a:rPr sz="1200" b="1" i="0">
+                          <a:solidFill>
+                            <a:srgbClr val="FFFFFF"/>
                           </a:solidFill>
                           <a:latin typeface="Arial"/>
                         </a:rPr>
@@ -3485,41 +3679,25 @@
                   </a:txBody>
                   <a:tcPr anchor="ctr">
                     <a:solidFill>
-                      <a:srgbClr val="FFFFFF"/>
-                    </a:solidFill>
+                      <a:srgbClr val="0070C0"/>
+                    </a:solidFill>
+                    <a:lnB w="12700" cap="sq">
+                      <a:solidFill>
+                        <a:srgbClr val="000000"/>
+                      </a:solidFill>
+                    </a:lnB>
                   </a:tcPr>
                 </a:tc>
               </a:tr>
-              <a:tr h="457200">
-                <a:tc>
-                  <a:txBody>
-                    <a:bodyPr/>
-                    <a:lstStyle/>
-                    <a:p>
-                      <a:r>
-                        <a:rPr sz="1100" b="1">
-                          <a:solidFill>
-                            <a:srgbClr val="000000"/>
-                          </a:solidFill>
-                          <a:latin typeface="Arial"/>
-                        </a:rPr>
-                        <a:t>Books</a:t>
-                      </a:r>
-                    </a:p>
-                  </a:txBody>
-                  <a:tcPr anchor="ctr">
-                    <a:solidFill>
-                      <a:srgbClr val="FFFFFF"/>
-                    </a:solidFill>
-                  </a:tcPr>
-                </a:tc>
-                <a:tc>
-                  <a:txBody>
-                    <a:bodyPr/>
-                    <a:lstStyle/>
-                    <a:p>
-                      <a:r>
-                        <a:rPr sz="1100" b="0">
+              <a:tr h="365760">
+                <a:tc>
+                  <a:txBody>
+                    <a:bodyPr wrap="square"/>
+                    <a:lstStyle/>
+                    <a:p>
+                      <a:pPr algn="l"/>
+                      <a:r>
+                        <a:rPr sz="1100" b="0" i="0">
                           <a:solidFill>
                             <a:srgbClr val="000000"/>
                           </a:solidFill>
@@ -3529,109 +3707,111 @@
                       </a:r>
                     </a:p>
                   </a:txBody>
-                  <a:tcPr>
-                    <a:solidFill>
-                      <a:srgbClr val="FFFFFF"/>
-                    </a:solidFill>
-                  </a:tcPr>
-                </a:tc>
-                <a:tc>
-                  <a:txBody>
-                    <a:bodyPr/>
-                    <a:lstStyle/>
-                    <a:p>
-                      <a:r>
-                        <a:rPr sz="1100" b="0">
-                          <a:solidFill>
-                            <a:srgbClr val="000000"/>
-                          </a:solidFill>
-                          <a:latin typeface="Arial"/>
-                        </a:rPr>
-                        <a:t>$31.39</a:t>
-                      </a:r>
-                    </a:p>
-                  </a:txBody>
-                  <a:tcPr>
-                    <a:solidFill>
-                      <a:srgbClr val="FFFFFF"/>
-                    </a:solidFill>
-                  </a:tcPr>
-                </a:tc>
-                <a:tc>
-                  <a:txBody>
-                    <a:bodyPr/>
-                    <a:lstStyle/>
-                    <a:p>
-                      <a:r>
-                        <a:rPr sz="1100" b="0">
-                          <a:solidFill>
-                            <a:srgbClr val="000000"/>
-                          </a:solidFill>
-                          <a:latin typeface="Arial"/>
-                        </a:rPr>
-                        <a:t>385.0</a:t>
-                      </a:r>
-                    </a:p>
-                  </a:txBody>
-                  <a:tcPr>
-                    <a:solidFill>
-                      <a:srgbClr val="FFFFFF"/>
-                    </a:solidFill>
-                  </a:tcPr>
-                </a:tc>
-                <a:tc>
-                  <a:txBody>
-                    <a:bodyPr/>
-                    <a:lstStyle/>
-                    <a:p>
-                      <a:r>
-                        <a:rPr sz="1100" b="0">
-                          <a:solidFill>
-                            <a:srgbClr val="000000"/>
-                          </a:solidFill>
-                          <a:latin typeface="Arial"/>
-                        </a:rPr>
-                        <a:t>28.0%</a:t>
-                      </a:r>
-                    </a:p>
-                  </a:txBody>
-                  <a:tcPr>
-                    <a:solidFill>
-                      <a:srgbClr val="FFFFFF"/>
-                    </a:solidFill>
+                  <a:tcPr anchor="ctr">
+                    <a:solidFill>
+                      <a:srgbClr val="FFFFFF"/>
+                    </a:solidFill>
+                    <a:lnB w="12700" cap="sq">
+                      <a:solidFill>
+                        <a:srgbClr val="000000"/>
+                      </a:solidFill>
+                    </a:lnB>
+                  </a:tcPr>
+                </a:tc>
+                <a:tc>
+                  <a:txBody>
+                    <a:bodyPr wrap="square"/>
+                    <a:lstStyle/>
+                    <a:p>
+                      <a:pPr algn="l"/>
+                      <a:r>
+                        <a:rPr sz="1100" b="0" i="0">
+                          <a:solidFill>
+                            <a:srgbClr val="000000"/>
+                          </a:solidFill>
+                          <a:latin typeface="Arial"/>
+                        </a:rPr>
+                        <a:t>31.386236771940364</a:t>
+                      </a:r>
+                    </a:p>
+                  </a:txBody>
+                  <a:tcPr anchor="ctr">
+                    <a:solidFill>
+                      <a:srgbClr val="FFFFFF"/>
+                    </a:solidFill>
+                    <a:lnB w="12700" cap="sq">
+                      <a:solidFill>
+                        <a:srgbClr val="000000"/>
+                      </a:solidFill>
+                    </a:lnB>
+                  </a:tcPr>
+                </a:tc>
+                <a:tc>
+                  <a:txBody>
+                    <a:bodyPr wrap="square"/>
+                    <a:lstStyle/>
+                    <a:p>
+                      <a:pPr algn="l"/>
+                      <a:r>
+                        <a:rPr sz="1100" b="0" i="0">
+                          <a:solidFill>
+                            <a:srgbClr val="000000"/>
+                          </a:solidFill>
+                          <a:latin typeface="Arial"/>
+                        </a:rPr>
+                        <a:t>385</a:t>
+                      </a:r>
+                    </a:p>
+                  </a:txBody>
+                  <a:tcPr anchor="ctr">
+                    <a:solidFill>
+                      <a:srgbClr val="FFFFFF"/>
+                    </a:solidFill>
+                    <a:lnB w="12700" cap="sq">
+                      <a:solidFill>
+                        <a:srgbClr val="000000"/>
+                      </a:solidFill>
+                    </a:lnB>
+                  </a:tcPr>
+                </a:tc>
+                <a:tc>
+                  <a:txBody>
+                    <a:bodyPr wrap="square"/>
+                    <a:lstStyle/>
+                    <a:p>
+                      <a:pPr algn="l"/>
+                      <a:r>
+                        <a:rPr sz="1100" b="0" i="0">
+                          <a:solidFill>
+                            <a:srgbClr val="000000"/>
+                          </a:solidFill>
+                          <a:latin typeface="Arial"/>
+                        </a:rPr>
+                        <a:t>0.27972027972027974</a:t>
+                      </a:r>
+                    </a:p>
+                  </a:txBody>
+                  <a:tcPr anchor="ctr">
+                    <a:solidFill>
+                      <a:srgbClr val="FFFFFF"/>
+                    </a:solidFill>
+                    <a:lnB w="12700" cap="sq">
+                      <a:solidFill>
+                        <a:srgbClr val="000000"/>
+                      </a:solidFill>
+                    </a:lnB>
                   </a:tcPr>
                 </a:tc>
               </a:tr>
-              <a:tr h="457200">
-                <a:tc>
-                  <a:txBody>
-                    <a:bodyPr/>
-                    <a:lstStyle/>
-                    <a:p>
-                      <a:r>
-                        <a:rPr sz="1100" b="1">
-                          <a:solidFill>
-                            <a:srgbClr val="000000"/>
-                          </a:solidFill>
-                          <a:latin typeface="Arial"/>
-                        </a:rPr>
-                        <a:t>Clothing</a:t>
-                      </a:r>
-                    </a:p>
-                  </a:txBody>
-                  <a:tcPr anchor="ctr">
-                    <a:solidFill>
-                      <a:srgbClr val="FFFFFF"/>
-                    </a:solidFill>
-                  </a:tcPr>
-                </a:tc>
-                <a:tc>
-                  <a:txBody>
-                    <a:bodyPr/>
-                    <a:lstStyle/>
-                    <a:p>
-                      <a:r>
-                        <a:rPr sz="1100" b="0">
+              <a:tr h="365760">
+                <a:tc>
+                  <a:txBody>
+                    <a:bodyPr wrap="square"/>
+                    <a:lstStyle/>
+                    <a:p>
+                      <a:pPr algn="l"/>
+                      <a:r>
+                        <a:rPr sz="1100" b="0" i="0">
                           <a:solidFill>
                             <a:srgbClr val="000000"/>
                           </a:solidFill>
@@ -3641,109 +3821,111 @@
                       </a:r>
                     </a:p>
                   </a:txBody>
-                  <a:tcPr>
-                    <a:solidFill>
-                      <a:srgbClr val="FFFFFF"/>
-                    </a:solidFill>
-                  </a:tcPr>
-                </a:tc>
-                <a:tc>
-                  <a:txBody>
-                    <a:bodyPr/>
-                    <a:lstStyle/>
-                    <a:p>
-                      <a:r>
-                        <a:rPr sz="1100" b="0">
-                          <a:solidFill>
-                            <a:srgbClr val="000000"/>
-                          </a:solidFill>
-                          <a:latin typeface="Arial"/>
-                        </a:rPr>
-                        <a:t>$34.70</a:t>
-                      </a:r>
-                    </a:p>
-                  </a:txBody>
-                  <a:tcPr>
-                    <a:solidFill>
-                      <a:srgbClr val="FFFFFF"/>
-                    </a:solidFill>
-                  </a:tcPr>
-                </a:tc>
-                <a:tc>
-                  <a:txBody>
-                    <a:bodyPr/>
-                    <a:lstStyle/>
-                    <a:p>
-                      <a:r>
-                        <a:rPr sz="1100" b="0">
-                          <a:solidFill>
-                            <a:srgbClr val="000000"/>
-                          </a:solidFill>
-                          <a:latin typeface="Arial"/>
-                        </a:rPr>
-                        <a:t>702.0</a:t>
-                      </a:r>
-                    </a:p>
-                  </a:txBody>
-                  <a:tcPr>
-                    <a:solidFill>
-                      <a:srgbClr val="FFFFFF"/>
-                    </a:solidFill>
-                  </a:tcPr>
-                </a:tc>
-                <a:tc>
-                  <a:txBody>
-                    <a:bodyPr/>
-                    <a:lstStyle/>
-                    <a:p>
-                      <a:r>
-                        <a:rPr sz="1100" b="0">
-                          <a:solidFill>
-                            <a:srgbClr val="000000"/>
-                          </a:solidFill>
-                          <a:latin typeface="Arial"/>
-                        </a:rPr>
-                        <a:t>32.3%</a:t>
-                      </a:r>
-                    </a:p>
-                  </a:txBody>
-                  <a:tcPr>
-                    <a:solidFill>
-                      <a:srgbClr val="FFFFFF"/>
-                    </a:solidFill>
+                  <a:tcPr anchor="ctr">
+                    <a:solidFill>
+                      <a:srgbClr val="FFFFFF"/>
+                    </a:solidFill>
+                    <a:lnB w="12700" cap="sq">
+                      <a:solidFill>
+                        <a:srgbClr val="000000"/>
+                      </a:solidFill>
+                    </a:lnB>
+                  </a:tcPr>
+                </a:tc>
+                <a:tc>
+                  <a:txBody>
+                    <a:bodyPr wrap="square"/>
+                    <a:lstStyle/>
+                    <a:p>
+                      <a:pPr algn="l"/>
+                      <a:r>
+                        <a:rPr sz="1100" b="0" i="0">
+                          <a:solidFill>
+                            <a:srgbClr val="000000"/>
+                          </a:solidFill>
+                          <a:latin typeface="Arial"/>
+                        </a:rPr>
+                        <a:t>34.69882070085275</a:t>
+                      </a:r>
+                    </a:p>
+                  </a:txBody>
+                  <a:tcPr anchor="ctr">
+                    <a:solidFill>
+                      <a:srgbClr val="FFFFFF"/>
+                    </a:solidFill>
+                    <a:lnB w="12700" cap="sq">
+                      <a:solidFill>
+                        <a:srgbClr val="000000"/>
+                      </a:solidFill>
+                    </a:lnB>
+                  </a:tcPr>
+                </a:tc>
+                <a:tc>
+                  <a:txBody>
+                    <a:bodyPr wrap="square"/>
+                    <a:lstStyle/>
+                    <a:p>
+                      <a:pPr algn="l"/>
+                      <a:r>
+                        <a:rPr sz="1100" b="0" i="0">
+                          <a:solidFill>
+                            <a:srgbClr val="000000"/>
+                          </a:solidFill>
+                          <a:latin typeface="Arial"/>
+                        </a:rPr>
+                        <a:t>702</a:t>
+                      </a:r>
+                    </a:p>
+                  </a:txBody>
+                  <a:tcPr anchor="ctr">
+                    <a:solidFill>
+                      <a:srgbClr val="FFFFFF"/>
+                    </a:solidFill>
+                    <a:lnB w="12700" cap="sq">
+                      <a:solidFill>
+                        <a:srgbClr val="000000"/>
+                      </a:solidFill>
+                    </a:lnB>
+                  </a:tcPr>
+                </a:tc>
+                <a:tc>
+                  <a:txBody>
+                    <a:bodyPr wrap="square"/>
+                    <a:lstStyle/>
+                    <a:p>
+                      <a:pPr algn="l"/>
+                      <a:r>
+                        <a:rPr sz="1100" b="0" i="0">
+                          <a:solidFill>
+                            <a:srgbClr val="000000"/>
+                          </a:solidFill>
+                          <a:latin typeface="Arial"/>
+                        </a:rPr>
+                        <a:t>0.3228346456692913</a:t>
+                      </a:r>
+                    </a:p>
+                  </a:txBody>
+                  <a:tcPr anchor="ctr">
+                    <a:solidFill>
+                      <a:srgbClr val="FFFFFF"/>
+                    </a:solidFill>
+                    <a:lnB w="12700" cap="sq">
+                      <a:solidFill>
+                        <a:srgbClr val="000000"/>
+                      </a:solidFill>
+                    </a:lnB>
                   </a:tcPr>
                 </a:tc>
               </a:tr>
-              <a:tr h="457200">
-                <a:tc>
-                  <a:txBody>
-                    <a:bodyPr/>
-                    <a:lstStyle/>
-                    <a:p>
-                      <a:r>
-                        <a:rPr sz="1100" b="1">
-                          <a:solidFill>
-                            <a:srgbClr val="000000"/>
-                          </a:solidFill>
-                          <a:latin typeface="Arial"/>
-                        </a:rPr>
-                        <a:t>Electronics</a:t>
-                      </a:r>
-                    </a:p>
-                  </a:txBody>
-                  <a:tcPr anchor="ctr">
-                    <a:solidFill>
-                      <a:srgbClr val="FFFFFF"/>
-                    </a:solidFill>
-                  </a:tcPr>
-                </a:tc>
-                <a:tc>
-                  <a:txBody>
-                    <a:bodyPr/>
-                    <a:lstStyle/>
-                    <a:p>
-                      <a:r>
-                        <a:rPr sz="1100" b="0">
+              <a:tr h="365760">
+                <a:tc>
+                  <a:txBody>
+                    <a:bodyPr wrap="square"/>
+                    <a:lstStyle/>
+                    <a:p>
+                      <a:pPr algn="l"/>
+                      <a:r>
+                        <a:rPr sz="1100" b="0" i="0">
                           <a:solidFill>
                             <a:srgbClr val="000000"/>
                           </a:solidFill>
@@ -3753,109 +3935,111 @@
                       </a:r>
                     </a:p>
                   </a:txBody>
-                  <a:tcPr>
-                    <a:solidFill>
-                      <a:srgbClr val="FFFFFF"/>
-                    </a:solidFill>
-                  </a:tcPr>
-                </a:tc>
-                <a:tc>
-                  <a:txBody>
-                    <a:bodyPr/>
-                    <a:lstStyle/>
-                    <a:p>
-                      <a:r>
-                        <a:rPr sz="1100" b="0">
-                          <a:solidFill>
-                            <a:srgbClr val="000000"/>
-                          </a:solidFill>
-                          <a:latin typeface="Arial"/>
-                        </a:rPr>
-                        <a:t>$31.50</a:t>
-                      </a:r>
-                    </a:p>
-                  </a:txBody>
-                  <a:tcPr>
-                    <a:solidFill>
-                      <a:srgbClr val="FFFFFF"/>
-                    </a:solidFill>
-                  </a:tcPr>
-                </a:tc>
-                <a:tc>
-                  <a:txBody>
-                    <a:bodyPr/>
-                    <a:lstStyle/>
-                    <a:p>
-                      <a:r>
-                        <a:rPr sz="1100" b="0">
-                          <a:solidFill>
-                            <a:srgbClr val="000000"/>
-                          </a:solidFill>
-                          <a:latin typeface="Arial"/>
-                        </a:rPr>
-                        <a:t>787.0</a:t>
-                      </a:r>
-                    </a:p>
-                  </a:txBody>
-                  <a:tcPr>
-                    <a:solidFill>
-                      <a:srgbClr val="FFFFFF"/>
-                    </a:solidFill>
-                  </a:tcPr>
-                </a:tc>
-                <a:tc>
-                  <a:txBody>
-                    <a:bodyPr/>
-                    <a:lstStyle/>
-                    <a:p>
-                      <a:r>
-                        <a:rPr sz="1100" b="0">
-                          <a:solidFill>
-                            <a:srgbClr val="000000"/>
-                          </a:solidFill>
-                          <a:latin typeface="Arial"/>
-                        </a:rPr>
-                        <a:t>32.4%</a:t>
-                      </a:r>
-                    </a:p>
-                  </a:txBody>
-                  <a:tcPr>
-                    <a:solidFill>
-                      <a:srgbClr val="FFFFFF"/>
-                    </a:solidFill>
+                  <a:tcPr anchor="ctr">
+                    <a:solidFill>
+                      <a:srgbClr val="FFFFFF"/>
+                    </a:solidFill>
+                    <a:lnB w="12700" cap="sq">
+                      <a:solidFill>
+                        <a:srgbClr val="000000"/>
+                      </a:solidFill>
+                    </a:lnB>
+                  </a:tcPr>
+                </a:tc>
+                <a:tc>
+                  <a:txBody>
+                    <a:bodyPr wrap="square"/>
+                    <a:lstStyle/>
+                    <a:p>
+                      <a:pPr algn="l"/>
+                      <a:r>
+                        <a:rPr sz="1100" b="0" i="0">
+                          <a:solidFill>
+                            <a:srgbClr val="000000"/>
+                          </a:solidFill>
+                          <a:latin typeface="Arial"/>
+                        </a:rPr>
+                        <a:t>31.499103245204687</a:t>
+                      </a:r>
+                    </a:p>
+                  </a:txBody>
+                  <a:tcPr anchor="ctr">
+                    <a:solidFill>
+                      <a:srgbClr val="FFFFFF"/>
+                    </a:solidFill>
+                    <a:lnB w="12700" cap="sq">
+                      <a:solidFill>
+                        <a:srgbClr val="000000"/>
+                      </a:solidFill>
+                    </a:lnB>
+                  </a:tcPr>
+                </a:tc>
+                <a:tc>
+                  <a:txBody>
+                    <a:bodyPr wrap="square"/>
+                    <a:lstStyle/>
+                    <a:p>
+                      <a:pPr algn="l"/>
+                      <a:r>
+                        <a:rPr sz="1100" b="0" i="0">
+                          <a:solidFill>
+                            <a:srgbClr val="000000"/>
+                          </a:solidFill>
+                          <a:latin typeface="Arial"/>
+                        </a:rPr>
+                        <a:t>787</a:t>
+                      </a:r>
+                    </a:p>
+                  </a:txBody>
+                  <a:tcPr anchor="ctr">
+                    <a:solidFill>
+                      <a:srgbClr val="FFFFFF"/>
+                    </a:solidFill>
+                    <a:lnB w="12700" cap="sq">
+                      <a:solidFill>
+                        <a:srgbClr val="000000"/>
+                      </a:solidFill>
+                    </a:lnB>
+                  </a:tcPr>
+                </a:tc>
+                <a:tc>
+                  <a:txBody>
+                    <a:bodyPr wrap="square"/>
+                    <a:lstStyle/>
+                    <a:p>
+                      <a:pPr algn="l"/>
+                      <a:r>
+                        <a:rPr sz="1100" b="0" i="0">
+                          <a:solidFill>
+                            <a:srgbClr val="000000"/>
+                          </a:solidFill>
+                          <a:latin typeface="Arial"/>
+                        </a:rPr>
+                        <a:t>0.323943661971831</a:t>
+                      </a:r>
+                    </a:p>
+                  </a:txBody>
+                  <a:tcPr anchor="ctr">
+                    <a:solidFill>
+                      <a:srgbClr val="FFFFFF"/>
+                    </a:solidFill>
+                    <a:lnB w="12700" cap="sq">
+                      <a:solidFill>
+                        <a:srgbClr val="000000"/>
+                      </a:solidFill>
+                    </a:lnB>
                   </a:tcPr>
                 </a:tc>
               </a:tr>
-              <a:tr h="457200">
-                <a:tc>
-                  <a:txBody>
-                    <a:bodyPr/>
-                    <a:lstStyle/>
-                    <a:p>
-                      <a:r>
-                        <a:rPr sz="1100" b="1">
-                          <a:solidFill>
-                            <a:srgbClr val="000000"/>
-                          </a:solidFill>
-                          <a:latin typeface="Arial"/>
-                        </a:rPr>
-                        <a:t>Food</a:t>
-                      </a:r>
-                    </a:p>
-                  </a:txBody>
-                  <a:tcPr anchor="ctr">
-                    <a:solidFill>
-                      <a:srgbClr val="FFFFFF"/>
-                    </a:solidFill>
-                  </a:tcPr>
-                </a:tc>
-                <a:tc>
-                  <a:txBody>
-                    <a:bodyPr/>
-                    <a:lstStyle/>
-                    <a:p>
-                      <a:r>
-                        <a:rPr sz="1100" b="0">
+              <a:tr h="365760">
+                <a:tc>
+                  <a:txBody>
+                    <a:bodyPr wrap="square"/>
+                    <a:lstStyle/>
+                    <a:p>
+                      <a:pPr algn="l"/>
+                      <a:r>
+                        <a:rPr sz="1100" b="0" i="0">
                           <a:solidFill>
                             <a:srgbClr val="000000"/>
                           </a:solidFill>
@@ -3865,109 +4049,111 @@
                       </a:r>
                     </a:p>
                   </a:txBody>
-                  <a:tcPr>
-                    <a:solidFill>
-                      <a:srgbClr val="FFFFFF"/>
-                    </a:solidFill>
-                  </a:tcPr>
-                </a:tc>
-                <a:tc>
-                  <a:txBody>
-                    <a:bodyPr/>
-                    <a:lstStyle/>
-                    <a:p>
-                      <a:r>
-                        <a:rPr sz="1100" b="0">
-                          <a:solidFill>
-                            <a:srgbClr val="000000"/>
-                          </a:solidFill>
-                          <a:latin typeface="Arial"/>
-                        </a:rPr>
-                        <a:t>$34.70</a:t>
-                      </a:r>
-                    </a:p>
-                  </a:txBody>
-                  <a:tcPr>
-                    <a:solidFill>
-                      <a:srgbClr val="FFFFFF"/>
-                    </a:solidFill>
-                  </a:tcPr>
-                </a:tc>
-                <a:tc>
-                  <a:txBody>
-                    <a:bodyPr/>
-                    <a:lstStyle/>
-                    <a:p>
-                      <a:r>
-                        <a:rPr sz="1100" b="0">
-                          <a:solidFill>
-                            <a:srgbClr val="000000"/>
-                          </a:solidFill>
-                          <a:latin typeface="Arial"/>
-                        </a:rPr>
-                        <a:t>496.0</a:t>
-                      </a:r>
-                    </a:p>
-                  </a:txBody>
-                  <a:tcPr>
-                    <a:solidFill>
-                      <a:srgbClr val="FFFFFF"/>
-                    </a:solidFill>
-                  </a:tcPr>
-                </a:tc>
-                <a:tc>
-                  <a:txBody>
-                    <a:bodyPr/>
-                    <a:lstStyle/>
-                    <a:p>
-                      <a:r>
-                        <a:rPr sz="1100" b="0">
-                          <a:solidFill>
-                            <a:srgbClr val="000000"/>
-                          </a:solidFill>
-                          <a:latin typeface="Arial"/>
-                        </a:rPr>
-                        <a:t>28.5%</a:t>
-                      </a:r>
-                    </a:p>
-                  </a:txBody>
-                  <a:tcPr>
-                    <a:solidFill>
-                      <a:srgbClr val="FFFFFF"/>
-                    </a:solidFill>
+                  <a:tcPr anchor="ctr">
+                    <a:solidFill>
+                      <a:srgbClr val="FFFFFF"/>
+                    </a:solidFill>
+                    <a:lnB w="12700" cap="sq">
+                      <a:solidFill>
+                        <a:srgbClr val="000000"/>
+                      </a:solidFill>
+                    </a:lnB>
+                  </a:tcPr>
+                </a:tc>
+                <a:tc>
+                  <a:txBody>
+                    <a:bodyPr wrap="square"/>
+                    <a:lstStyle/>
+                    <a:p>
+                      <a:pPr algn="l"/>
+                      <a:r>
+                        <a:rPr sz="1100" b="0" i="0">
+                          <a:solidFill>
+                            <a:srgbClr val="000000"/>
+                          </a:solidFill>
+                          <a:latin typeface="Arial"/>
+                        </a:rPr>
+                        <a:t>34.69747726487187</a:t>
+                      </a:r>
+                    </a:p>
+                  </a:txBody>
+                  <a:tcPr anchor="ctr">
+                    <a:solidFill>
+                      <a:srgbClr val="FFFFFF"/>
+                    </a:solidFill>
+                    <a:lnB w="12700" cap="sq">
+                      <a:solidFill>
+                        <a:srgbClr val="000000"/>
+                      </a:solidFill>
+                    </a:lnB>
+                  </a:tcPr>
+                </a:tc>
+                <a:tc>
+                  <a:txBody>
+                    <a:bodyPr wrap="square"/>
+                    <a:lstStyle/>
+                    <a:p>
+                      <a:pPr algn="l"/>
+                      <a:r>
+                        <a:rPr sz="1100" b="0" i="0">
+                          <a:solidFill>
+                            <a:srgbClr val="000000"/>
+                          </a:solidFill>
+                          <a:latin typeface="Arial"/>
+                        </a:rPr>
+                        <a:t>496</a:t>
+                      </a:r>
+                    </a:p>
+                  </a:txBody>
+                  <a:tcPr anchor="ctr">
+                    <a:solidFill>
+                      <a:srgbClr val="FFFFFF"/>
+                    </a:solidFill>
+                    <a:lnB w="12700" cap="sq">
+                      <a:solidFill>
+                        <a:srgbClr val="000000"/>
+                      </a:solidFill>
+                    </a:lnB>
+                  </a:tcPr>
+                </a:tc>
+                <a:tc>
+                  <a:txBody>
+                    <a:bodyPr wrap="square"/>
+                    <a:lstStyle/>
+                    <a:p>
+                      <a:pPr algn="l"/>
+                      <a:r>
+                        <a:rPr sz="1100" b="0" i="0">
+                          <a:solidFill>
+                            <a:srgbClr val="000000"/>
+                          </a:solidFill>
+                          <a:latin typeface="Arial"/>
+                        </a:rPr>
+                        <a:t>0.285</a:t>
+                      </a:r>
+                    </a:p>
+                  </a:txBody>
+                  <a:tcPr anchor="ctr">
+                    <a:solidFill>
+                      <a:srgbClr val="FFFFFF"/>
+                    </a:solidFill>
+                    <a:lnB w="12700" cap="sq">
+                      <a:solidFill>
+                        <a:srgbClr val="000000"/>
+                      </a:solidFill>
+                    </a:lnB>
                   </a:tcPr>
                 </a:tc>
               </a:tr>
-              <a:tr h="457200">
-                <a:tc>
-                  <a:txBody>
-                    <a:bodyPr/>
-                    <a:lstStyle/>
-                    <a:p>
-                      <a:r>
-                        <a:rPr sz="1100" b="1">
-                          <a:solidFill>
-                            <a:srgbClr val="000000"/>
-                          </a:solidFill>
-                          <a:latin typeface="Arial"/>
-                        </a:rPr>
-                        <a:t>Home</a:t>
-                      </a:r>
-                    </a:p>
-                  </a:txBody>
-                  <a:tcPr anchor="ctr">
-                    <a:solidFill>
-                      <a:srgbClr val="FFFFFF"/>
-                    </a:solidFill>
-                  </a:tcPr>
-                </a:tc>
-                <a:tc>
-                  <a:txBody>
-                    <a:bodyPr/>
-                    <a:lstStyle/>
-                    <a:p>
-                      <a:r>
-                        <a:rPr sz="1100" b="0">
+              <a:tr h="365760">
+                <a:tc>
+                  <a:txBody>
+                    <a:bodyPr wrap="square"/>
+                    <a:lstStyle/>
+                    <a:p>
+                      <a:pPr algn="l"/>
+                      <a:r>
+                        <a:rPr sz="1100" b="0" i="0">
                           <a:solidFill>
                             <a:srgbClr val="000000"/>
                           </a:solidFill>
@@ -3977,76 +4163,99 @@
                       </a:r>
                     </a:p>
                   </a:txBody>
-                  <a:tcPr>
-                    <a:solidFill>
-                      <a:srgbClr val="FFFFFF"/>
-                    </a:solidFill>
-                  </a:tcPr>
-                </a:tc>
-                <a:tc>
-                  <a:txBody>
-                    <a:bodyPr/>
-                    <a:lstStyle/>
-                    <a:p>
-                      <a:r>
-                        <a:rPr sz="1100" b="0">
-                          <a:solidFill>
-                            <a:srgbClr val="000000"/>
-                          </a:solidFill>
-                          <a:latin typeface="Arial"/>
-                        </a:rPr>
-                        <a:t>$35.23</a:t>
-                      </a:r>
-                    </a:p>
-                  </a:txBody>
-                  <a:tcPr>
-                    <a:solidFill>
-                      <a:srgbClr val="FFFFFF"/>
-                    </a:solidFill>
-                  </a:tcPr>
-                </a:tc>
-                <a:tc>
-                  <a:txBody>
-                    <a:bodyPr/>
-                    <a:lstStyle/>
-                    <a:p>
-                      <a:r>
-                        <a:rPr sz="1100" b="0">
-                          <a:solidFill>
-                            <a:srgbClr val="000000"/>
-                          </a:solidFill>
-                          <a:latin typeface="Arial"/>
-                        </a:rPr>
-                        <a:t>316.0</a:t>
-                      </a:r>
-                    </a:p>
-                  </a:txBody>
-                  <a:tcPr>
-                    <a:solidFill>
-                      <a:srgbClr val="FFFFFF"/>
-                    </a:solidFill>
-                  </a:tcPr>
-                </a:tc>
-                <a:tc>
-                  <a:txBody>
-                    <a:bodyPr/>
-                    <a:lstStyle/>
-                    <a:p>
-                      <a:r>
-                        <a:rPr sz="1100" b="0">
-                          <a:solidFill>
-                            <a:srgbClr val="000000"/>
-                          </a:solidFill>
-                          <a:latin typeface="Arial"/>
-                        </a:rPr>
-                        <a:t>27.7%</a:t>
-                      </a:r>
-                    </a:p>
-                  </a:txBody>
-                  <a:tcPr>
-                    <a:solidFill>
-                      <a:srgbClr val="FFFFFF"/>
-                    </a:solidFill>
+                  <a:tcPr anchor="ctr">
+                    <a:solidFill>
+                      <a:srgbClr val="FFFFFF"/>
+                    </a:solidFill>
+                    <a:lnB w="12700" cap="sq">
+                      <a:solidFill>
+                        <a:srgbClr val="000000"/>
+                      </a:solidFill>
+                    </a:lnB>
+                  </a:tcPr>
+                </a:tc>
+                <a:tc>
+                  <a:txBody>
+                    <a:bodyPr wrap="square"/>
+                    <a:lstStyle/>
+                    <a:p>
+                      <a:pPr algn="l"/>
+                      <a:r>
+                        <a:rPr sz="1100" b="0" i="0">
+                          <a:solidFill>
+                            <a:srgbClr val="000000"/>
+                          </a:solidFill>
+                          <a:latin typeface="Arial"/>
+                        </a:rPr>
+                        <a:t>35.230800726828406</a:t>
+                      </a:r>
+                    </a:p>
+                  </a:txBody>
+                  <a:tcPr anchor="ctr">
+                    <a:solidFill>
+                      <a:srgbClr val="FFFFFF"/>
+                    </a:solidFill>
+                    <a:lnB w="12700" cap="sq">
+                      <a:solidFill>
+                        <a:srgbClr val="000000"/>
+                      </a:solidFill>
+                    </a:lnB>
+                  </a:tcPr>
+                </a:tc>
+                <a:tc>
+                  <a:txBody>
+                    <a:bodyPr wrap="square"/>
+                    <a:lstStyle/>
+                    <a:p>
+                      <a:pPr algn="l"/>
+                      <a:r>
+                        <a:rPr sz="1100" b="0" i="0">
+                          <a:solidFill>
+                            <a:srgbClr val="000000"/>
+                          </a:solidFill>
+                          <a:latin typeface="Arial"/>
+                        </a:rPr>
+                        <a:t>316</a:t>
+                      </a:r>
+                    </a:p>
+                  </a:txBody>
+                  <a:tcPr anchor="ctr">
+                    <a:solidFill>
+                      <a:srgbClr val="FFFFFF"/>
+                    </a:solidFill>
+                    <a:lnB w="12700" cap="sq">
+                      <a:solidFill>
+                        <a:srgbClr val="000000"/>
+                      </a:solidFill>
+                    </a:lnB>
+                  </a:tcPr>
+                </a:tc>
+                <a:tc>
+                  <a:txBody>
+                    <a:bodyPr wrap="square"/>
+                    <a:lstStyle/>
+                    <a:p>
+                      <a:pPr algn="l"/>
+                      <a:r>
+                        <a:rPr sz="1100" b="0" i="0">
+                          <a:solidFill>
+                            <a:srgbClr val="000000"/>
+                          </a:solidFill>
+                          <a:latin typeface="Arial"/>
+                        </a:rPr>
+                        <a:t>0.2773109243697479</a:t>
+                      </a:r>
+                    </a:p>
+                  </a:txBody>
+                  <a:tcPr anchor="ctr">
+                    <a:solidFill>
+                      <a:srgbClr val="FFFFFF"/>
+                    </a:solidFill>
+                    <a:lnB w="12700" cap="sq">
+                      <a:solidFill>
+                        <a:srgbClr val="000000"/>
+                      </a:solidFill>
+                    </a:lnB>
                   </a:tcPr>
                 </a:tc>
               </a:tr>
@@ -4114,8 +4323,8 @@
           <p:nvPr/>
         </p:nvGraphicFramePr>
         <p:xfrm>
-          <a:off x="457200" y="1371600"/>
-          <a:ext cx="5486400" cy="2743200"/>
+          <a:off x="457200" y="1097280"/>
+          <a:ext cx="4846320" cy="3017520"/>
         </p:xfrm>
         <a:graphic>
           <a:graphicData uri="http://schemas.openxmlformats.org/drawingml/2006/table">
@@ -4125,66 +4334,79 @@
               </a:tblPr>
               <a:tblGrid>
                 <a:gridCol w="914400"/>
-                <a:gridCol w="914400"/>
-                <a:gridCol w="914400"/>
-                <a:gridCol w="914400"/>
-                <a:gridCol w="914400"/>
-                <a:gridCol w="914400"/>
+                <a:gridCol w="1371600"/>
+                <a:gridCol w="640080"/>
+                <a:gridCol w="640080"/>
+                <a:gridCol w="640080"/>
+                <a:gridCol w="640080"/>
               </a:tblGrid>
-              <a:tr h="249381">
-                <a:tc>
-                  <a:txBody>
-                    <a:bodyPr/>
-                    <a:lstStyle/>
-                    <a:p>
-                      <a:r>
-                        <a:rPr sz="1100" b="1">
-                          <a:solidFill>
-                            <a:srgbClr val="000000"/>
-                          </a:solidFill>
-                          <a:latin typeface="Arial"/>
-                        </a:rPr>
-                        <a:t>Product Category</a:t>
-                      </a:r>
-                    </a:p>
-                  </a:txBody>
-                  <a:tcPr anchor="ctr">
-                    <a:solidFill>
-                      <a:srgbClr val="FFFFFF"/>
-                    </a:solidFill>
-                  </a:tcPr>
-                </a:tc>
-                <a:tc>
-                  <a:txBody>
-                    <a:bodyPr/>
-                    <a:lstStyle/>
-                    <a:p>
-                      <a:r>
-                        <a:rPr sz="1100" b="1">
-                          <a:solidFill>
-                            <a:srgbClr val="000000"/>
-                          </a:solidFill>
-                          <a:latin typeface="Arial"/>
-                        </a:rPr>
-                        <a:t>Discounted</a:t>
-                      </a:r>
-                    </a:p>
-                  </a:txBody>
-                  <a:tcPr anchor="ctr">
-                    <a:solidFill>
-                      <a:srgbClr val="FFFFFF"/>
-                    </a:solidFill>
-                  </a:tcPr>
-                </a:tc>
-                <a:tc>
-                  <a:txBody>
-                    <a:bodyPr/>
-                    <a:lstStyle/>
-                    <a:p>
-                      <a:r>
-                        <a:rPr sz="1100" b="1">
-                          <a:solidFill>
-                            <a:srgbClr val="000000"/>
+              <a:tr h="274320">
+                <a:tc>
+                  <a:txBody>
+                    <a:bodyPr wrap="square"/>
+                    <a:lstStyle/>
+                    <a:p>
+                      <a:pPr algn="ctr"/>
+                      <a:r>
+                        <a:rPr sz="1200" b="1" i="0">
+                          <a:solidFill>
+                            <a:srgbClr val="FFFFFF"/>
+                          </a:solidFill>
+                          <a:latin typeface="Arial"/>
+                        </a:rPr>
+                        <a:t>product_category</a:t>
+                      </a:r>
+                    </a:p>
+                  </a:txBody>
+                  <a:tcPr anchor="ctr">
+                    <a:solidFill>
+                      <a:srgbClr val="0070C0"/>
+                    </a:solidFill>
+                    <a:lnB w="12700" cap="sq">
+                      <a:solidFill>
+                        <a:srgbClr val="000000"/>
+                      </a:solidFill>
+                    </a:lnB>
+                  </a:tcPr>
+                </a:tc>
+                <a:tc>
+                  <a:txBody>
+                    <a:bodyPr wrap="square"/>
+                    <a:lstStyle/>
+                    <a:p>
+                      <a:pPr algn="ctr"/>
+                      <a:r>
+                        <a:rPr sz="1200" b="1" i="0">
+                          <a:solidFill>
+                            <a:srgbClr val="FFFFFF"/>
+                          </a:solidFill>
+                          <a:latin typeface="Arial"/>
+                        </a:rPr>
+                        <a:t>is_discounted</a:t>
+                      </a:r>
+                    </a:p>
+                  </a:txBody>
+                  <a:tcPr anchor="ctr">
+                    <a:solidFill>
+                      <a:srgbClr val="0070C0"/>
+                    </a:solidFill>
+                    <a:lnB w="12700" cap="sq">
+                      <a:solidFill>
+                        <a:srgbClr val="000000"/>
+                      </a:solidFill>
+                    </a:lnB>
+                  </a:tcPr>
+                </a:tc>
+                <a:tc>
+                  <a:txBody>
+                    <a:bodyPr wrap="square"/>
+                    <a:lstStyle/>
+                    <a:p>
+                      <a:pPr algn="ctr"/>
+                      <a:r>
+                        <a:rPr sz="1200" b="1" i="0">
+                          <a:solidFill>
+                            <a:srgbClr val="FFFFFF"/>
                           </a:solidFill>
                           <a:latin typeface="Arial"/>
                         </a:rPr>
@@ -4194,19 +4416,25 @@
                   </a:txBody>
                   <a:tcPr anchor="ctr">
                     <a:solidFill>
-                      <a:srgbClr val="FFFFFF"/>
-                    </a:solidFill>
-                  </a:tcPr>
-                </a:tc>
-                <a:tc>
-                  <a:txBody>
-                    <a:bodyPr/>
-                    <a:lstStyle/>
-                    <a:p>
-                      <a:r>
-                        <a:rPr sz="1100" b="1">
-                          <a:solidFill>
-                            <a:srgbClr val="000000"/>
+                      <a:srgbClr val="0070C0"/>
+                    </a:solidFill>
+                    <a:lnB w="12700" cap="sq">
+                      <a:solidFill>
+                        <a:srgbClr val="000000"/>
+                      </a:solidFill>
+                    </a:lnB>
+                  </a:tcPr>
+                </a:tc>
+                <a:tc>
+                  <a:txBody>
+                    <a:bodyPr wrap="square"/>
+                    <a:lstStyle/>
+                    <a:p>
+                      <a:pPr algn="ctr"/>
+                      <a:r>
+                        <a:rPr sz="1200" b="1" i="0">
+                          <a:solidFill>
+                            <a:srgbClr val="FFFFFF"/>
                           </a:solidFill>
                           <a:latin typeface="Arial"/>
                         </a:rPr>
@@ -4216,19 +4444,25 @@
                   </a:txBody>
                   <a:tcPr anchor="ctr">
                     <a:solidFill>
-                      <a:srgbClr val="FFFFFF"/>
-                    </a:solidFill>
-                  </a:tcPr>
-                </a:tc>
-                <a:tc>
-                  <a:txBody>
-                    <a:bodyPr/>
-                    <a:lstStyle/>
-                    <a:p>
-                      <a:r>
-                        <a:rPr sz="1100" b="1">
-                          <a:solidFill>
-                            <a:srgbClr val="000000"/>
+                      <a:srgbClr val="0070C0"/>
+                    </a:solidFill>
+                    <a:lnB w="12700" cap="sq">
+                      <a:solidFill>
+                        <a:srgbClr val="000000"/>
+                      </a:solidFill>
+                    </a:lnB>
+                  </a:tcPr>
+                </a:tc>
+                <a:tc>
+                  <a:txBody>
+                    <a:bodyPr wrap="square"/>
+                    <a:lstStyle/>
+                    <a:p>
+                      <a:pPr algn="ctr"/>
+                      <a:r>
+                        <a:rPr sz="1200" b="1" i="0">
+                          <a:solidFill>
+                            <a:srgbClr val="FFFFFF"/>
                           </a:solidFill>
                           <a:latin typeface="Arial"/>
                         </a:rPr>
@@ -4238,19 +4472,25 @@
                   </a:txBody>
                   <a:tcPr anchor="ctr">
                     <a:solidFill>
-                      <a:srgbClr val="FFFFFF"/>
-                    </a:solidFill>
-                  </a:tcPr>
-                </a:tc>
-                <a:tc>
-                  <a:txBody>
-                    <a:bodyPr/>
-                    <a:lstStyle/>
-                    <a:p>
-                      <a:r>
-                        <a:rPr sz="1100" b="1">
-                          <a:solidFill>
-                            <a:srgbClr val="000000"/>
+                      <a:srgbClr val="0070C0"/>
+                    </a:solidFill>
+                    <a:lnB w="12700" cap="sq">
+                      <a:solidFill>
+                        <a:srgbClr val="000000"/>
+                      </a:solidFill>
+                    </a:lnB>
+                  </a:tcPr>
+                </a:tc>
+                <a:tc>
+                  <a:txBody>
+                    <a:bodyPr wrap="square"/>
+                    <a:lstStyle/>
+                    <a:p>
+                      <a:pPr algn="ctr"/>
+                      <a:r>
+                        <a:rPr sz="1200" b="1" i="0">
+                          <a:solidFill>
+                            <a:srgbClr val="FFFFFF"/>
                           </a:solidFill>
                           <a:latin typeface="Arial"/>
                         </a:rPr>
@@ -4260,19 +4500,25 @@
                   </a:txBody>
                   <a:tcPr anchor="ctr">
                     <a:solidFill>
-                      <a:srgbClr val="FFFFFF"/>
-                    </a:solidFill>
+                      <a:srgbClr val="0070C0"/>
+                    </a:solidFill>
+                    <a:lnB w="12700" cap="sq">
+                      <a:solidFill>
+                        <a:srgbClr val="000000"/>
+                      </a:solidFill>
+                    </a:lnB>
                   </a:tcPr>
                 </a:tc>
               </a:tr>
-              <a:tr h="249381">
-                <a:tc>
-                  <a:txBody>
-                    <a:bodyPr/>
-                    <a:lstStyle/>
-                    <a:p>
-                      <a:r>
-                        <a:rPr sz="1100" b="1">
+              <a:tr h="274320">
+                <a:tc>
+                  <a:txBody>
+                    <a:bodyPr wrap="square"/>
+                    <a:lstStyle/>
+                    <a:p>
+                      <a:pPr algn="l"/>
+                      <a:r>
+                        <a:rPr sz="1100" b="0" i="0">
                           <a:solidFill>
                             <a:srgbClr val="000000"/>
                           </a:solidFill>
@@ -4286,15 +4532,21 @@
                     <a:solidFill>
                       <a:srgbClr val="FFFFFF"/>
                     </a:solidFill>
-                  </a:tcPr>
-                </a:tc>
-                <a:tc>
-                  <a:txBody>
-                    <a:bodyPr/>
-                    <a:lstStyle/>
-                    <a:p>
-                      <a:r>
-                        <a:rPr sz="1100" b="1">
+                    <a:lnB w="12700" cap="sq">
+                      <a:solidFill>
+                        <a:srgbClr val="000000"/>
+                      </a:solidFill>
+                    </a:lnB>
+                  </a:tcPr>
+                </a:tc>
+                <a:tc>
+                  <a:txBody>
+                    <a:bodyPr wrap="square"/>
+                    <a:lstStyle/>
+                    <a:p>
+                      <a:pPr algn="l"/>
+                      <a:r>
+                        <a:rPr sz="1100" b="0" i="0">
                           <a:solidFill>
                             <a:srgbClr val="000000"/>
                           </a:solidFill>
@@ -4308,15 +4560,21 @@
                     <a:solidFill>
                       <a:srgbClr val="FFFFFF"/>
                     </a:solidFill>
-                  </a:tcPr>
-                </a:tc>
-                <a:tc>
-                  <a:txBody>
-                    <a:bodyPr/>
-                    <a:lstStyle/>
-                    <a:p>
-                      <a:r>
-                        <a:rPr sz="1100" b="0">
+                    <a:lnB w="12700" cap="sq">
+                      <a:solidFill>
+                        <a:srgbClr val="000000"/>
+                      </a:solidFill>
+                    </a:lnB>
+                  </a:tcPr>
+                </a:tc>
+                <a:tc>
+                  <a:txBody>
+                    <a:bodyPr wrap="square"/>
+                    <a:lstStyle/>
+                    <a:p>
+                      <a:pPr algn="l"/>
+                      <a:r>
+                        <a:rPr sz="1100" b="0" i="0">
                           <a:solidFill>
                             <a:srgbClr val="000000"/>
                           </a:solidFill>
@@ -4326,87 +4584,111 @@
                       </a:r>
                     </a:p>
                   </a:txBody>
-                  <a:tcPr>
-                    <a:solidFill>
-                      <a:srgbClr val="FFFFFF"/>
-                    </a:solidFill>
-                  </a:tcPr>
-                </a:tc>
-                <a:tc>
-                  <a:txBody>
-                    <a:bodyPr/>
-                    <a:lstStyle/>
-                    <a:p>
-                      <a:r>
-                        <a:rPr sz="1100" b="0">
-                          <a:solidFill>
-                            <a:srgbClr val="000000"/>
-                          </a:solidFill>
-                          <a:latin typeface="Arial"/>
-                        </a:rPr>
-                        <a:t>$30.71</a:t>
-                      </a:r>
-                    </a:p>
-                  </a:txBody>
-                  <a:tcPr>
-                    <a:solidFill>
-                      <a:srgbClr val="FFFFFF"/>
-                    </a:solidFill>
-                  </a:tcPr>
-                </a:tc>
-                <a:tc>
-                  <a:txBody>
-                    <a:bodyPr/>
-                    <a:lstStyle/>
-                    <a:p>
-                      <a:r>
-                        <a:rPr sz="1100" b="0">
-                          <a:solidFill>
-                            <a:srgbClr val="000000"/>
-                          </a:solidFill>
-                          <a:latin typeface="Arial"/>
-                        </a:rPr>
-                        <a:t>278.0</a:t>
-                      </a:r>
-                    </a:p>
-                  </a:txBody>
-                  <a:tcPr>
-                    <a:solidFill>
-                      <a:srgbClr val="FFFFFF"/>
-                    </a:solidFill>
-                  </a:tcPr>
-                </a:tc>
-                <a:tc>
-                  <a:txBody>
-                    <a:bodyPr/>
-                    <a:lstStyle/>
-                    <a:p>
-                      <a:r>
-                        <a:rPr sz="1100" b="0">
-                          <a:solidFill>
-                            <a:srgbClr val="000000"/>
-                          </a:solidFill>
-                          <a:latin typeface="Arial"/>
-                        </a:rPr>
-                        <a:t>0.0%</a:t>
-                      </a:r>
-                    </a:p>
-                  </a:txBody>
-                  <a:tcPr>
-                    <a:solidFill>
-                      <a:srgbClr val="FFFFFF"/>
-                    </a:solidFill>
+                  <a:tcPr anchor="ctr">
+                    <a:solidFill>
+                      <a:srgbClr val="FFFFFF"/>
+                    </a:solidFill>
+                    <a:lnB w="12700" cap="sq">
+                      <a:solidFill>
+                        <a:srgbClr val="000000"/>
+                      </a:solidFill>
+                    </a:lnB>
+                  </a:tcPr>
+                </a:tc>
+                <a:tc>
+                  <a:txBody>
+                    <a:bodyPr wrap="square"/>
+                    <a:lstStyle/>
+                    <a:p>
+                      <a:pPr algn="l"/>
+                      <a:r>
+                        <a:rPr sz="1100" b="0" i="0">
+                          <a:solidFill>
+                            <a:srgbClr val="000000"/>
+                          </a:solidFill>
+                          <a:latin typeface="Arial"/>
+                        </a:rPr>
+                        <a:t>30.70765839482025</a:t>
+                      </a:r>
+                    </a:p>
+                  </a:txBody>
+                  <a:tcPr anchor="ctr">
+                    <a:solidFill>
+                      <a:srgbClr val="FFFFFF"/>
+                    </a:solidFill>
+                    <a:lnB w="12700" cap="sq">
+                      <a:solidFill>
+                        <a:srgbClr val="000000"/>
+                      </a:solidFill>
+                    </a:lnB>
+                  </a:tcPr>
+                </a:tc>
+                <a:tc>
+                  <a:txBody>
+                    <a:bodyPr wrap="square"/>
+                    <a:lstStyle/>
+                    <a:p>
+                      <a:pPr algn="l"/>
+                      <a:r>
+                        <a:rPr sz="1100" b="0" i="0">
+                          <a:solidFill>
+                            <a:srgbClr val="000000"/>
+                          </a:solidFill>
+                          <a:latin typeface="Arial"/>
+                        </a:rPr>
+                        <a:t>278</a:t>
+                      </a:r>
+                    </a:p>
+                  </a:txBody>
+                  <a:tcPr anchor="ctr">
+                    <a:solidFill>
+                      <a:srgbClr val="FFFFFF"/>
+                    </a:solidFill>
+                    <a:lnB w="12700" cap="sq">
+                      <a:solidFill>
+                        <a:srgbClr val="000000"/>
+                      </a:solidFill>
+                    </a:lnB>
+                  </a:tcPr>
+                </a:tc>
+                <a:tc>
+                  <a:txBody>
+                    <a:bodyPr wrap="square"/>
+                    <a:lstStyle/>
+                    <a:p>
+                      <a:pPr algn="l"/>
+                      <a:r>
+                        <a:rPr sz="1100" b="0" i="0">
+                          <a:solidFill>
+                            <a:srgbClr val="000000"/>
+                          </a:solidFill>
+                          <a:latin typeface="Arial"/>
+                        </a:rPr>
+                        <a:t>0.0</a:t>
+                      </a:r>
+                    </a:p>
+                  </a:txBody>
+                  <a:tcPr anchor="ctr">
+                    <a:solidFill>
+                      <a:srgbClr val="FFFFFF"/>
+                    </a:solidFill>
+                    <a:lnB w="12700" cap="sq">
+                      <a:solidFill>
+                        <a:srgbClr val="000000"/>
+                      </a:solidFill>
+                    </a:lnB>
                   </a:tcPr>
                 </a:tc>
               </a:tr>
-              <a:tr h="249381">
-                <a:tc>
-                  <a:txBody>
-                    <a:bodyPr/>
-                    <a:lstStyle/>
-                    <a:p>
-                      <a:r>
-                        <a:rPr sz="1100" b="1">
+              <a:tr h="274320">
+                <a:tc>
+                  <a:txBody>
+                    <a:bodyPr wrap="square"/>
+                    <a:lstStyle/>
+                    <a:p>
+                      <a:pPr algn="l"/>
+                      <a:r>
+                        <a:rPr sz="1100" b="0" i="0">
                           <a:solidFill>
                             <a:srgbClr val="000000"/>
                           </a:solidFill>
@@ -4420,15 +4702,21 @@
                     <a:solidFill>
                       <a:srgbClr val="FFFFFF"/>
                     </a:solidFill>
-                  </a:tcPr>
-                </a:tc>
-                <a:tc>
-                  <a:txBody>
-                    <a:bodyPr/>
-                    <a:lstStyle/>
-                    <a:p>
-                      <a:r>
-                        <a:rPr sz="1100" b="1">
+                    <a:lnB w="12700" cap="sq">
+                      <a:solidFill>
+                        <a:srgbClr val="000000"/>
+                      </a:solidFill>
+                    </a:lnB>
+                  </a:tcPr>
+                </a:tc>
+                <a:tc>
+                  <a:txBody>
+                    <a:bodyPr wrap="square"/>
+                    <a:lstStyle/>
+                    <a:p>
+                      <a:pPr algn="l"/>
+                      <a:r>
+                        <a:rPr sz="1100" b="0" i="0">
                           <a:solidFill>
                             <a:srgbClr val="000000"/>
                           </a:solidFill>
@@ -4442,15 +4730,21 @@
                     <a:solidFill>
                       <a:srgbClr val="FFFFFF"/>
                     </a:solidFill>
-                  </a:tcPr>
-                </a:tc>
-                <a:tc>
-                  <a:txBody>
-                    <a:bodyPr/>
-                    <a:lstStyle/>
-                    <a:p>
-                      <a:r>
-                        <a:rPr sz="1100" b="0">
+                    <a:lnB w="12700" cap="sq">
+                      <a:solidFill>
+                        <a:srgbClr val="000000"/>
+                      </a:solidFill>
+                    </a:lnB>
+                  </a:tcPr>
+                </a:tc>
+                <a:tc>
+                  <a:txBody>
+                    <a:bodyPr wrap="square"/>
+                    <a:lstStyle/>
+                    <a:p>
+                      <a:pPr algn="l"/>
+                      <a:r>
+                        <a:rPr sz="1100" b="0" i="0">
                           <a:solidFill>
                             <a:srgbClr val="000000"/>
                           </a:solidFill>
@@ -4460,87 +4754,111 @@
                       </a:r>
                     </a:p>
                   </a:txBody>
-                  <a:tcPr>
-                    <a:solidFill>
-                      <a:srgbClr val="FFFFFF"/>
-                    </a:solidFill>
-                  </a:tcPr>
-                </a:tc>
-                <a:tc>
-                  <a:txBody>
-                    <a:bodyPr/>
-                    <a:lstStyle/>
-                    <a:p>
-                      <a:r>
-                        <a:rPr sz="1100" b="0">
-                          <a:solidFill>
-                            <a:srgbClr val="000000"/>
-                          </a:solidFill>
-                          <a:latin typeface="Arial"/>
-                        </a:rPr>
-                        <a:t>$33.13</a:t>
-                      </a:r>
-                    </a:p>
-                  </a:txBody>
-                  <a:tcPr>
-                    <a:solidFill>
-                      <a:srgbClr val="FFFFFF"/>
-                    </a:solidFill>
-                  </a:tcPr>
-                </a:tc>
-                <a:tc>
-                  <a:txBody>
-                    <a:bodyPr/>
-                    <a:lstStyle/>
-                    <a:p>
-                      <a:r>
-                        <a:rPr sz="1100" b="0">
-                          <a:solidFill>
-                            <a:srgbClr val="000000"/>
-                          </a:solidFill>
-                          <a:latin typeface="Arial"/>
-                        </a:rPr>
-                        <a:t>107.0</a:t>
-                      </a:r>
-                    </a:p>
-                  </a:txBody>
-                  <a:tcPr>
-                    <a:solidFill>
-                      <a:srgbClr val="FFFFFF"/>
-                    </a:solidFill>
-                  </a:tcPr>
-                </a:tc>
-                <a:tc>
-                  <a:txBody>
-                    <a:bodyPr/>
-                    <a:lstStyle/>
-                    <a:p>
-                      <a:r>
-                        <a:rPr sz="1100" b="0">
-                          <a:solidFill>
-                            <a:srgbClr val="000000"/>
-                          </a:solidFill>
-                          <a:latin typeface="Arial"/>
-                        </a:rPr>
-                        <a:t>100.0%</a:t>
-                      </a:r>
-                    </a:p>
-                  </a:txBody>
-                  <a:tcPr>
-                    <a:solidFill>
-                      <a:srgbClr val="FFFFFF"/>
-                    </a:solidFill>
+                  <a:tcPr anchor="ctr">
+                    <a:solidFill>
+                      <a:srgbClr val="FFFFFF"/>
+                    </a:solidFill>
+                    <a:lnB w="12700" cap="sq">
+                      <a:solidFill>
+                        <a:srgbClr val="000000"/>
+                      </a:solidFill>
+                    </a:lnB>
+                  </a:tcPr>
+                </a:tc>
+                <a:tc>
+                  <a:txBody>
+                    <a:bodyPr wrap="square"/>
+                    <a:lstStyle/>
+                    <a:p>
+                      <a:pPr algn="l"/>
+                      <a:r>
+                        <a:rPr sz="1100" b="0" i="0">
+                          <a:solidFill>
+                            <a:srgbClr val="000000"/>
+                          </a:solidFill>
+                          <a:latin typeface="Arial"/>
+                        </a:rPr>
+                        <a:t>33.133576093024644</a:t>
+                      </a:r>
+                    </a:p>
+                  </a:txBody>
+                  <a:tcPr anchor="ctr">
+                    <a:solidFill>
+                      <a:srgbClr val="FFFFFF"/>
+                    </a:solidFill>
+                    <a:lnB w="12700" cap="sq">
+                      <a:solidFill>
+                        <a:srgbClr val="000000"/>
+                      </a:solidFill>
+                    </a:lnB>
+                  </a:tcPr>
+                </a:tc>
+                <a:tc>
+                  <a:txBody>
+                    <a:bodyPr wrap="square"/>
+                    <a:lstStyle/>
+                    <a:p>
+                      <a:pPr algn="l"/>
+                      <a:r>
+                        <a:rPr sz="1100" b="0" i="0">
+                          <a:solidFill>
+                            <a:srgbClr val="000000"/>
+                          </a:solidFill>
+                          <a:latin typeface="Arial"/>
+                        </a:rPr>
+                        <a:t>107</a:t>
+                      </a:r>
+                    </a:p>
+                  </a:txBody>
+                  <a:tcPr anchor="ctr">
+                    <a:solidFill>
+                      <a:srgbClr val="FFFFFF"/>
+                    </a:solidFill>
+                    <a:lnB w="12700" cap="sq">
+                      <a:solidFill>
+                        <a:srgbClr val="000000"/>
+                      </a:solidFill>
+                    </a:lnB>
+                  </a:tcPr>
+                </a:tc>
+                <a:tc>
+                  <a:txBody>
+                    <a:bodyPr wrap="square"/>
+                    <a:lstStyle/>
+                    <a:p>
+                      <a:pPr algn="l"/>
+                      <a:r>
+                        <a:rPr sz="1100" b="0" i="0">
+                          <a:solidFill>
+                            <a:srgbClr val="000000"/>
+                          </a:solidFill>
+                          <a:latin typeface="Arial"/>
+                        </a:rPr>
+                        <a:t>1.0</a:t>
+                      </a:r>
+                    </a:p>
+                  </a:txBody>
+                  <a:tcPr anchor="ctr">
+                    <a:solidFill>
+                      <a:srgbClr val="FFFFFF"/>
+                    </a:solidFill>
+                    <a:lnB w="12700" cap="sq">
+                      <a:solidFill>
+                        <a:srgbClr val="000000"/>
+                      </a:solidFill>
+                    </a:lnB>
                   </a:tcPr>
                 </a:tc>
               </a:tr>
-              <a:tr h="249381">
-                <a:tc>
-                  <a:txBody>
-                    <a:bodyPr/>
-                    <a:lstStyle/>
-                    <a:p>
-                      <a:r>
-                        <a:rPr sz="1100" b="1">
+              <a:tr h="274320">
+                <a:tc>
+                  <a:txBody>
+                    <a:bodyPr wrap="square"/>
+                    <a:lstStyle/>
+                    <a:p>
+                      <a:pPr algn="l"/>
+                      <a:r>
+                        <a:rPr sz="1100" b="0" i="0">
                           <a:solidFill>
                             <a:srgbClr val="000000"/>
                           </a:solidFill>
@@ -4554,15 +4872,21 @@
                     <a:solidFill>
                       <a:srgbClr val="FFFFFF"/>
                     </a:solidFill>
-                  </a:tcPr>
-                </a:tc>
-                <a:tc>
-                  <a:txBody>
-                    <a:bodyPr/>
-                    <a:lstStyle/>
-                    <a:p>
-                      <a:r>
-                        <a:rPr sz="1100" b="1">
+                    <a:lnB w="12700" cap="sq">
+                      <a:solidFill>
+                        <a:srgbClr val="000000"/>
+                      </a:solidFill>
+                    </a:lnB>
+                  </a:tcPr>
+                </a:tc>
+                <a:tc>
+                  <a:txBody>
+                    <a:bodyPr wrap="square"/>
+                    <a:lstStyle/>
+                    <a:p>
+                      <a:pPr algn="l"/>
+                      <a:r>
+                        <a:rPr sz="1100" b="0" i="0">
                           <a:solidFill>
                             <a:srgbClr val="000000"/>
                           </a:solidFill>
@@ -4576,15 +4900,21 @@
                     <a:solidFill>
                       <a:srgbClr val="FFFFFF"/>
                     </a:solidFill>
-                  </a:tcPr>
-                </a:tc>
-                <a:tc>
-                  <a:txBody>
-                    <a:bodyPr/>
-                    <a:lstStyle/>
-                    <a:p>
-                      <a:r>
-                        <a:rPr sz="1100" b="0">
+                    <a:lnB w="12700" cap="sq">
+                      <a:solidFill>
+                        <a:srgbClr val="000000"/>
+                      </a:solidFill>
+                    </a:lnB>
+                  </a:tcPr>
+                </a:tc>
+                <a:tc>
+                  <a:txBody>
+                    <a:bodyPr wrap="square"/>
+                    <a:lstStyle/>
+                    <a:p>
+                      <a:pPr algn="l"/>
+                      <a:r>
+                        <a:rPr sz="1100" b="0" i="0">
                           <a:solidFill>
                             <a:srgbClr val="000000"/>
                           </a:solidFill>
@@ -4594,87 +4924,111 @@
                       </a:r>
                     </a:p>
                   </a:txBody>
-                  <a:tcPr>
-                    <a:solidFill>
-                      <a:srgbClr val="FFFFFF"/>
-                    </a:solidFill>
-                  </a:tcPr>
-                </a:tc>
-                <a:tc>
-                  <a:txBody>
-                    <a:bodyPr/>
-                    <a:lstStyle/>
-                    <a:p>
-                      <a:r>
-                        <a:rPr sz="1100" b="0">
-                          <a:solidFill>
-                            <a:srgbClr val="000000"/>
-                          </a:solidFill>
-                          <a:latin typeface="Arial"/>
-                        </a:rPr>
-                        <a:t>$35.14</a:t>
-                      </a:r>
-                    </a:p>
-                  </a:txBody>
-                  <a:tcPr>
-                    <a:solidFill>
-                      <a:srgbClr val="FFFFFF"/>
-                    </a:solidFill>
-                  </a:tcPr>
-                </a:tc>
-                <a:tc>
-                  <a:txBody>
-                    <a:bodyPr/>
-                    <a:lstStyle/>
-                    <a:p>
-                      <a:r>
-                        <a:rPr sz="1100" b="0">
-                          <a:solidFill>
-                            <a:srgbClr val="000000"/>
-                          </a:solidFill>
-                          <a:latin typeface="Arial"/>
-                        </a:rPr>
-                        <a:t>489.0</a:t>
-                      </a:r>
-                    </a:p>
-                  </a:txBody>
-                  <a:tcPr>
-                    <a:solidFill>
-                      <a:srgbClr val="FFFFFF"/>
-                    </a:solidFill>
-                  </a:tcPr>
-                </a:tc>
-                <a:tc>
-                  <a:txBody>
-                    <a:bodyPr/>
-                    <a:lstStyle/>
-                    <a:p>
-                      <a:r>
-                        <a:rPr sz="1100" b="0">
-                          <a:solidFill>
-                            <a:srgbClr val="000000"/>
-                          </a:solidFill>
-                          <a:latin typeface="Arial"/>
-                        </a:rPr>
-                        <a:t>0.0%</a:t>
-                      </a:r>
-                    </a:p>
-                  </a:txBody>
-                  <a:tcPr>
-                    <a:solidFill>
-                      <a:srgbClr val="FFFFFF"/>
-                    </a:solidFill>
+                  <a:tcPr anchor="ctr">
+                    <a:solidFill>
+                      <a:srgbClr val="FFFFFF"/>
+                    </a:solidFill>
+                    <a:lnB w="12700" cap="sq">
+                      <a:solidFill>
+                        <a:srgbClr val="000000"/>
+                      </a:solidFill>
+                    </a:lnB>
+                  </a:tcPr>
+                </a:tc>
+                <a:tc>
+                  <a:txBody>
+                    <a:bodyPr wrap="square"/>
+                    <a:lstStyle/>
+                    <a:p>
+                      <a:pPr algn="l"/>
+                      <a:r>
+                        <a:rPr sz="1100" b="0" i="0">
+                          <a:solidFill>
+                            <a:srgbClr val="000000"/>
+                          </a:solidFill>
+                          <a:latin typeface="Arial"/>
+                        </a:rPr>
+                        <a:t>35.1385063451718</a:t>
+                      </a:r>
+                    </a:p>
+                  </a:txBody>
+                  <a:tcPr anchor="ctr">
+                    <a:solidFill>
+                      <a:srgbClr val="FFFFFF"/>
+                    </a:solidFill>
+                    <a:lnB w="12700" cap="sq">
+                      <a:solidFill>
+                        <a:srgbClr val="000000"/>
+                      </a:solidFill>
+                    </a:lnB>
+                  </a:tcPr>
+                </a:tc>
+                <a:tc>
+                  <a:txBody>
+                    <a:bodyPr wrap="square"/>
+                    <a:lstStyle/>
+                    <a:p>
+                      <a:pPr algn="l"/>
+                      <a:r>
+                        <a:rPr sz="1100" b="0" i="0">
+                          <a:solidFill>
+                            <a:srgbClr val="000000"/>
+                          </a:solidFill>
+                          <a:latin typeface="Arial"/>
+                        </a:rPr>
+                        <a:t>489</a:t>
+                      </a:r>
+                    </a:p>
+                  </a:txBody>
+                  <a:tcPr anchor="ctr">
+                    <a:solidFill>
+                      <a:srgbClr val="FFFFFF"/>
+                    </a:solidFill>
+                    <a:lnB w="12700" cap="sq">
+                      <a:solidFill>
+                        <a:srgbClr val="000000"/>
+                      </a:solidFill>
+                    </a:lnB>
+                  </a:tcPr>
+                </a:tc>
+                <a:tc>
+                  <a:txBody>
+                    <a:bodyPr wrap="square"/>
+                    <a:lstStyle/>
+                    <a:p>
+                      <a:pPr algn="l"/>
+                      <a:r>
+                        <a:rPr sz="1100" b="0" i="0">
+                          <a:solidFill>
+                            <a:srgbClr val="000000"/>
+                          </a:solidFill>
+                          <a:latin typeface="Arial"/>
+                        </a:rPr>
+                        <a:t>0.0</a:t>
+                      </a:r>
+                    </a:p>
+                  </a:txBody>
+                  <a:tcPr anchor="ctr">
+                    <a:solidFill>
+                      <a:srgbClr val="FFFFFF"/>
+                    </a:solidFill>
+                    <a:lnB w="12700" cap="sq">
+                      <a:solidFill>
+                        <a:srgbClr val="000000"/>
+                      </a:solidFill>
+                    </a:lnB>
                   </a:tcPr>
                 </a:tc>
               </a:tr>
-              <a:tr h="249381">
-                <a:tc>
-                  <a:txBody>
-                    <a:bodyPr/>
-                    <a:lstStyle/>
-                    <a:p>
-                      <a:r>
-                        <a:rPr sz="1100" b="1">
+              <a:tr h="274320">
+                <a:tc>
+                  <a:txBody>
+                    <a:bodyPr wrap="square"/>
+                    <a:lstStyle/>
+                    <a:p>
+                      <a:pPr algn="l"/>
+                      <a:r>
+                        <a:rPr sz="1100" b="0" i="0">
                           <a:solidFill>
                             <a:srgbClr val="000000"/>
                           </a:solidFill>
@@ -4688,15 +5042,21 @@
                     <a:solidFill>
                       <a:srgbClr val="FFFFFF"/>
                     </a:solidFill>
-                  </a:tcPr>
-                </a:tc>
-                <a:tc>
-                  <a:txBody>
-                    <a:bodyPr/>
-                    <a:lstStyle/>
-                    <a:p>
-                      <a:r>
-                        <a:rPr sz="1100" b="1">
+                    <a:lnB w="12700" cap="sq">
+                      <a:solidFill>
+                        <a:srgbClr val="000000"/>
+                      </a:solidFill>
+                    </a:lnB>
+                  </a:tcPr>
+                </a:tc>
+                <a:tc>
+                  <a:txBody>
+                    <a:bodyPr wrap="square"/>
+                    <a:lstStyle/>
+                    <a:p>
+                      <a:pPr algn="l"/>
+                      <a:r>
+                        <a:rPr sz="1100" b="0" i="0">
                           <a:solidFill>
                             <a:srgbClr val="000000"/>
                           </a:solidFill>
@@ -4710,15 +5070,21 @@
                     <a:solidFill>
                       <a:srgbClr val="FFFFFF"/>
                     </a:solidFill>
-                  </a:tcPr>
-                </a:tc>
-                <a:tc>
-                  <a:txBody>
-                    <a:bodyPr/>
-                    <a:lstStyle/>
-                    <a:p>
-                      <a:r>
-                        <a:rPr sz="1100" b="0">
+                    <a:lnB w="12700" cap="sq">
+                      <a:solidFill>
+                        <a:srgbClr val="000000"/>
+                      </a:solidFill>
+                    </a:lnB>
+                  </a:tcPr>
+                </a:tc>
+                <a:tc>
+                  <a:txBody>
+                    <a:bodyPr wrap="square"/>
+                    <a:lstStyle/>
+                    <a:p>
+                      <a:pPr algn="l"/>
+                      <a:r>
+                        <a:rPr sz="1100" b="0" i="0">
                           <a:solidFill>
                             <a:srgbClr val="000000"/>
                           </a:solidFill>
@@ -4728,87 +5094,111 @@
                       </a:r>
                     </a:p>
                   </a:txBody>
-                  <a:tcPr>
-                    <a:solidFill>
-                      <a:srgbClr val="FFFFFF"/>
-                    </a:solidFill>
-                  </a:tcPr>
-                </a:tc>
-                <a:tc>
-                  <a:txBody>
-                    <a:bodyPr/>
-                    <a:lstStyle/>
-                    <a:p>
-                      <a:r>
-                        <a:rPr sz="1100" b="0">
-                          <a:solidFill>
-                            <a:srgbClr val="000000"/>
-                          </a:solidFill>
-                          <a:latin typeface="Arial"/>
-                        </a:rPr>
-                        <a:t>$33.78</a:t>
-                      </a:r>
-                    </a:p>
-                  </a:txBody>
-                  <a:tcPr>
-                    <a:solidFill>
-                      <a:srgbClr val="FFFFFF"/>
-                    </a:solidFill>
-                  </a:tcPr>
-                </a:tc>
-                <a:tc>
-                  <a:txBody>
-                    <a:bodyPr/>
-                    <a:lstStyle/>
-                    <a:p>
-                      <a:r>
-                        <a:rPr sz="1100" b="0">
-                          <a:solidFill>
-                            <a:srgbClr val="000000"/>
-                          </a:solidFill>
-                          <a:latin typeface="Arial"/>
-                        </a:rPr>
-                        <a:t>213.0</a:t>
-                      </a:r>
-                    </a:p>
-                  </a:txBody>
-                  <a:tcPr>
-                    <a:solidFill>
-                      <a:srgbClr val="FFFFFF"/>
-                    </a:solidFill>
-                  </a:tcPr>
-                </a:tc>
-                <a:tc>
-                  <a:txBody>
-                    <a:bodyPr/>
-                    <a:lstStyle/>
-                    <a:p>
-                      <a:r>
-                        <a:rPr sz="1100" b="0">
-                          <a:solidFill>
-                            <a:srgbClr val="000000"/>
-                          </a:solidFill>
-                          <a:latin typeface="Arial"/>
-                        </a:rPr>
-                        <a:t>100.0%</a:t>
-                      </a:r>
-                    </a:p>
-                  </a:txBody>
-                  <a:tcPr>
-                    <a:solidFill>
-                      <a:srgbClr val="FFFFFF"/>
-                    </a:solidFill>
+                  <a:tcPr anchor="ctr">
+                    <a:solidFill>
+                      <a:srgbClr val="FFFFFF"/>
+                    </a:solidFill>
+                    <a:lnB w="12700" cap="sq">
+                      <a:solidFill>
+                        <a:srgbClr val="000000"/>
+                      </a:solidFill>
+                    </a:lnB>
+                  </a:tcPr>
+                </a:tc>
+                <a:tc>
+                  <a:txBody>
+                    <a:bodyPr wrap="square"/>
+                    <a:lstStyle/>
+                    <a:p>
+                      <a:pPr algn="l"/>
+                      <a:r>
+                        <a:rPr sz="1100" b="0" i="0">
+                          <a:solidFill>
+                            <a:srgbClr val="000000"/>
+                          </a:solidFill>
+                          <a:latin typeface="Arial"/>
+                        </a:rPr>
+                        <a:t>33.77655325179327</a:t>
+                      </a:r>
+                    </a:p>
+                  </a:txBody>
+                  <a:tcPr anchor="ctr">
+                    <a:solidFill>
+                      <a:srgbClr val="FFFFFF"/>
+                    </a:solidFill>
+                    <a:lnB w="12700" cap="sq">
+                      <a:solidFill>
+                        <a:srgbClr val="000000"/>
+                      </a:solidFill>
+                    </a:lnB>
+                  </a:tcPr>
+                </a:tc>
+                <a:tc>
+                  <a:txBody>
+                    <a:bodyPr wrap="square"/>
+                    <a:lstStyle/>
+                    <a:p>
+                      <a:pPr algn="l"/>
+                      <a:r>
+                        <a:rPr sz="1100" b="0" i="0">
+                          <a:solidFill>
+                            <a:srgbClr val="000000"/>
+                          </a:solidFill>
+                          <a:latin typeface="Arial"/>
+                        </a:rPr>
+                        <a:t>213</a:t>
+                      </a:r>
+                    </a:p>
+                  </a:txBody>
+                  <a:tcPr anchor="ctr">
+                    <a:solidFill>
+                      <a:srgbClr val="FFFFFF"/>
+                    </a:solidFill>
+                    <a:lnB w="12700" cap="sq">
+                      <a:solidFill>
+                        <a:srgbClr val="000000"/>
+                      </a:solidFill>
+                    </a:lnB>
+                  </a:tcPr>
+                </a:tc>
+                <a:tc>
+                  <a:txBody>
+                    <a:bodyPr wrap="square"/>
+                    <a:lstStyle/>
+                    <a:p>
+                      <a:pPr algn="l"/>
+                      <a:r>
+                        <a:rPr sz="1100" b="0" i="0">
+                          <a:solidFill>
+                            <a:srgbClr val="000000"/>
+                          </a:solidFill>
+                          <a:latin typeface="Arial"/>
+                        </a:rPr>
+                        <a:t>1.0</a:t>
+                      </a:r>
+                    </a:p>
+                  </a:txBody>
+                  <a:tcPr anchor="ctr">
+                    <a:solidFill>
+                      <a:srgbClr val="FFFFFF"/>
+                    </a:solidFill>
+                    <a:lnB w="12700" cap="sq">
+                      <a:solidFill>
+                        <a:srgbClr val="000000"/>
+                      </a:solidFill>
+                    </a:lnB>
                   </a:tcPr>
                 </a:tc>
               </a:tr>
-              <a:tr h="249381">
-                <a:tc>
-                  <a:txBody>
-                    <a:bodyPr/>
-                    <a:lstStyle/>
-                    <a:p>
-                      <a:r>
-                        <a:rPr sz="1100" b="1">
+              <a:tr h="274320">
+                <a:tc>
+                  <a:txBody>
+                    <a:bodyPr wrap="square"/>
+                    <a:lstStyle/>
+                    <a:p>
+                      <a:pPr algn="l"/>
+                      <a:r>
+                        <a:rPr sz="1100" b="0" i="0">
                           <a:solidFill>
                             <a:srgbClr val="000000"/>
                           </a:solidFill>
@@ -4822,15 +5212,21 @@
                     <a:solidFill>
                       <a:srgbClr val="FFFFFF"/>
                     </a:solidFill>
-                  </a:tcPr>
-                </a:tc>
-                <a:tc>
-                  <a:txBody>
-                    <a:bodyPr/>
-                    <a:lstStyle/>
-                    <a:p>
-                      <a:r>
-                        <a:rPr sz="1100" b="1">
+                    <a:lnB w="12700" cap="sq">
+                      <a:solidFill>
+                        <a:srgbClr val="000000"/>
+                      </a:solidFill>
+                    </a:lnB>
+                  </a:tcPr>
+                </a:tc>
+                <a:tc>
+                  <a:txBody>
+                    <a:bodyPr wrap="square"/>
+                    <a:lstStyle/>
+                    <a:p>
+                      <a:pPr algn="l"/>
+                      <a:r>
+                        <a:rPr sz="1100" b="0" i="0">
                           <a:solidFill>
                             <a:srgbClr val="000000"/>
                           </a:solidFill>
@@ -4844,15 +5240,21 @@
                     <a:solidFill>
                       <a:srgbClr val="FFFFFF"/>
                     </a:solidFill>
-                  </a:tcPr>
-                </a:tc>
-                <a:tc>
-                  <a:txBody>
-                    <a:bodyPr/>
-                    <a:lstStyle/>
-                    <a:p>
-                      <a:r>
-                        <a:rPr sz="1100" b="0">
+                    <a:lnB w="12700" cap="sq">
+                      <a:solidFill>
+                        <a:srgbClr val="000000"/>
+                      </a:solidFill>
+                    </a:lnB>
+                  </a:tcPr>
+                </a:tc>
+                <a:tc>
+                  <a:txBody>
+                    <a:bodyPr wrap="square"/>
+                    <a:lstStyle/>
+                    <a:p>
+                      <a:pPr algn="l"/>
+                      <a:r>
+                        <a:rPr sz="1100" b="0" i="0">
                           <a:solidFill>
                             <a:srgbClr val="000000"/>
                           </a:solidFill>
@@ -4862,87 +5264,111 @@
                       </a:r>
                     </a:p>
                   </a:txBody>
-                  <a:tcPr>
-                    <a:solidFill>
-                      <a:srgbClr val="FFFFFF"/>
-                    </a:solidFill>
-                  </a:tcPr>
-                </a:tc>
-                <a:tc>
-                  <a:txBody>
-                    <a:bodyPr/>
-                    <a:lstStyle/>
-                    <a:p>
-                      <a:r>
-                        <a:rPr sz="1100" b="0">
-                          <a:solidFill>
-                            <a:srgbClr val="000000"/>
-                          </a:solidFill>
-                          <a:latin typeface="Arial"/>
-                        </a:rPr>
-                        <a:t>$33.32</a:t>
-                      </a:r>
-                    </a:p>
-                  </a:txBody>
-                  <a:tcPr>
-                    <a:solidFill>
-                      <a:srgbClr val="FFFFFF"/>
-                    </a:solidFill>
-                  </a:tcPr>
-                </a:tc>
-                <a:tc>
-                  <a:txBody>
-                    <a:bodyPr/>
-                    <a:lstStyle/>
-                    <a:p>
-                      <a:r>
-                        <a:rPr sz="1100" b="0">
-                          <a:solidFill>
-                            <a:srgbClr val="000000"/>
-                          </a:solidFill>
-                          <a:latin typeface="Arial"/>
-                        </a:rPr>
-                        <a:t>517.0</a:t>
-                      </a:r>
-                    </a:p>
-                  </a:txBody>
-                  <a:tcPr>
-                    <a:solidFill>
-                      <a:srgbClr val="FFFFFF"/>
-                    </a:solidFill>
-                  </a:tcPr>
-                </a:tc>
-                <a:tc>
-                  <a:txBody>
-                    <a:bodyPr/>
-                    <a:lstStyle/>
-                    <a:p>
-                      <a:r>
-                        <a:rPr sz="1100" b="0">
-                          <a:solidFill>
-                            <a:srgbClr val="000000"/>
-                          </a:solidFill>
-                          <a:latin typeface="Arial"/>
-                        </a:rPr>
-                        <a:t>0.0%</a:t>
-                      </a:r>
-                    </a:p>
-                  </a:txBody>
-                  <a:tcPr>
-                    <a:solidFill>
-                      <a:srgbClr val="FFFFFF"/>
-                    </a:solidFill>
+                  <a:tcPr anchor="ctr">
+                    <a:solidFill>
+                      <a:srgbClr val="FFFFFF"/>
+                    </a:solidFill>
+                    <a:lnB w="12700" cap="sq">
+                      <a:solidFill>
+                        <a:srgbClr val="000000"/>
+                      </a:solidFill>
+                    </a:lnB>
+                  </a:tcPr>
+                </a:tc>
+                <a:tc>
+                  <a:txBody>
+                    <a:bodyPr wrap="square"/>
+                    <a:lstStyle/>
+                    <a:p>
+                      <a:pPr algn="l"/>
+                      <a:r>
+                        <a:rPr sz="1100" b="0" i="0">
+                          <a:solidFill>
+                            <a:srgbClr val="000000"/>
+                          </a:solidFill>
+                          <a:latin typeface="Arial"/>
+                        </a:rPr>
+                        <a:t>33.32441001911774</a:t>
+                      </a:r>
+                    </a:p>
+                  </a:txBody>
+                  <a:tcPr anchor="ctr">
+                    <a:solidFill>
+                      <a:srgbClr val="FFFFFF"/>
+                    </a:solidFill>
+                    <a:lnB w="12700" cap="sq">
+                      <a:solidFill>
+                        <a:srgbClr val="000000"/>
+                      </a:solidFill>
+                    </a:lnB>
+                  </a:tcPr>
+                </a:tc>
+                <a:tc>
+                  <a:txBody>
+                    <a:bodyPr wrap="square"/>
+                    <a:lstStyle/>
+                    <a:p>
+                      <a:pPr algn="l"/>
+                      <a:r>
+                        <a:rPr sz="1100" b="0" i="0">
+                          <a:solidFill>
+                            <a:srgbClr val="000000"/>
+                          </a:solidFill>
+                          <a:latin typeface="Arial"/>
+                        </a:rPr>
+                        <a:t>517</a:t>
+                      </a:r>
+                    </a:p>
+                  </a:txBody>
+                  <a:tcPr anchor="ctr">
+                    <a:solidFill>
+                      <a:srgbClr val="FFFFFF"/>
+                    </a:solidFill>
+                    <a:lnB w="12700" cap="sq">
+                      <a:solidFill>
+                        <a:srgbClr val="000000"/>
+                      </a:solidFill>
+                    </a:lnB>
+                  </a:tcPr>
+                </a:tc>
+                <a:tc>
+                  <a:txBody>
+                    <a:bodyPr wrap="square"/>
+                    <a:lstStyle/>
+                    <a:p>
+                      <a:pPr algn="l"/>
+                      <a:r>
+                        <a:rPr sz="1100" b="0" i="0">
+                          <a:solidFill>
+                            <a:srgbClr val="000000"/>
+                          </a:solidFill>
+                          <a:latin typeface="Arial"/>
+                        </a:rPr>
+                        <a:t>0.0</a:t>
+                      </a:r>
+                    </a:p>
+                  </a:txBody>
+                  <a:tcPr anchor="ctr">
+                    <a:solidFill>
+                      <a:srgbClr val="FFFFFF"/>
+                    </a:solidFill>
+                    <a:lnB w="12700" cap="sq">
+                      <a:solidFill>
+                        <a:srgbClr val="000000"/>
+                      </a:solidFill>
+                    </a:lnB>
                   </a:tcPr>
                 </a:tc>
               </a:tr>
-              <a:tr h="249381">
-                <a:tc>
-                  <a:txBody>
-                    <a:bodyPr/>
-                    <a:lstStyle/>
-                    <a:p>
-                      <a:r>
-                        <a:rPr sz="1100" b="1">
+              <a:tr h="274320">
+                <a:tc>
+                  <a:txBody>
+                    <a:bodyPr wrap="square"/>
+                    <a:lstStyle/>
+                    <a:p>
+                      <a:pPr algn="l"/>
+                      <a:r>
+                        <a:rPr sz="1100" b="0" i="0">
                           <a:solidFill>
                             <a:srgbClr val="000000"/>
                           </a:solidFill>
@@ -4956,15 +5382,21 @@
                     <a:solidFill>
                       <a:srgbClr val="FFFFFF"/>
                     </a:solidFill>
-                  </a:tcPr>
-                </a:tc>
-                <a:tc>
-                  <a:txBody>
-                    <a:bodyPr/>
-                    <a:lstStyle/>
-                    <a:p>
-                      <a:r>
-                        <a:rPr sz="1100" b="1">
+                    <a:lnB w="12700" cap="sq">
+                      <a:solidFill>
+                        <a:srgbClr val="000000"/>
+                      </a:solidFill>
+                    </a:lnB>
+                  </a:tcPr>
+                </a:tc>
+                <a:tc>
+                  <a:txBody>
+                    <a:bodyPr wrap="square"/>
+                    <a:lstStyle/>
+                    <a:p>
+                      <a:pPr algn="l"/>
+                      <a:r>
+                        <a:rPr sz="1100" b="0" i="0">
                           <a:solidFill>
                             <a:srgbClr val="000000"/>
                           </a:solidFill>
@@ -4978,15 +5410,21 @@
                     <a:solidFill>
                       <a:srgbClr val="FFFFFF"/>
                     </a:solidFill>
-                  </a:tcPr>
-                </a:tc>
-                <a:tc>
-                  <a:txBody>
-                    <a:bodyPr/>
-                    <a:lstStyle/>
-                    <a:p>
-                      <a:r>
-                        <a:rPr sz="1100" b="0">
+                    <a:lnB w="12700" cap="sq">
+                      <a:solidFill>
+                        <a:srgbClr val="000000"/>
+                      </a:solidFill>
+                    </a:lnB>
+                  </a:tcPr>
+                </a:tc>
+                <a:tc>
+                  <a:txBody>
+                    <a:bodyPr wrap="square"/>
+                    <a:lstStyle/>
+                    <a:p>
+                      <a:pPr algn="l"/>
+                      <a:r>
+                        <a:rPr sz="1100" b="0" i="0">
                           <a:solidFill>
                             <a:srgbClr val="000000"/>
                           </a:solidFill>
@@ -4996,87 +5434,111 @@
                       </a:r>
                     </a:p>
                   </a:txBody>
-                  <a:tcPr>
-                    <a:solidFill>
-                      <a:srgbClr val="FFFFFF"/>
-                    </a:solidFill>
-                  </a:tcPr>
-                </a:tc>
-                <a:tc>
-                  <a:txBody>
-                    <a:bodyPr/>
-                    <a:lstStyle/>
-                    <a:p>
-                      <a:r>
-                        <a:rPr sz="1100" b="0">
-                          <a:solidFill>
-                            <a:srgbClr val="000000"/>
-                          </a:solidFill>
-                          <a:latin typeface="Arial"/>
-                        </a:rPr>
-                        <a:t>$27.69</a:t>
-                      </a:r>
-                    </a:p>
-                  </a:txBody>
-                  <a:tcPr>
-                    <a:solidFill>
-                      <a:srgbClr val="FFFFFF"/>
-                    </a:solidFill>
-                  </a:tcPr>
-                </a:tc>
-                <a:tc>
-                  <a:txBody>
-                    <a:bodyPr/>
-                    <a:lstStyle/>
-                    <a:p>
-                      <a:r>
-                        <a:rPr sz="1100" b="0">
-                          <a:solidFill>
-                            <a:srgbClr val="000000"/>
-                          </a:solidFill>
-                          <a:latin typeface="Arial"/>
-                        </a:rPr>
-                        <a:t>270.0</a:t>
-                      </a:r>
-                    </a:p>
-                  </a:txBody>
-                  <a:tcPr>
-                    <a:solidFill>
-                      <a:srgbClr val="FFFFFF"/>
-                    </a:solidFill>
-                  </a:tcPr>
-                </a:tc>
-                <a:tc>
-                  <a:txBody>
-                    <a:bodyPr/>
-                    <a:lstStyle/>
-                    <a:p>
-                      <a:r>
-                        <a:rPr sz="1100" b="0">
-                          <a:solidFill>
-                            <a:srgbClr val="000000"/>
-                          </a:solidFill>
-                          <a:latin typeface="Arial"/>
-                        </a:rPr>
-                        <a:t>100.0%</a:t>
-                      </a:r>
-                    </a:p>
-                  </a:txBody>
-                  <a:tcPr>
-                    <a:solidFill>
-                      <a:srgbClr val="FFFFFF"/>
-                    </a:solidFill>
+                  <a:tcPr anchor="ctr">
+                    <a:solidFill>
+                      <a:srgbClr val="FFFFFF"/>
+                    </a:solidFill>
+                    <a:lnB w="12700" cap="sq">
+                      <a:solidFill>
+                        <a:srgbClr val="000000"/>
+                      </a:solidFill>
+                    </a:lnB>
+                  </a:tcPr>
+                </a:tc>
+                <a:tc>
+                  <a:txBody>
+                    <a:bodyPr wrap="square"/>
+                    <a:lstStyle/>
+                    <a:p>
+                      <a:pPr algn="l"/>
+                      <a:r>
+                        <a:rPr sz="1100" b="0" i="0">
+                          <a:solidFill>
+                            <a:srgbClr val="000000"/>
+                          </a:solidFill>
+                          <a:latin typeface="Arial"/>
+                        </a:rPr>
+                        <a:t>27.689767369212237</a:t>
+                      </a:r>
+                    </a:p>
+                  </a:txBody>
+                  <a:tcPr anchor="ctr">
+                    <a:solidFill>
+                      <a:srgbClr val="FFFFFF"/>
+                    </a:solidFill>
+                    <a:lnB w="12700" cap="sq">
+                      <a:solidFill>
+                        <a:srgbClr val="000000"/>
+                      </a:solidFill>
+                    </a:lnB>
+                  </a:tcPr>
+                </a:tc>
+                <a:tc>
+                  <a:txBody>
+                    <a:bodyPr wrap="square"/>
+                    <a:lstStyle/>
+                    <a:p>
+                      <a:pPr algn="l"/>
+                      <a:r>
+                        <a:rPr sz="1100" b="0" i="0">
+                          <a:solidFill>
+                            <a:srgbClr val="000000"/>
+                          </a:solidFill>
+                          <a:latin typeface="Arial"/>
+                        </a:rPr>
+                        <a:t>270</a:t>
+                      </a:r>
+                    </a:p>
+                  </a:txBody>
+                  <a:tcPr anchor="ctr">
+                    <a:solidFill>
+                      <a:srgbClr val="FFFFFF"/>
+                    </a:solidFill>
+                    <a:lnB w="12700" cap="sq">
+                      <a:solidFill>
+                        <a:srgbClr val="000000"/>
+                      </a:solidFill>
+                    </a:lnB>
+                  </a:tcPr>
+                </a:tc>
+                <a:tc>
+                  <a:txBody>
+                    <a:bodyPr wrap="square"/>
+                    <a:lstStyle/>
+                    <a:p>
+                      <a:pPr algn="l"/>
+                      <a:r>
+                        <a:rPr sz="1100" b="0" i="0">
+                          <a:solidFill>
+                            <a:srgbClr val="000000"/>
+                          </a:solidFill>
+                          <a:latin typeface="Arial"/>
+                        </a:rPr>
+                        <a:t>1.0</a:t>
+                      </a:r>
+                    </a:p>
+                  </a:txBody>
+                  <a:tcPr anchor="ctr">
+                    <a:solidFill>
+                      <a:srgbClr val="FFFFFF"/>
+                    </a:solidFill>
+                    <a:lnB w="12700" cap="sq">
+                      <a:solidFill>
+                        <a:srgbClr val="000000"/>
+                      </a:solidFill>
+                    </a:lnB>
                   </a:tcPr>
                 </a:tc>
               </a:tr>
-              <a:tr h="249381">
-                <a:tc>
-                  <a:txBody>
-                    <a:bodyPr/>
-                    <a:lstStyle/>
-                    <a:p>
-                      <a:r>
-                        <a:rPr sz="1100" b="1">
+              <a:tr h="274320">
+                <a:tc>
+                  <a:txBody>
+                    <a:bodyPr wrap="square"/>
+                    <a:lstStyle/>
+                    <a:p>
+                      <a:pPr algn="l"/>
+                      <a:r>
+                        <a:rPr sz="1100" b="0" i="0">
                           <a:solidFill>
                             <a:srgbClr val="000000"/>
                           </a:solidFill>
@@ -5090,15 +5552,21 @@
                     <a:solidFill>
                       <a:srgbClr val="FFFFFF"/>
                     </a:solidFill>
-                  </a:tcPr>
-                </a:tc>
-                <a:tc>
-                  <a:txBody>
-                    <a:bodyPr/>
-                    <a:lstStyle/>
-                    <a:p>
-                      <a:r>
-                        <a:rPr sz="1100" b="1">
+                    <a:lnB w="12700" cap="sq">
+                      <a:solidFill>
+                        <a:srgbClr val="000000"/>
+                      </a:solidFill>
+                    </a:lnB>
+                  </a:tcPr>
+                </a:tc>
+                <a:tc>
+                  <a:txBody>
+                    <a:bodyPr wrap="square"/>
+                    <a:lstStyle/>
+                    <a:p>
+                      <a:pPr algn="l"/>
+                      <a:r>
+                        <a:rPr sz="1100" b="0" i="0">
                           <a:solidFill>
                             <a:srgbClr val="000000"/>
                           </a:solidFill>
@@ -5112,15 +5580,21 @@
                     <a:solidFill>
                       <a:srgbClr val="FFFFFF"/>
                     </a:solidFill>
-                  </a:tcPr>
-                </a:tc>
-                <a:tc>
-                  <a:txBody>
-                    <a:bodyPr/>
-                    <a:lstStyle/>
-                    <a:p>
-                      <a:r>
-                        <a:rPr sz="1100" b="0">
+                    <a:lnB w="12700" cap="sq">
+                      <a:solidFill>
+                        <a:srgbClr val="000000"/>
+                      </a:solidFill>
+                    </a:lnB>
+                  </a:tcPr>
+                </a:tc>
+                <a:tc>
+                  <a:txBody>
+                    <a:bodyPr wrap="square"/>
+                    <a:lstStyle/>
+                    <a:p>
+                      <a:pPr algn="l"/>
+                      <a:r>
+                        <a:rPr sz="1100" b="0" i="0">
                           <a:solidFill>
                             <a:srgbClr val="000000"/>
                           </a:solidFill>
@@ -5130,87 +5604,111 @@
                       </a:r>
                     </a:p>
                   </a:txBody>
-                  <a:tcPr>
-                    <a:solidFill>
-                      <a:srgbClr val="FFFFFF"/>
-                    </a:solidFill>
-                  </a:tcPr>
-                </a:tc>
-                <a:tc>
-                  <a:txBody>
-                    <a:bodyPr/>
-                    <a:lstStyle/>
-                    <a:p>
-                      <a:r>
-                        <a:rPr sz="1100" b="0">
-                          <a:solidFill>
-                            <a:srgbClr val="000000"/>
-                          </a:solidFill>
-                          <a:latin typeface="Arial"/>
-                        </a:rPr>
-                        <a:t>$35.51</a:t>
-                      </a:r>
-                    </a:p>
-                  </a:txBody>
-                  <a:tcPr>
-                    <a:solidFill>
-                      <a:srgbClr val="FFFFFF"/>
-                    </a:solidFill>
-                  </a:tcPr>
-                </a:tc>
-                <a:tc>
-                  <a:txBody>
-                    <a:bodyPr/>
-                    <a:lstStyle/>
-                    <a:p>
-                      <a:r>
-                        <a:rPr sz="1100" b="0">
-                          <a:solidFill>
-                            <a:srgbClr val="000000"/>
-                          </a:solidFill>
-                          <a:latin typeface="Arial"/>
-                        </a:rPr>
-                        <a:t>366.0</a:t>
-                      </a:r>
-                    </a:p>
-                  </a:txBody>
-                  <a:tcPr>
-                    <a:solidFill>
-                      <a:srgbClr val="FFFFFF"/>
-                    </a:solidFill>
-                  </a:tcPr>
-                </a:tc>
-                <a:tc>
-                  <a:txBody>
-                    <a:bodyPr/>
-                    <a:lstStyle/>
-                    <a:p>
-                      <a:r>
-                        <a:rPr sz="1100" b="0">
-                          <a:solidFill>
-                            <a:srgbClr val="000000"/>
-                          </a:solidFill>
-                          <a:latin typeface="Arial"/>
-                        </a:rPr>
-                        <a:t>0.0%</a:t>
-                      </a:r>
-                    </a:p>
-                  </a:txBody>
-                  <a:tcPr>
-                    <a:solidFill>
-                      <a:srgbClr val="FFFFFF"/>
-                    </a:solidFill>
+                  <a:tcPr anchor="ctr">
+                    <a:solidFill>
+                      <a:srgbClr val="FFFFFF"/>
+                    </a:solidFill>
+                    <a:lnB w="12700" cap="sq">
+                      <a:solidFill>
+                        <a:srgbClr val="000000"/>
+                      </a:solidFill>
+                    </a:lnB>
+                  </a:tcPr>
+                </a:tc>
+                <a:tc>
+                  <a:txBody>
+                    <a:bodyPr wrap="square"/>
+                    <a:lstStyle/>
+                    <a:p>
+                      <a:pPr algn="l"/>
+                      <a:r>
+                        <a:rPr sz="1100" b="0" i="0">
+                          <a:solidFill>
+                            <a:srgbClr val="000000"/>
+                          </a:solidFill>
+                          <a:latin typeface="Arial"/>
+                        </a:rPr>
+                        <a:t>35.51108001708958</a:t>
+                      </a:r>
+                    </a:p>
+                  </a:txBody>
+                  <a:tcPr anchor="ctr">
+                    <a:solidFill>
+                      <a:srgbClr val="FFFFFF"/>
+                    </a:solidFill>
+                    <a:lnB w="12700" cap="sq">
+                      <a:solidFill>
+                        <a:srgbClr val="000000"/>
+                      </a:solidFill>
+                    </a:lnB>
+                  </a:tcPr>
+                </a:tc>
+                <a:tc>
+                  <a:txBody>
+                    <a:bodyPr wrap="square"/>
+                    <a:lstStyle/>
+                    <a:p>
+                      <a:pPr algn="l"/>
+                      <a:r>
+                        <a:rPr sz="1100" b="0" i="0">
+                          <a:solidFill>
+                            <a:srgbClr val="000000"/>
+                          </a:solidFill>
+                          <a:latin typeface="Arial"/>
+                        </a:rPr>
+                        <a:t>366</a:t>
+                      </a:r>
+                    </a:p>
+                  </a:txBody>
+                  <a:tcPr anchor="ctr">
+                    <a:solidFill>
+                      <a:srgbClr val="FFFFFF"/>
+                    </a:solidFill>
+                    <a:lnB w="12700" cap="sq">
+                      <a:solidFill>
+                        <a:srgbClr val="000000"/>
+                      </a:solidFill>
+                    </a:lnB>
+                  </a:tcPr>
+                </a:tc>
+                <a:tc>
+                  <a:txBody>
+                    <a:bodyPr wrap="square"/>
+                    <a:lstStyle/>
+                    <a:p>
+                      <a:pPr algn="l"/>
+                      <a:r>
+                        <a:rPr sz="1100" b="0" i="0">
+                          <a:solidFill>
+                            <a:srgbClr val="000000"/>
+                          </a:solidFill>
+                          <a:latin typeface="Arial"/>
+                        </a:rPr>
+                        <a:t>0.0</a:t>
+                      </a:r>
+                    </a:p>
+                  </a:txBody>
+                  <a:tcPr anchor="ctr">
+                    <a:solidFill>
+                      <a:srgbClr val="FFFFFF"/>
+                    </a:solidFill>
+                    <a:lnB w="12700" cap="sq">
+                      <a:solidFill>
+                        <a:srgbClr val="000000"/>
+                      </a:solidFill>
+                    </a:lnB>
                   </a:tcPr>
                 </a:tc>
               </a:tr>
-              <a:tr h="249381">
-                <a:tc>
-                  <a:txBody>
-                    <a:bodyPr/>
-                    <a:lstStyle/>
-                    <a:p>
-                      <a:r>
-                        <a:rPr sz="1100" b="1">
+              <a:tr h="274320">
+                <a:tc>
+                  <a:txBody>
+                    <a:bodyPr wrap="square"/>
+                    <a:lstStyle/>
+                    <a:p>
+                      <a:pPr algn="l"/>
+                      <a:r>
+                        <a:rPr sz="1100" b="0" i="0">
                           <a:solidFill>
                             <a:srgbClr val="000000"/>
                           </a:solidFill>
@@ -5224,15 +5722,21 @@
                     <a:solidFill>
                       <a:srgbClr val="FFFFFF"/>
                     </a:solidFill>
-                  </a:tcPr>
-                </a:tc>
-                <a:tc>
-                  <a:txBody>
-                    <a:bodyPr/>
-                    <a:lstStyle/>
-                    <a:p>
-                      <a:r>
-                        <a:rPr sz="1100" b="1">
+                    <a:lnB w="12700" cap="sq">
+                      <a:solidFill>
+                        <a:srgbClr val="000000"/>
+                      </a:solidFill>
+                    </a:lnB>
+                  </a:tcPr>
+                </a:tc>
+                <a:tc>
+                  <a:txBody>
+                    <a:bodyPr wrap="square"/>
+                    <a:lstStyle/>
+                    <a:p>
+                      <a:pPr algn="l"/>
+                      <a:r>
+                        <a:rPr sz="1100" b="0" i="0">
                           <a:solidFill>
                             <a:srgbClr val="000000"/>
                           </a:solidFill>
@@ -5246,15 +5750,21 @@
                     <a:solidFill>
                       <a:srgbClr val="FFFFFF"/>
                     </a:solidFill>
-                  </a:tcPr>
-                </a:tc>
-                <a:tc>
-                  <a:txBody>
-                    <a:bodyPr/>
-                    <a:lstStyle/>
-                    <a:p>
-                      <a:r>
-                        <a:rPr sz="1100" b="0">
+                    <a:lnB w="12700" cap="sq">
+                      <a:solidFill>
+                        <a:srgbClr val="000000"/>
+                      </a:solidFill>
+                    </a:lnB>
+                  </a:tcPr>
+                </a:tc>
+                <a:tc>
+                  <a:txBody>
+                    <a:bodyPr wrap="square"/>
+                    <a:lstStyle/>
+                    <a:p>
+                      <a:pPr algn="l"/>
+                      <a:r>
+                        <a:rPr sz="1100" b="0" i="0">
                           <a:solidFill>
                             <a:srgbClr val="000000"/>
                           </a:solidFill>
@@ -5264,87 +5774,111 @@
                       </a:r>
                     </a:p>
                   </a:txBody>
-                  <a:tcPr>
-                    <a:solidFill>
-                      <a:srgbClr val="FFFFFF"/>
-                    </a:solidFill>
-                  </a:tcPr>
-                </a:tc>
-                <a:tc>
-                  <a:txBody>
-                    <a:bodyPr/>
-                    <a:lstStyle/>
-                    <a:p>
-                      <a:r>
-                        <a:rPr sz="1100" b="0">
-                          <a:solidFill>
-                            <a:srgbClr val="000000"/>
-                          </a:solidFill>
-                          <a:latin typeface="Arial"/>
-                        </a:rPr>
-                        <a:t>$32.66</a:t>
-                      </a:r>
-                    </a:p>
-                  </a:txBody>
-                  <a:tcPr>
-                    <a:solidFill>
-                      <a:srgbClr val="FFFFFF"/>
-                    </a:solidFill>
-                  </a:tcPr>
-                </a:tc>
-                <a:tc>
-                  <a:txBody>
-                    <a:bodyPr/>
-                    <a:lstStyle/>
-                    <a:p>
-                      <a:r>
-                        <a:rPr sz="1100" b="0">
-                          <a:solidFill>
-                            <a:srgbClr val="000000"/>
-                          </a:solidFill>
-                          <a:latin typeface="Arial"/>
-                        </a:rPr>
-                        <a:t>130.0</a:t>
-                      </a:r>
-                    </a:p>
-                  </a:txBody>
-                  <a:tcPr>
-                    <a:solidFill>
-                      <a:srgbClr val="FFFFFF"/>
-                    </a:solidFill>
-                  </a:tcPr>
-                </a:tc>
-                <a:tc>
-                  <a:txBody>
-                    <a:bodyPr/>
-                    <a:lstStyle/>
-                    <a:p>
-                      <a:r>
-                        <a:rPr sz="1100" b="0">
-                          <a:solidFill>
-                            <a:srgbClr val="000000"/>
-                          </a:solidFill>
-                          <a:latin typeface="Arial"/>
-                        </a:rPr>
-                        <a:t>100.0%</a:t>
-                      </a:r>
-                    </a:p>
-                  </a:txBody>
-                  <a:tcPr>
-                    <a:solidFill>
-                      <a:srgbClr val="FFFFFF"/>
-                    </a:solidFill>
+                  <a:tcPr anchor="ctr">
+                    <a:solidFill>
+                      <a:srgbClr val="FFFFFF"/>
+                    </a:solidFill>
+                    <a:lnB w="12700" cap="sq">
+                      <a:solidFill>
+                        <a:srgbClr val="000000"/>
+                      </a:solidFill>
+                    </a:lnB>
+                  </a:tcPr>
+                </a:tc>
+                <a:tc>
+                  <a:txBody>
+                    <a:bodyPr wrap="square"/>
+                    <a:lstStyle/>
+                    <a:p>
+                      <a:pPr algn="l"/>
+                      <a:r>
+                        <a:rPr sz="1100" b="0" i="0">
+                          <a:solidFill>
+                            <a:srgbClr val="000000"/>
+                          </a:solidFill>
+                          <a:latin typeface="Arial"/>
+                        </a:rPr>
+                        <a:t>32.656333518080054</a:t>
+                      </a:r>
+                    </a:p>
+                  </a:txBody>
+                  <a:tcPr anchor="ctr">
+                    <a:solidFill>
+                      <a:srgbClr val="FFFFFF"/>
+                    </a:solidFill>
+                    <a:lnB w="12700" cap="sq">
+                      <a:solidFill>
+                        <a:srgbClr val="000000"/>
+                      </a:solidFill>
+                    </a:lnB>
+                  </a:tcPr>
+                </a:tc>
+                <a:tc>
+                  <a:txBody>
+                    <a:bodyPr wrap="square"/>
+                    <a:lstStyle/>
+                    <a:p>
+                      <a:pPr algn="l"/>
+                      <a:r>
+                        <a:rPr sz="1100" b="0" i="0">
+                          <a:solidFill>
+                            <a:srgbClr val="000000"/>
+                          </a:solidFill>
+                          <a:latin typeface="Arial"/>
+                        </a:rPr>
+                        <a:t>130</a:t>
+                      </a:r>
+                    </a:p>
+                  </a:txBody>
+                  <a:tcPr anchor="ctr">
+                    <a:solidFill>
+                      <a:srgbClr val="FFFFFF"/>
+                    </a:solidFill>
+                    <a:lnB w="12700" cap="sq">
+                      <a:solidFill>
+                        <a:srgbClr val="000000"/>
+                      </a:solidFill>
+                    </a:lnB>
+                  </a:tcPr>
+                </a:tc>
+                <a:tc>
+                  <a:txBody>
+                    <a:bodyPr wrap="square"/>
+                    <a:lstStyle/>
+                    <a:p>
+                      <a:pPr algn="l"/>
+                      <a:r>
+                        <a:rPr sz="1100" b="0" i="0">
+                          <a:solidFill>
+                            <a:srgbClr val="000000"/>
+                          </a:solidFill>
+                          <a:latin typeface="Arial"/>
+                        </a:rPr>
+                        <a:t>1.0</a:t>
+                      </a:r>
+                    </a:p>
+                  </a:txBody>
+                  <a:tcPr anchor="ctr">
+                    <a:solidFill>
+                      <a:srgbClr val="FFFFFF"/>
+                    </a:solidFill>
+                    <a:lnB w="12700" cap="sq">
+                      <a:solidFill>
+                        <a:srgbClr val="000000"/>
+                      </a:solidFill>
+                    </a:lnB>
                   </a:tcPr>
                 </a:tc>
               </a:tr>
-              <a:tr h="249381">
-                <a:tc>
-                  <a:txBody>
-                    <a:bodyPr/>
-                    <a:lstStyle/>
-                    <a:p>
-                      <a:r>
-                        <a:rPr sz="1100" b="1">
+              <a:tr h="274320">
+                <a:tc>
+                  <a:txBody>
+                    <a:bodyPr wrap="square"/>
+                    <a:lstStyle/>
+                    <a:p>
+                      <a:pPr algn="l"/>
+                      <a:r>
+                        <a:rPr sz="1100" b="0" i="0">
                           <a:solidFill>
                             <a:srgbClr val="000000"/>
                           </a:solidFill>
@@ -5358,15 +5892,21 @@
                     <a:solidFill>
                       <a:srgbClr val="FFFFFF"/>
                     </a:solidFill>
-                  </a:tcPr>
-                </a:tc>
-                <a:tc>
-                  <a:txBody>
-                    <a:bodyPr/>
-                    <a:lstStyle/>
-                    <a:p>
-                      <a:r>
-                        <a:rPr sz="1100" b="1">
+                    <a:lnB w="12700" cap="sq">
+                      <a:solidFill>
+                        <a:srgbClr val="000000"/>
+                      </a:solidFill>
+                    </a:lnB>
+                  </a:tcPr>
+                </a:tc>
+                <a:tc>
+                  <a:txBody>
+                    <a:bodyPr wrap="square"/>
+                    <a:lstStyle/>
+                    <a:p>
+                      <a:pPr algn="l"/>
+                      <a:r>
+                        <a:rPr sz="1100" b="0" i="0">
                           <a:solidFill>
                             <a:srgbClr val="000000"/>
                           </a:solidFill>
@@ -5380,15 +5920,21 @@
                     <a:solidFill>
                       <a:srgbClr val="FFFFFF"/>
                     </a:solidFill>
-                  </a:tcPr>
-                </a:tc>
-                <a:tc>
-                  <a:txBody>
-                    <a:bodyPr/>
-                    <a:lstStyle/>
-                    <a:p>
-                      <a:r>
-                        <a:rPr sz="1100" b="0">
+                    <a:lnB w="12700" cap="sq">
+                      <a:solidFill>
+                        <a:srgbClr val="000000"/>
+                      </a:solidFill>
+                    </a:lnB>
+                  </a:tcPr>
+                </a:tc>
+                <a:tc>
+                  <a:txBody>
+                    <a:bodyPr wrap="square"/>
+                    <a:lstStyle/>
+                    <a:p>
+                      <a:pPr algn="l"/>
+                      <a:r>
+                        <a:rPr sz="1100" b="0" i="0">
                           <a:solidFill>
                             <a:srgbClr val="000000"/>
                           </a:solidFill>
@@ -5398,87 +5944,111 @@
                       </a:r>
                     </a:p>
                   </a:txBody>
-                  <a:tcPr>
-                    <a:solidFill>
-                      <a:srgbClr val="FFFFFF"/>
-                    </a:solidFill>
-                  </a:tcPr>
-                </a:tc>
-                <a:tc>
-                  <a:txBody>
-                    <a:bodyPr/>
-                    <a:lstStyle/>
-                    <a:p>
-                      <a:r>
-                        <a:rPr sz="1100" b="0">
-                          <a:solidFill>
-                            <a:srgbClr val="000000"/>
-                          </a:solidFill>
-                          <a:latin typeface="Arial"/>
-                        </a:rPr>
-                        <a:t>$32.08</a:t>
-                      </a:r>
-                    </a:p>
-                  </a:txBody>
-                  <a:tcPr>
-                    <a:solidFill>
-                      <a:srgbClr val="FFFFFF"/>
-                    </a:solidFill>
-                  </a:tcPr>
-                </a:tc>
-                <a:tc>
-                  <a:txBody>
-                    <a:bodyPr/>
-                    <a:lstStyle/>
-                    <a:p>
-                      <a:r>
-                        <a:rPr sz="1100" b="0">
-                          <a:solidFill>
-                            <a:srgbClr val="000000"/>
-                          </a:solidFill>
-                          <a:latin typeface="Arial"/>
-                        </a:rPr>
-                        <a:t>232.0</a:t>
-                      </a:r>
-                    </a:p>
-                  </a:txBody>
-                  <a:tcPr>
-                    <a:solidFill>
-                      <a:srgbClr val="FFFFFF"/>
-                    </a:solidFill>
-                  </a:tcPr>
-                </a:tc>
-                <a:tc>
-                  <a:txBody>
-                    <a:bodyPr/>
-                    <a:lstStyle/>
-                    <a:p>
-                      <a:r>
-                        <a:rPr sz="1100" b="0">
-                          <a:solidFill>
-                            <a:srgbClr val="000000"/>
-                          </a:solidFill>
-                          <a:latin typeface="Arial"/>
-                        </a:rPr>
-                        <a:t>0.0%</a:t>
-                      </a:r>
-                    </a:p>
-                  </a:txBody>
-                  <a:tcPr>
-                    <a:solidFill>
-                      <a:srgbClr val="FFFFFF"/>
-                    </a:solidFill>
+                  <a:tcPr anchor="ctr">
+                    <a:solidFill>
+                      <a:srgbClr val="FFFFFF"/>
+                    </a:solidFill>
+                    <a:lnB w="12700" cap="sq">
+                      <a:solidFill>
+                        <a:srgbClr val="000000"/>
+                      </a:solidFill>
+                    </a:lnB>
+                  </a:tcPr>
+                </a:tc>
+                <a:tc>
+                  <a:txBody>
+                    <a:bodyPr wrap="square"/>
+                    <a:lstStyle/>
+                    <a:p>
+                      <a:pPr algn="l"/>
+                      <a:r>
+                        <a:rPr sz="1100" b="0" i="0">
+                          <a:solidFill>
+                            <a:srgbClr val="000000"/>
+                          </a:solidFill>
+                          <a:latin typeface="Arial"/>
+                        </a:rPr>
+                        <a:t>32.07742336225645</a:t>
+                      </a:r>
+                    </a:p>
+                  </a:txBody>
+                  <a:tcPr anchor="ctr">
+                    <a:solidFill>
+                      <a:srgbClr val="FFFFFF"/>
+                    </a:solidFill>
+                    <a:lnB w="12700" cap="sq">
+                      <a:solidFill>
+                        <a:srgbClr val="000000"/>
+                      </a:solidFill>
+                    </a:lnB>
+                  </a:tcPr>
+                </a:tc>
+                <a:tc>
+                  <a:txBody>
+                    <a:bodyPr wrap="square"/>
+                    <a:lstStyle/>
+                    <a:p>
+                      <a:pPr algn="l"/>
+                      <a:r>
+                        <a:rPr sz="1100" b="0" i="0">
+                          <a:solidFill>
+                            <a:srgbClr val="000000"/>
+                          </a:solidFill>
+                          <a:latin typeface="Arial"/>
+                        </a:rPr>
+                        <a:t>232</a:t>
+                      </a:r>
+                    </a:p>
+                  </a:txBody>
+                  <a:tcPr anchor="ctr">
+                    <a:solidFill>
+                      <a:srgbClr val="FFFFFF"/>
+                    </a:solidFill>
+                    <a:lnB w="12700" cap="sq">
+                      <a:solidFill>
+                        <a:srgbClr val="000000"/>
+                      </a:solidFill>
+                    </a:lnB>
+                  </a:tcPr>
+                </a:tc>
+                <a:tc>
+                  <a:txBody>
+                    <a:bodyPr wrap="square"/>
+                    <a:lstStyle/>
+                    <a:p>
+                      <a:pPr algn="l"/>
+                      <a:r>
+                        <a:rPr sz="1100" b="0" i="0">
+                          <a:solidFill>
+                            <a:srgbClr val="000000"/>
+                          </a:solidFill>
+                          <a:latin typeface="Arial"/>
+                        </a:rPr>
+                        <a:t>0.0</a:t>
+                      </a:r>
+                    </a:p>
+                  </a:txBody>
+                  <a:tcPr anchor="ctr">
+                    <a:solidFill>
+                      <a:srgbClr val="FFFFFF"/>
+                    </a:solidFill>
+                    <a:lnB w="12700" cap="sq">
+                      <a:solidFill>
+                        <a:srgbClr val="000000"/>
+                      </a:solidFill>
+                    </a:lnB>
                   </a:tcPr>
                 </a:tc>
               </a:tr>
-              <a:tr h="249390">
-                <a:tc>
-                  <a:txBody>
-                    <a:bodyPr/>
-                    <a:lstStyle/>
-                    <a:p>
-                      <a:r>
-                        <a:rPr sz="1100" b="1">
+              <a:tr h="274320">
+                <a:tc>
+                  <a:txBody>
+                    <a:bodyPr wrap="square"/>
+                    <a:lstStyle/>
+                    <a:p>
+                      <a:pPr algn="l"/>
+                      <a:r>
+                        <a:rPr sz="1100" b="0" i="0">
                           <a:solidFill>
                             <a:srgbClr val="000000"/>
                           </a:solidFill>
@@ -5492,15 +6062,21 @@
                     <a:solidFill>
                       <a:srgbClr val="FFFFFF"/>
                     </a:solidFill>
-                  </a:tcPr>
-                </a:tc>
-                <a:tc>
-                  <a:txBody>
-                    <a:bodyPr/>
-                    <a:lstStyle/>
-                    <a:p>
-                      <a:r>
-                        <a:rPr sz="1100" b="1">
+                    <a:lnB w="12700" cap="sq">
+                      <a:solidFill>
+                        <a:srgbClr val="000000"/>
+                      </a:solidFill>
+                    </a:lnB>
+                  </a:tcPr>
+                </a:tc>
+                <a:tc>
+                  <a:txBody>
+                    <a:bodyPr wrap="square"/>
+                    <a:lstStyle/>
+                    <a:p>
+                      <a:pPr algn="l"/>
+                      <a:r>
+                        <a:rPr sz="1100" b="0" i="0">
                           <a:solidFill>
                             <a:srgbClr val="000000"/>
                           </a:solidFill>
@@ -5514,15 +6090,21 @@
                     <a:solidFill>
                       <a:srgbClr val="FFFFFF"/>
                     </a:solidFill>
-                  </a:tcPr>
-                </a:tc>
-                <a:tc>
-                  <a:txBody>
-                    <a:bodyPr/>
-                    <a:lstStyle/>
-                    <a:p>
-                      <a:r>
-                        <a:rPr sz="1100" b="0">
+                    <a:lnB w="12700" cap="sq">
+                      <a:solidFill>
+                        <a:srgbClr val="000000"/>
+                      </a:solidFill>
+                    </a:lnB>
+                  </a:tcPr>
+                </a:tc>
+                <a:tc>
+                  <a:txBody>
+                    <a:bodyPr wrap="square"/>
+                    <a:lstStyle/>
+                    <a:p>
+                      <a:pPr algn="l"/>
+                      <a:r>
+                        <a:rPr sz="1100" b="0" i="0">
                           <a:solidFill>
                             <a:srgbClr val="000000"/>
                           </a:solidFill>
@@ -5532,80 +6114,121 @@
                       </a:r>
                     </a:p>
                   </a:txBody>
-                  <a:tcPr>
-                    <a:solidFill>
-                      <a:srgbClr val="FFFFFF"/>
-                    </a:solidFill>
-                  </a:tcPr>
-                </a:tc>
-                <a:tc>
-                  <a:txBody>
-                    <a:bodyPr/>
-                    <a:lstStyle/>
-                    <a:p>
-                      <a:r>
-                        <a:rPr sz="1100" b="0">
-                          <a:solidFill>
-                            <a:srgbClr val="000000"/>
-                          </a:solidFill>
-                          <a:latin typeface="Arial"/>
-                        </a:rPr>
-                        <a:t>$43.45</a:t>
-                      </a:r>
-                    </a:p>
-                  </a:txBody>
-                  <a:tcPr>
-                    <a:solidFill>
-                      <a:srgbClr val="FFFFFF"/>
-                    </a:solidFill>
-                  </a:tcPr>
-                </a:tc>
-                <a:tc>
-                  <a:txBody>
-                    <a:bodyPr/>
-                    <a:lstStyle/>
-                    <a:p>
-                      <a:r>
-                        <a:rPr sz="1100" b="0">
-                          <a:solidFill>
-                            <a:srgbClr val="000000"/>
-                          </a:solidFill>
-                          <a:latin typeface="Arial"/>
-                        </a:rPr>
-                        <a:t>84.0</a:t>
-                      </a:r>
-                    </a:p>
-                  </a:txBody>
-                  <a:tcPr>
-                    <a:solidFill>
-                      <a:srgbClr val="FFFFFF"/>
-                    </a:solidFill>
-                  </a:tcPr>
-                </a:tc>
-                <a:tc>
-                  <a:txBody>
-                    <a:bodyPr/>
-                    <a:lstStyle/>
-                    <a:p>
-                      <a:r>
-                        <a:rPr sz="1100" b="0">
-                          <a:solidFill>
-                            <a:srgbClr val="000000"/>
-                          </a:solidFill>
-                          <a:latin typeface="Arial"/>
-                        </a:rPr>
-                        <a:t>100.0%</a:t>
-                      </a:r>
-                    </a:p>
-                  </a:txBody>
-                  <a:tcPr>
-                    <a:solidFill>
-                      <a:srgbClr val="FFFFFF"/>
-                    </a:solidFill>
+                  <a:tcPr anchor="ctr">
+                    <a:solidFill>
+                      <a:srgbClr val="FFFFFF"/>
+                    </a:solidFill>
+                    <a:lnB w="12700" cap="sq">
+                      <a:solidFill>
+                        <a:srgbClr val="000000"/>
+                      </a:solidFill>
+                    </a:lnB>
+                  </a:tcPr>
+                </a:tc>
+                <a:tc>
+                  <a:txBody>
+                    <a:bodyPr wrap="square"/>
+                    <a:lstStyle/>
+                    <a:p>
+                      <a:pPr algn="l"/>
+                      <a:r>
+                        <a:rPr sz="1100" b="0" i="0">
+                          <a:solidFill>
+                            <a:srgbClr val="000000"/>
+                          </a:solidFill>
+                          <a:latin typeface="Arial"/>
+                        </a:rPr>
+                        <a:t>43.448693252682595</a:t>
+                      </a:r>
+                    </a:p>
+                  </a:txBody>
+                  <a:tcPr anchor="ctr">
+                    <a:solidFill>
+                      <a:srgbClr val="FFFFFF"/>
+                    </a:solidFill>
+                    <a:lnB w="12700" cap="sq">
+                      <a:solidFill>
+                        <a:srgbClr val="000000"/>
+                      </a:solidFill>
+                    </a:lnB>
+                  </a:tcPr>
+                </a:tc>
+                <a:tc>
+                  <a:txBody>
+                    <a:bodyPr wrap="square"/>
+                    <a:lstStyle/>
+                    <a:p>
+                      <a:pPr algn="l"/>
+                      <a:r>
+                        <a:rPr sz="1100" b="0" i="0">
+                          <a:solidFill>
+                            <a:srgbClr val="000000"/>
+                          </a:solidFill>
+                          <a:latin typeface="Arial"/>
+                        </a:rPr>
+                        <a:t>84</a:t>
+                      </a:r>
+                    </a:p>
+                  </a:txBody>
+                  <a:tcPr anchor="ctr">
+                    <a:solidFill>
+                      <a:srgbClr val="FFFFFF"/>
+                    </a:solidFill>
+                    <a:lnB w="12700" cap="sq">
+                      <a:solidFill>
+                        <a:srgbClr val="000000"/>
+                      </a:solidFill>
+                    </a:lnB>
+                  </a:tcPr>
+                </a:tc>
+                <a:tc>
+                  <a:txBody>
+                    <a:bodyPr wrap="square"/>
+                    <a:lstStyle/>
+                    <a:p>
+                      <a:pPr algn="l"/>
+                      <a:r>
+                        <a:rPr sz="1100" b="0" i="0">
+                          <a:solidFill>
+                            <a:srgbClr val="000000"/>
+                          </a:solidFill>
+                          <a:latin typeface="Arial"/>
+                        </a:rPr>
+                        <a:t>1.0</a:t>
+                      </a:r>
+                    </a:p>
+                  </a:txBody>
+                  <a:tcPr anchor="ctr">
+                    <a:solidFill>
+                      <a:srgbClr val="FFFFFF"/>
+                    </a:solidFill>
+                    <a:lnB w="12700" cap="sq">
+                      <a:solidFill>
+                        <a:srgbClr val="000000"/>
+                      </a:solidFill>
+                    </a:lnB>
                   </a:tcPr>
                 </a:tc>
               </a:tr>
             </a:tbl>
+          </a:graphicData>
+        </a:graphic>
+      </p:graphicFrame>
+      <p:graphicFrame>
+        <p:nvGraphicFramePr>
+          <p:cNvPr id="4" name="Chart 3"/>
+          <p:cNvGraphicFramePr>
+            <a:graphicFrameLocks noGrp="1"/>
+          </p:cNvGraphicFramePr>
+          <p:nvPr/>
+        </p:nvGraphicFramePr>
+        <p:xfrm>
+          <a:off x="457200" y="1097280"/>
+          <a:ext cx="7315200" cy="4572000"/>
+        </p:xfrm>
+        <a:graphic>
+          <a:graphicData uri="http://schemas.openxmlformats.org/drawingml/2006/chart">
+            <c:chart xmlns:c="http://schemas.openxmlformats.org/drawingml/2006/chart" r:id="rId2"/>
           </a:graphicData>
         </a:graphic>
       </p:graphicFrame>

</xml_diff>

<commit_message>
Update test.pptx with revised content and enhancements
</commit_message>
<xml_diff>
--- a/test.pptx
+++ b/test.pptx
@@ -118,13 +118,31 @@
   <c:date1904 val="0"/>
   <c:chart>
     <c:title>
+      <c:tx>
+        <c:rich>
+          <a:bodyPr>
+            <a:spAutoFit/>
+          </a:bodyPr>
+          <a:lstStyle/>
+          <a:p>
+            <a:r>
+              <a:rPr sz="1800" b="1">
+                <a:solidFill>
+                  <a:srgbClr val="CCCCCC"/>
+                </a:solidFill>
+              </a:rPr>
+              <a:t>Sample Stacked Bar Chart</a:t>
+            </a:r>
+          </a:p>
+        </c:rich>
+      </c:tx>
       <c:layout/>
       <c:overlay val="0"/>
     </c:title>
     <c:autoTitleDeleted val="0"/>
     <c:plotArea>
       <c:barChart>
-        <c:barDir val="bar"/>
+        <c:barDir val="col"/>
         <c:grouping val="stacked"/>
         <c:ser>
           <c:idx val="0"/>
@@ -135,7 +153,7 @@
               <c:strCache>
                 <c:ptCount val="1"/>
                 <c:pt idx="0">
-                  <c:v>True</c:v>
+                  <c:v>False</c:v>
                 </c:pt>
               </c:strCache>
             </c:strRef>
@@ -149,6 +167,30 @@
             <c:strRef>
               <c:f>Sheet1!$A$2:$A$6</c:f>
               <c:strCache>
+                <c:ptCount val="5"/>
+                <c:pt idx="0">
+                  <c:v>Books</c:v>
+                </c:pt>
+                <c:pt idx="1">
+                  <c:v>Clothing</c:v>
+                </c:pt>
+                <c:pt idx="2">
+                  <c:v>Electronics</c:v>
+                </c:pt>
+                <c:pt idx="3">
+                  <c:v>Food</c:v>
+                </c:pt>
+                <c:pt idx="4">
+                  <c:v>Home</c:v>
+                </c:pt>
+              </c:strCache>
+            </c:strRef>
+          </c:cat>
+          <c:val>
+            <c:numRef>
+              <c:f>Sheet1!$B$2:$B$6</c:f>
+              <c:numCache>
+                <c:formatCode>General</c:formatCode>
                 <c:ptCount val="5"/>
                 <c:pt idx="0">
                   <c:v>94</c:v>
@@ -165,12 +207,55 @@
                 <c:pt idx="4">
                   <c:v>81</c:v>
                 </c:pt>
+              </c:numCache>
+            </c:numRef>
+          </c:val>
+        </c:ser>
+        <c:ser>
+          <c:idx val="1"/>
+          <c:order val="1"/>
+          <c:tx>
+            <c:strRef>
+              <c:f>Sheet1!$C$1</c:f>
+              <c:strCache>
+                <c:ptCount val="1"/>
+                <c:pt idx="0">
+                  <c:v>True</c:v>
+                </c:pt>
+              </c:strCache>
+            </c:strRef>
+          </c:tx>
+          <c:spPr>
+            <a:solidFill>
+              <a:srgbClr val="2C1F10"/>
+            </a:solidFill>
+          </c:spPr>
+          <c:cat>
+            <c:strRef>
+              <c:f>Sheet1!$A$2:$A$6</c:f>
+              <c:strCache>
+                <c:ptCount val="5"/>
+                <c:pt idx="0">
+                  <c:v>Books</c:v>
+                </c:pt>
+                <c:pt idx="1">
+                  <c:v>Clothing</c:v>
+                </c:pt>
+                <c:pt idx="2">
+                  <c:v>Electronics</c:v>
+                </c:pt>
+                <c:pt idx="3">
+                  <c:v>Food</c:v>
+                </c:pt>
+                <c:pt idx="4">
+                  <c:v>Home</c:v>
+                </c:pt>
               </c:strCache>
             </c:strRef>
           </c:cat>
           <c:val>
             <c:numRef>
-              <c:f>Sheet1!$B$2:$B$6</c:f>
+              <c:f>Sheet1!$C$2:$C$6</c:f>
               <c:numCache>
                 <c:formatCode>General</c:formatCode>
                 <c:ptCount val="5"/>
@@ -200,16 +285,15 @@
             <a:lstStyle/>
             <a:p>
               <a:pPr>
-                <a:defRPr sz="900" b="0">
+                <a:defRPr sz="800" b="1">
                   <a:solidFill>
-                    <a:srgbClr val="FFFFFF"/>
+                    <a:srgbClr val="CCCCCC"/>
                   </a:solidFill>
-                  <a:latin typeface="Calibri"/>
                 </a:defRPr>
               </a:pPr>
             </a:p>
           </c:txPr>
-          <c:dLblPos val="ctr"/>
+          <c:dLblPos val="inBase"/>
           <c:showLegendKey val="0"/>
           <c:showVal val="1"/>
           <c:showCatName val="0"/>
@@ -218,7 +302,7 @@
           <c:showBubbleSize val="0"/>
           <c:showLeaderLines val="1"/>
         </c:dLbls>
-        <c:gapWidth/>
+        <c:gapWidth val="100"/>
         <c:overlap val="100"/>
         <c:axId val="-2068027336"/>
         <c:axId val="-2113994440"/>
@@ -229,19 +313,21 @@
           <c:orientation val="minMax"/>
         </c:scaling>
         <c:delete val="0"/>
-        <c:axPos val="l"/>
+        <c:axPos val="b"/>
         <c:majorTickMark val="out"/>
         <c:minorTickMark val="none"/>
         <c:tickLblPos val="nextTo"/>
-        <c:spPr/>
+        <c:spPr>
+          <a:ln>
+            <a:noFill/>
+          </a:ln>
+        </c:spPr>
         <c:txPr>
           <a:bodyPr/>
           <a:lstStyle/>
           <a:p>
             <a:pPr>
-              <a:defRPr sz="1000">
-                <a:latin typeface="Calibri"/>
-              </a:defRPr>
+              <a:defRPr sz="900"/>
             </a:pPr>
           </a:p>
         </c:txPr>
@@ -256,21 +342,22 @@
         <c:axId val="-2113994440"/>
         <c:scaling/>
         <c:delete val="0"/>
-        <c:axPos val="b"/>
-        <c:majorGridlines/>
-        <c:numFmt formatCode="General" sourceLinked="1"/>
+        <c:axPos val="l"/>
+        <c:numFmt formatCode="#,##0" sourceLinked="0"/>
         <c:majorTickMark val="out"/>
         <c:minorTickMark val="none"/>
         <c:tickLblPos val="nextTo"/>
-        <c:spPr/>
+        <c:spPr>
+          <a:ln>
+            <a:noFill/>
+          </a:ln>
+        </c:spPr>
         <c:txPr>
           <a:bodyPr/>
           <a:lstStyle/>
           <a:p>
             <a:pPr>
-              <a:defRPr sz="1000">
-                <a:latin typeface="Calibri"/>
-              </a:defRPr>
+              <a:defRPr sz="1000"/>
             </a:pPr>
           </a:p>
         </c:txPr>
@@ -279,16 +366,13 @@
       </c:valAx>
     </c:plotArea>
     <c:legend>
-      <c:legendPos val="b"/>
-      <c:overlay val="1"/>
+      <c:legendPos val="t"/>
       <c:txPr>
         <a:bodyPr/>
         <a:lstStyle/>
         <a:p>
           <a:pPr>
-            <a:defRPr sz="1000">
-              <a:latin typeface="Calibri"/>
-            </a:defRPr>
+            <a:defRPr sz="1000"/>
           </a:pPr>
         </a:p>
       </c:txPr>
@@ -3561,7 +3645,7 @@
         </p:nvGraphicFramePr>
         <p:xfrm>
           <a:off x="914400" y="914400"/>
-          <a:ext cx="4389120" cy="2194560"/>
+          <a:ext cx="5486400" cy="2194560"/>
         </p:xfrm>
         <a:graphic>
           <a:graphicData uri="http://schemas.openxmlformats.org/drawingml/2006/table">
@@ -3574,6 +3658,7 @@
                 <a:gridCol w="1097280"/>
                 <a:gridCol w="1097280"/>
                 <a:gridCol w="1097280"/>
+                <a:gridCol w="1097280"/>
               </a:tblGrid>
               <a:tr h="365760">
                 <a:tc>
@@ -3589,6 +3674,34 @@
                           </a:solidFill>
                           <a:latin typeface="Arial"/>
                         </a:rPr>
+                        <a:t>product_category</a:t>
+                      </a:r>
+                    </a:p>
+                  </a:txBody>
+                  <a:tcPr anchor="ctr">
+                    <a:solidFill>
+                      <a:srgbClr val="0070C0"/>
+                    </a:solidFill>
+                    <a:lnB w="12700" cap="sq">
+                      <a:solidFill>
+                        <a:srgbClr val="000000"/>
+                      </a:solidFill>
+                    </a:lnB>
+                  </a:tcPr>
+                </a:tc>
+                <a:tc>
+                  <a:txBody>
+                    <a:bodyPr wrap="square"/>
+                    <a:lstStyle/>
+                    <a:p>
+                      <a:pPr algn="ctr"/>
+                      <a:r>
+                        <a:rPr sz="1200" b="1" i="0">
+                          <a:solidFill>
+                            <a:srgbClr val="FFFFFF"/>
+                          </a:solidFill>
+                          <a:latin typeface="Arial"/>
+                        </a:rPr>
                         <a:t>Customer Count</a:t>
                       </a:r>
                     </a:p>
@@ -3703,6 +3816,34 @@
                           </a:solidFill>
                           <a:latin typeface="Arial"/>
                         </a:rPr>
+                        <a:t>Books</a:t>
+                      </a:r>
+                    </a:p>
+                  </a:txBody>
+                  <a:tcPr anchor="ctr">
+                    <a:solidFill>
+                      <a:srgbClr val="FFFFFF"/>
+                    </a:solidFill>
+                    <a:lnB w="12700" cap="sq">
+                      <a:solidFill>
+                        <a:srgbClr val="000000"/>
+                      </a:solidFill>
+                    </a:lnB>
+                  </a:tcPr>
+                </a:tc>
+                <a:tc>
+                  <a:txBody>
+                    <a:bodyPr wrap="square"/>
+                    <a:lstStyle/>
+                    <a:p>
+                      <a:pPr algn="l"/>
+                      <a:r>
+                        <a:rPr sz="1100" b="0" i="0">
+                          <a:solidFill>
+                            <a:srgbClr val="000000"/>
+                          </a:solidFill>
+                          <a:latin typeface="Arial"/>
+                        </a:rPr>
                         <a:t>130</a:t>
                       </a:r>
                     </a:p>
@@ -3731,7 +3872,7 @@
                           </a:solidFill>
                           <a:latin typeface="Arial"/>
                         </a:rPr>
-                        <a:t>31.386236771940364</a:t>
+                        <a:t>$31.39</a:t>
                       </a:r>
                     </a:p>
                   </a:txBody>
@@ -3787,7 +3928,7 @@
                           </a:solidFill>
                           <a:latin typeface="Arial"/>
                         </a:rPr>
-                        <a:t>0.27972027972027974</a:t>
+                        <a:t>28%</a:t>
                       </a:r>
                     </a:p>
                   </a:txBody>
@@ -3817,6 +3958,34 @@
                           </a:solidFill>
                           <a:latin typeface="Arial"/>
                         </a:rPr>
+                        <a:t>Clothing</a:t>
+                      </a:r>
+                    </a:p>
+                  </a:txBody>
+                  <a:tcPr anchor="ctr">
+                    <a:solidFill>
+                      <a:srgbClr val="FFFFFF"/>
+                    </a:solidFill>
+                    <a:lnB w="12700" cap="sq">
+                      <a:solidFill>
+                        <a:srgbClr val="000000"/>
+                      </a:solidFill>
+                    </a:lnB>
+                  </a:tcPr>
+                </a:tc>
+                <a:tc>
+                  <a:txBody>
+                    <a:bodyPr wrap="square"/>
+                    <a:lstStyle/>
+                    <a:p>
+                      <a:pPr algn="l"/>
+                      <a:r>
+                        <a:rPr sz="1100" b="0" i="0">
+                          <a:solidFill>
+                            <a:srgbClr val="000000"/>
+                          </a:solidFill>
+                          <a:latin typeface="Arial"/>
+                        </a:rPr>
                         <a:t>226</a:t>
                       </a:r>
                     </a:p>
@@ -3845,7 +4014,7 @@
                           </a:solidFill>
                           <a:latin typeface="Arial"/>
                         </a:rPr>
-                        <a:t>34.69882070085275</a:t>
+                        <a:t>$34.70</a:t>
                       </a:r>
                     </a:p>
                   </a:txBody>
@@ -3901,7 +4070,7 @@
                           </a:solidFill>
                           <a:latin typeface="Arial"/>
                         </a:rPr>
-                        <a:t>0.3228346456692913</a:t>
+                        <a:t>32.3%</a:t>
                       </a:r>
                     </a:p>
                   </a:txBody>
@@ -3931,6 +4100,34 @@
                           </a:solidFill>
                           <a:latin typeface="Arial"/>
                         </a:rPr>
+                        <a:t>Electronics</a:t>
+                      </a:r>
+                    </a:p>
+                  </a:txBody>
+                  <a:tcPr anchor="ctr">
+                    <a:solidFill>
+                      <a:srgbClr val="FFFFFF"/>
+                    </a:solidFill>
+                    <a:lnB w="12700" cap="sq">
+                      <a:solidFill>
+                        <a:srgbClr val="000000"/>
+                      </a:solidFill>
+                    </a:lnB>
+                  </a:tcPr>
+                </a:tc>
+                <a:tc>
+                  <a:txBody>
+                    <a:bodyPr wrap="square"/>
+                    <a:lstStyle/>
+                    <a:p>
+                      <a:pPr algn="l"/>
+                      <a:r>
+                        <a:rPr sz="1100" b="0" i="0">
+                          <a:solidFill>
+                            <a:srgbClr val="000000"/>
+                          </a:solidFill>
+                          <a:latin typeface="Arial"/>
+                        </a:rPr>
                         <a:t>257</a:t>
                       </a:r>
                     </a:p>
@@ -3959,7 +4156,7 @@
                           </a:solidFill>
                           <a:latin typeface="Arial"/>
                         </a:rPr>
-                        <a:t>31.499103245204687</a:t>
+                        <a:t>$31.50</a:t>
                       </a:r>
                     </a:p>
                   </a:txBody>
@@ -4015,7 +4212,7 @@
                           </a:solidFill>
                           <a:latin typeface="Arial"/>
                         </a:rPr>
-                        <a:t>0.323943661971831</a:t>
+                        <a:t>32.4%</a:t>
                       </a:r>
                     </a:p>
                   </a:txBody>
@@ -4045,6 +4242,34 @@
                           </a:solidFill>
                           <a:latin typeface="Arial"/>
                         </a:rPr>
+                        <a:t>Food</a:t>
+                      </a:r>
+                    </a:p>
+                  </a:txBody>
+                  <a:tcPr anchor="ctr">
+                    <a:solidFill>
+                      <a:srgbClr val="FFFFFF"/>
+                    </a:solidFill>
+                    <a:lnB w="12700" cap="sq">
+                      <a:solidFill>
+                        <a:srgbClr val="000000"/>
+                      </a:solidFill>
+                    </a:lnB>
+                  </a:tcPr>
+                </a:tc>
+                <a:tc>
+                  <a:txBody>
+                    <a:bodyPr wrap="square"/>
+                    <a:lstStyle/>
+                    <a:p>
+                      <a:pPr algn="l"/>
+                      <a:r>
+                        <a:rPr sz="1100" b="0" i="0">
+                          <a:solidFill>
+                            <a:srgbClr val="000000"/>
+                          </a:solidFill>
+                          <a:latin typeface="Arial"/>
+                        </a:rPr>
                         <a:t>182</a:t>
                       </a:r>
                     </a:p>
@@ -4073,7 +4298,7 @@
                           </a:solidFill>
                           <a:latin typeface="Arial"/>
                         </a:rPr>
-                        <a:t>34.69747726487187</a:t>
+                        <a:t>$34.70</a:t>
                       </a:r>
                     </a:p>
                   </a:txBody>
@@ -4129,7 +4354,7 @@
                           </a:solidFill>
                           <a:latin typeface="Arial"/>
                         </a:rPr>
-                        <a:t>0.285</a:t>
+                        <a:t>28.5%</a:t>
                       </a:r>
                     </a:p>
                   </a:txBody>
@@ -4159,6 +4384,34 @@
                           </a:solidFill>
                           <a:latin typeface="Arial"/>
                         </a:rPr>
+                        <a:t>Home</a:t>
+                      </a:r>
+                    </a:p>
+                  </a:txBody>
+                  <a:tcPr anchor="ctr">
+                    <a:solidFill>
+                      <a:srgbClr val="FFFFFF"/>
+                    </a:solidFill>
+                    <a:lnB w="12700" cap="sq">
+                      <a:solidFill>
+                        <a:srgbClr val="000000"/>
+                      </a:solidFill>
+                    </a:lnB>
+                  </a:tcPr>
+                </a:tc>
+                <a:tc>
+                  <a:txBody>
+                    <a:bodyPr wrap="square"/>
+                    <a:lstStyle/>
+                    <a:p>
+                      <a:pPr algn="l"/>
+                      <a:r>
+                        <a:rPr sz="1100" b="0" i="0">
+                          <a:solidFill>
+                            <a:srgbClr val="000000"/>
+                          </a:solidFill>
+                          <a:latin typeface="Arial"/>
+                        </a:rPr>
                         <a:t>112</a:t>
                       </a:r>
                     </a:p>
@@ -4187,7 +4440,7 @@
                           </a:solidFill>
                           <a:latin typeface="Arial"/>
                         </a:rPr>
-                        <a:t>35.230800726828406</a:t>
+                        <a:t>$35.23</a:t>
                       </a:r>
                     </a:p>
                   </a:txBody>
@@ -4243,7 +4496,7 @@
                           </a:solidFill>
                           <a:latin typeface="Arial"/>
                         </a:rPr>
-                        <a:t>0.2773109243697479</a:t>
+                        <a:t>27.7%</a:t>
                       </a:r>
                     </a:p>
                   </a:txBody>
@@ -6223,8 +6476,8 @@
           <p:nvPr/>
         </p:nvGraphicFramePr>
         <p:xfrm>
-          <a:off x="457200" y="1097280"/>
-          <a:ext cx="7315200" cy="4572000"/>
+          <a:off x="5486400" y="1371600"/>
+          <a:ext cx="4572000" cy="5029200"/>
         </p:xfrm>
         <a:graphic>
           <a:graphicData uri="http://schemas.openxmlformats.org/drawingml/2006/chart">

</xml_diff>